<commit_message>
docs: add Accounts – Sending Token Process (Draft Version)
</commit_message>
<xml_diff>
--- a/docs/Solana_Blockchain_Outline_Figure.pptx
+++ b/docs/Solana_Blockchain_Outline_Figure.pptx
@@ -5,11 +5,12 @@
     <p:sldMasterId id="2147483672" r:id="rId1"/>
   </p:sldMasterIdLst>
   <p:notesMasterIdLst>
-    <p:notesMasterId r:id="rId4"/>
+    <p:notesMasterId r:id="rId5"/>
   </p:notesMasterIdLst>
   <p:sldIdLst>
     <p:sldId id="256" r:id="rId2"/>
     <p:sldId id="258" r:id="rId3"/>
+    <p:sldId id="259" r:id="rId4"/>
   </p:sldIdLst>
   <p:sldSz cx="12192000" cy="6858000"/>
   <p:notesSz cx="6858000" cy="9144000"/>
@@ -198,7 +199,7 @@
           <a:p>
             <a:fld id="{0E3AE901-84B3-3248-AD12-BEDA7F301CE3}" type="datetimeFigureOut">
               <a:rPr kumimoji="1" lang="ja-JP" altLang="en-US" smtClean="0"/>
-              <a:t>2021/12/18</a:t>
+              <a:t>2021/12/19</a:t>
             </a:fld>
             <a:endParaRPr kumimoji="1" lang="ja-JP" altLang="en-US"/>
           </a:p>
@@ -645,7 +646,7 @@
           <a:p>
             <a:fld id="{E6851339-B791-2543-A411-D5C0BF7CF832}" type="datetime1">
               <a:rPr kumimoji="1" lang="ja-JP" altLang="en-US" smtClean="0"/>
-              <a:t>2021/12/18</a:t>
+              <a:t>2021/12/19</a:t>
             </a:fld>
             <a:endParaRPr kumimoji="1" lang="ja-JP" altLang="en-US"/>
           </a:p>
@@ -866,7 +867,7 @@
           <a:p>
             <a:fld id="{A20C4B19-A868-3A49-8F38-E72DBA7F7CE3}" type="datetime1">
               <a:rPr kumimoji="1" lang="ja-JP" altLang="en-US" smtClean="0"/>
-              <a:t>2021/12/18</a:t>
+              <a:t>2021/12/19</a:t>
             </a:fld>
             <a:endParaRPr kumimoji="1" lang="ja-JP" altLang="en-US"/>
           </a:p>
@@ -1082,7 +1083,7 @@
           <a:p>
             <a:fld id="{D0090A48-633D-E844-AF07-48AC11C0415A}" type="datetime1">
               <a:rPr kumimoji="1" lang="ja-JP" altLang="en-US" smtClean="0"/>
-              <a:t>2021/12/18</a:t>
+              <a:t>2021/12/19</a:t>
             </a:fld>
             <a:endParaRPr kumimoji="1" lang="ja-JP" altLang="en-US"/>
           </a:p>
@@ -1288,7 +1289,7 @@
           <a:p>
             <a:fld id="{7E5C0873-C23F-1D43-B933-39E7CB65079A}" type="datetime1">
               <a:rPr kumimoji="1" lang="ja-JP" altLang="en-US" smtClean="0"/>
-              <a:t>2021/12/18</a:t>
+              <a:t>2021/12/19</a:t>
             </a:fld>
             <a:endParaRPr kumimoji="1" lang="ja-JP" altLang="en-US"/>
           </a:p>
@@ -1538,7 +1539,7 @@
           <a:p>
             <a:fld id="{551BEE3E-B5BC-3D4C-A34C-20B36F9869C7}" type="datetime1">
               <a:rPr kumimoji="1" lang="ja-JP" altLang="en-US" smtClean="0"/>
-              <a:t>2021/12/18</a:t>
+              <a:t>2021/12/19</a:t>
             </a:fld>
             <a:endParaRPr kumimoji="1" lang="ja-JP" altLang="en-US"/>
           </a:p>
@@ -1838,7 +1839,7 @@
           <a:p>
             <a:fld id="{5156D51A-F155-E24A-9B60-AE7D92900ACE}" type="datetime1">
               <a:rPr kumimoji="1" lang="ja-JP" altLang="en-US" smtClean="0"/>
-              <a:t>2021/12/18</a:t>
+              <a:t>2021/12/19</a:t>
             </a:fld>
             <a:endParaRPr kumimoji="1" lang="ja-JP" altLang="en-US"/>
           </a:p>
@@ -2273,7 +2274,7 @@
           <a:p>
             <a:fld id="{4EAC22FD-6838-EE46-ACA4-4E38E091F7A3}" type="datetime1">
               <a:rPr kumimoji="1" lang="ja-JP" altLang="en-US" smtClean="0"/>
-              <a:t>2021/12/18</a:t>
+              <a:t>2021/12/19</a:t>
             </a:fld>
             <a:endParaRPr kumimoji="1" lang="ja-JP" altLang="en-US"/>
           </a:p>
@@ -2395,7 +2396,7 @@
           <a:p>
             <a:fld id="{64A7ED88-7F83-7C47-9D22-0D7A856526C2}" type="datetime1">
               <a:rPr kumimoji="1" lang="ja-JP" altLang="en-US" smtClean="0"/>
-              <a:t>2021/12/18</a:t>
+              <a:t>2021/12/19</a:t>
             </a:fld>
             <a:endParaRPr kumimoji="1" lang="ja-JP" altLang="en-US"/>
           </a:p>
@@ -2494,7 +2495,7 @@
           <a:p>
             <a:fld id="{C4373173-78A3-1048-A596-5D63967B7249}" type="datetime1">
               <a:rPr kumimoji="1" lang="ja-JP" altLang="en-US" smtClean="0"/>
-              <a:t>2021/12/18</a:t>
+              <a:t>2021/12/19</a:t>
             </a:fld>
             <a:endParaRPr kumimoji="1" lang="ja-JP" altLang="en-US"/>
           </a:p>
@@ -2807,7 +2808,7 @@
           <a:p>
             <a:fld id="{0612A1EE-20E7-6749-936A-EFBEC5019122}" type="datetime1">
               <a:rPr kumimoji="1" lang="ja-JP" altLang="en-US" smtClean="0"/>
-              <a:t>2021/12/18</a:t>
+              <a:t>2021/12/19</a:t>
             </a:fld>
             <a:endParaRPr kumimoji="1" lang="ja-JP" altLang="en-US"/>
           </a:p>
@@ -3068,7 +3069,7 @@
           <a:p>
             <a:fld id="{6E6CDA51-427A-9F41-AA69-359B3BA14E04}" type="datetime1">
               <a:rPr kumimoji="1" lang="ja-JP" altLang="en-US" smtClean="0"/>
-              <a:t>2021/12/18</a:t>
+              <a:t>2021/12/19</a:t>
             </a:fld>
             <a:endParaRPr kumimoji="1" lang="ja-JP" altLang="en-US"/>
           </a:p>
@@ -3255,7 +3256,7 @@
           <a:p>
             <a:fld id="{95553651-B718-3C46-A48E-CCDE2AEA20A9}" type="datetime1">
               <a:rPr kumimoji="1" lang="ja-JP" altLang="en-US" smtClean="0"/>
-              <a:t>2021/12/18</a:t>
+              <a:t>2021/12/19</a:t>
             </a:fld>
             <a:endParaRPr kumimoji="1" lang="ja-JP" altLang="en-US"/>
           </a:p>
@@ -3958,7 +3959,7 @@
           <a:lstStyle/>
           <a:p>
             <a:r>
-              <a:rPr kumimoji="1" lang="en-US" altLang="ja-JP" sz="1200" dirty="0">
+              <a:rPr kumimoji="1" lang="en-US" altLang="ja-JP" sz="1200" b="1" dirty="0">
                 <a:solidFill>
                   <a:schemeClr val="tx1"/>
                 </a:solidFill>
@@ -4054,16 +4055,16 @@
           </a:fontRef>
         </p:style>
         <p:txBody>
-          <a:bodyPr rtlCol="0" anchor="t"/>
+          <a:bodyPr wrap="none" rtlCol="0" anchor="t"/>
           <a:lstStyle/>
           <a:p>
             <a:r>
-              <a:rPr kumimoji="1" lang="en-US" altLang="ja-JP" sz="1200" dirty="0">
+              <a:rPr kumimoji="1" lang="en-US" altLang="ja-JP" sz="1200" b="1" dirty="0">
                 <a:solidFill>
                   <a:schemeClr val="tx1"/>
                 </a:solidFill>
               </a:rPr>
-              <a:t>User Account (via Mac)</a:t>
+              <a:t>User Account (Developer)</a:t>
             </a:r>
           </a:p>
           <a:p>
@@ -4080,7 +4081,7 @@
                   <a:schemeClr val="tx1"/>
                 </a:solidFill>
               </a:rPr>
-              <a:t>Overview: for Developer</a:t>
+              <a:t>Overview: Developer via Mac</a:t>
             </a:r>
           </a:p>
           <a:p>
@@ -4129,7 +4130,7 @@
                   <a:schemeClr val="tx1"/>
                 </a:solidFill>
               </a:rPr>
-              <a:t>Assigned Program Id: System Program</a:t>
+              <a:t>Assigned Program: System Program</a:t>
             </a:r>
           </a:p>
           <a:p>
@@ -4197,7 +4198,7 @@
           <a:lstStyle/>
           <a:p>
             <a:r>
-              <a:rPr kumimoji="1" lang="en-US" altLang="ja-JP" sz="1200" dirty="0">
+              <a:rPr kumimoji="1" lang="en-US" altLang="ja-JP" sz="1200" b="1" dirty="0">
                 <a:solidFill>
                   <a:schemeClr val="tx1"/>
                 </a:solidFill>
@@ -4390,11 +4391,11 @@
           </a:fontRef>
         </p:style>
         <p:txBody>
-          <a:bodyPr rtlCol="0" anchor="t"/>
+          <a:bodyPr wrap="none" rtlCol="0" anchor="t"/>
           <a:lstStyle/>
           <a:p>
             <a:r>
-              <a:rPr kumimoji="1" lang="en-US" altLang="ja-JP" sz="1200" dirty="0">
+              <a:rPr kumimoji="1" lang="en-US" altLang="ja-JP" sz="1200" b="1" dirty="0">
                 <a:solidFill>
                   <a:schemeClr val="tx1"/>
                 </a:solidFill>
@@ -4563,16 +4564,16 @@
           </a:fontRef>
         </p:style>
         <p:txBody>
-          <a:bodyPr rtlCol="0" anchor="t"/>
+          <a:bodyPr wrap="none" rtlCol="0" anchor="t"/>
           <a:lstStyle/>
           <a:p>
             <a:r>
-              <a:rPr kumimoji="1" lang="en-US" altLang="ja-JP" sz="1200" dirty="0">
+              <a:rPr kumimoji="1" lang="en-US" altLang="ja-JP" sz="1200" b="1" dirty="0">
                 <a:solidFill>
                   <a:schemeClr val="tx1"/>
                 </a:solidFill>
               </a:rPr>
-              <a:t>User Account (via Phantom)</a:t>
+              <a:t>User Account (Consumer)</a:t>
             </a:r>
           </a:p>
           <a:p>
@@ -4589,7 +4590,7 @@
                   <a:schemeClr val="tx1"/>
                 </a:solidFill>
               </a:rPr>
-              <a:t>Overview: for Consumer</a:t>
+              <a:t>Overview: Consumer via Phantom</a:t>
             </a:r>
           </a:p>
           <a:p>
@@ -4622,7 +4623,7 @@
                   <a:schemeClr val="tx1"/>
                 </a:solidFill>
               </a:rPr>
-              <a:t>Assigned Program Id: System Program</a:t>
+              <a:t>Assigned Program: System Program</a:t>
             </a:r>
           </a:p>
           <a:p>
@@ -4690,7 +4691,7 @@
           <a:lstStyle/>
           <a:p>
             <a:r>
-              <a:rPr kumimoji="1" lang="en-US" altLang="ja-JP" sz="1200" dirty="0">
+              <a:rPr kumimoji="1" lang="en-US" altLang="ja-JP" sz="1200" b="1" dirty="0">
                 <a:solidFill>
                   <a:schemeClr val="tx1"/>
                 </a:solidFill>
@@ -5974,8 +5975,8 @@
         </p:nvSpPr>
         <p:spPr>
           <a:xfrm>
-            <a:off x="3204798" y="730385"/>
-            <a:ext cx="1039824" cy="167158"/>
+            <a:off x="3204798" y="672607"/>
+            <a:ext cx="3816000" cy="216000"/>
           </a:xfrm>
           <a:prstGeom prst="rect">
             <a:avLst/>
@@ -6016,7 +6017,7 @@
                   <a:schemeClr val="tx1"/>
                 </a:solidFill>
               </a:rPr>
-              <a:t>STEP 1, 2</a:t>
+              <a:t>STEP 1, 2 (Deploy, Re-Deploy Program)</a:t>
             </a:r>
             <a:endParaRPr kumimoji="1" lang="ja-JP" altLang="en-US" sz="1400">
               <a:solidFill>
@@ -6100,7 +6101,7 @@
         <p:spPr>
           <a:xfrm>
             <a:off x="3204798" y="4397501"/>
-            <a:ext cx="1039824" cy="167158"/>
+            <a:ext cx="3816000" cy="216000"/>
           </a:xfrm>
           <a:prstGeom prst="rect">
             <a:avLst/>
@@ -6141,7 +6142,7 @@
                   <a:schemeClr val="tx1"/>
                 </a:solidFill>
               </a:rPr>
-              <a:t>STEP 3, 4</a:t>
+              <a:t>STEP 3, 4 (Create Account, then Add/Update Data)</a:t>
             </a:r>
             <a:endParaRPr kumimoji="1" lang="ja-JP" altLang="en-US" sz="1400">
               <a:solidFill>
@@ -6155,6 +6156,2506 @@
     <p:extLst>
       <p:ext uri="{BB962C8B-B14F-4D97-AF65-F5344CB8AC3E}">
         <p14:creationId xmlns:p14="http://schemas.microsoft.com/office/powerpoint/2010/main" val="29468240"/>
+      </p:ext>
+    </p:extLst>
+  </p:cSld>
+  <p:clrMapOvr>
+    <a:masterClrMapping/>
+  </p:clrMapOvr>
+</p:sld>
+</file>
+
+<file path=ppt/slides/slide3.xml><?xml version="1.0" encoding="utf-8"?>
+<p:sld xmlns:a="http://schemas.openxmlformats.org/drawingml/2006/main" xmlns:r="http://schemas.openxmlformats.org/officeDocument/2006/relationships" xmlns:p="http://schemas.openxmlformats.org/presentationml/2006/main">
+  <p:cSld>
+    <p:spTree>
+      <p:nvGrpSpPr>
+        <p:cNvPr id="1" name=""/>
+        <p:cNvGrpSpPr/>
+        <p:nvPr/>
+      </p:nvGrpSpPr>
+      <p:grpSpPr>
+        <a:xfrm>
+          <a:off x="0" y="0"/>
+          <a:ext cx="0" cy="0"/>
+          <a:chOff x="0" y="0"/>
+          <a:chExt cx="0" cy="0"/>
+        </a:xfrm>
+      </p:grpSpPr>
+      <p:sp>
+        <p:nvSpPr>
+          <p:cNvPr id="2" name="タイトル 1">
+            <a:extLst>
+              <a:ext uri="{FF2B5EF4-FFF2-40B4-BE49-F238E27FC236}">
+                <a16:creationId xmlns:a16="http://schemas.microsoft.com/office/drawing/2014/main" id="{39B57303-5685-3645-97DA-C8872A513461}"/>
+              </a:ext>
+            </a:extLst>
+          </p:cNvPr>
+          <p:cNvSpPr>
+            <a:spLocks noGrp="1"/>
+          </p:cNvSpPr>
+          <p:nvPr>
+            <p:ph type="title"/>
+          </p:nvPr>
+        </p:nvSpPr>
+        <p:spPr/>
+        <p:txBody>
+          <a:bodyPr/>
+          <a:lstStyle/>
+          <a:p>
+            <a:r>
+              <a:rPr kumimoji="1" lang="en-US" altLang="ja-JP" dirty="0"/>
+              <a:t>Accounts – Sending Token Process (Draft Version)</a:t>
+            </a:r>
+            <a:endParaRPr kumimoji="1" lang="ja-JP" altLang="en-US"/>
+          </a:p>
+        </p:txBody>
+      </p:sp>
+      <p:sp>
+        <p:nvSpPr>
+          <p:cNvPr id="4" name="フッター プレースホルダー 3">
+            <a:extLst>
+              <a:ext uri="{FF2B5EF4-FFF2-40B4-BE49-F238E27FC236}">
+                <a16:creationId xmlns:a16="http://schemas.microsoft.com/office/drawing/2014/main" id="{8B0292AD-87DE-FC47-AC2B-4284F89A8D72}"/>
+              </a:ext>
+            </a:extLst>
+          </p:cNvPr>
+          <p:cNvSpPr>
+            <a:spLocks noGrp="1"/>
+          </p:cNvSpPr>
+          <p:nvPr>
+            <p:ph type="ftr" sz="quarter" idx="11"/>
+          </p:nvPr>
+        </p:nvSpPr>
+        <p:spPr/>
+        <p:txBody>
+          <a:bodyPr/>
+          <a:lstStyle/>
+          <a:p>
+            <a:r>
+              <a:rPr kumimoji="1" lang="en-US" altLang="ja-JP"/>
+              <a:t>256hax</a:t>
+            </a:r>
+            <a:endParaRPr kumimoji="1" lang="ja-JP" altLang="en-US"/>
+          </a:p>
+        </p:txBody>
+      </p:sp>
+      <p:sp>
+        <p:nvSpPr>
+          <p:cNvPr id="5" name="スライド番号プレースホルダー 4">
+            <a:extLst>
+              <a:ext uri="{FF2B5EF4-FFF2-40B4-BE49-F238E27FC236}">
+                <a16:creationId xmlns:a16="http://schemas.microsoft.com/office/drawing/2014/main" id="{194C469B-51DF-1545-91A9-AD7A270321EA}"/>
+              </a:ext>
+            </a:extLst>
+          </p:cNvPr>
+          <p:cNvSpPr>
+            <a:spLocks noGrp="1"/>
+          </p:cNvSpPr>
+          <p:nvPr>
+            <p:ph type="sldNum" sz="quarter" idx="12"/>
+          </p:nvPr>
+        </p:nvSpPr>
+        <p:spPr/>
+        <p:txBody>
+          <a:bodyPr/>
+          <a:lstStyle/>
+          <a:p>
+            <a:fld id="{51BE5F08-58E8-9243-A834-2B76637F595D}" type="slidenum">
+              <a:rPr kumimoji="1" lang="ja-JP" altLang="en-US" smtClean="0"/>
+              <a:t>2</a:t>
+            </a:fld>
+            <a:endParaRPr kumimoji="1" lang="ja-JP" altLang="en-US"/>
+          </a:p>
+        </p:txBody>
+      </p:sp>
+      <p:graphicFrame>
+        <p:nvGraphicFramePr>
+          <p:cNvPr id="14" name="表 46">
+            <a:extLst>
+              <a:ext uri="{FF2B5EF4-FFF2-40B4-BE49-F238E27FC236}">
+                <a16:creationId xmlns:a16="http://schemas.microsoft.com/office/drawing/2014/main" id="{399B04BF-1171-E64F-86AD-51E61ED60957}"/>
+              </a:ext>
+            </a:extLst>
+          </p:cNvPr>
+          <p:cNvGraphicFramePr>
+            <a:graphicFrameLocks noGrp="1"/>
+          </p:cNvGraphicFramePr>
+          <p:nvPr>
+            <p:extLst>
+              <p:ext uri="{D42A27DB-BD31-4B8C-83A1-F6EECF244321}">
+                <p14:modId xmlns:p14="http://schemas.microsoft.com/office/powerpoint/2010/main" val="2684927453"/>
+              </p:ext>
+            </p:extLst>
+          </p:nvPr>
+        </p:nvGraphicFramePr>
+        <p:xfrm>
+          <a:off x="359198" y="5501144"/>
+          <a:ext cx="11211913" cy="929640"/>
+        </p:xfrm>
+        <a:graphic>
+          <a:graphicData uri="http://schemas.openxmlformats.org/drawingml/2006/table">
+            <a:tbl>
+              <a:tblPr firstRow="1" bandRow="1">
+                <a:tableStyleId>{5C22544A-7EE6-4342-B048-85BDC9FD1C3A}</a:tableStyleId>
+              </a:tblPr>
+              <a:tblGrid>
+                <a:gridCol w="1661463">
+                  <a:extLst>
+                    <a:ext uri="{9D8B030D-6E8A-4147-A177-3AD203B41FA5}">
+                      <a16:colId xmlns:a16="http://schemas.microsoft.com/office/drawing/2014/main" val="2217692529"/>
+                    </a:ext>
+                  </a:extLst>
+                </a:gridCol>
+                <a:gridCol w="9550450">
+                  <a:extLst>
+                    <a:ext uri="{9D8B030D-6E8A-4147-A177-3AD203B41FA5}">
+                      <a16:colId xmlns:a16="http://schemas.microsoft.com/office/drawing/2014/main" val="2533206870"/>
+                    </a:ext>
+                  </a:extLst>
+                </a:gridCol>
+              </a:tblGrid>
+              <a:tr h="432716">
+                <a:tc>
+                  <a:txBody>
+                    <a:bodyPr/>
+                    <a:lstStyle/>
+                    <a:p>
+                      <a:pPr marL="0" marR="0" indent="0" algn="l" defTabSz="914400" rtl="0" eaLnBrk="1" fontAlgn="auto" latinLnBrk="0" hangingPunct="1">
+                        <a:lnSpc>
+                          <a:spcPct val="100000"/>
+                        </a:lnSpc>
+                        <a:spcBef>
+                          <a:spcPts val="0"/>
+                        </a:spcBef>
+                        <a:spcAft>
+                          <a:spcPts val="0"/>
+                        </a:spcAft>
+                        <a:buClrTx/>
+                        <a:buSzTx/>
+                        <a:buFontTx/>
+                        <a:buNone/>
+                        <a:tabLst/>
+                        <a:defRPr/>
+                      </a:pPr>
+                      <a:r>
+                        <a:rPr kumimoji="1" lang="en-US" altLang="ja-JP" sz="1200" b="0" dirty="0">
+                          <a:solidFill>
+                            <a:schemeClr val="tx1"/>
+                          </a:solidFill>
+                        </a:rPr>
+                        <a:t>Step with Signature(</a:t>
+                      </a:r>
+                      <a:r>
+                        <a:rPr kumimoji="1" lang="en-US" altLang="ja-JP" sz="1200" b="0" dirty="0" err="1">
+                          <a:solidFill>
+                            <a:schemeClr val="tx1"/>
+                          </a:solidFill>
+                        </a:rPr>
+                        <a:t>Devnet</a:t>
+                      </a:r>
+                      <a:r>
+                        <a:rPr kumimoji="1" lang="en-US" altLang="ja-JP" sz="1200" b="0" dirty="0">
+                          <a:solidFill>
+                            <a:schemeClr val="tx1"/>
+                          </a:solidFill>
+                        </a:rPr>
+                        <a:t>)</a:t>
+                      </a:r>
+                      <a:endParaRPr kumimoji="1" lang="ja-JP" altLang="en-US" sz="1200" b="0">
+                        <a:solidFill>
+                          <a:schemeClr val="tx1"/>
+                        </a:solidFill>
+                      </a:endParaRPr>
+                    </a:p>
+                  </a:txBody>
+                  <a:tcPr>
+                    <a:lnL w="12700" cap="flat" cmpd="sng" algn="ctr">
+                      <a:solidFill>
+                        <a:schemeClr val="bg1">
+                          <a:lumMod val="95000"/>
+                        </a:schemeClr>
+                      </a:solidFill>
+                      <a:prstDash val="solid"/>
+                      <a:round/>
+                      <a:headEnd type="none" w="med" len="med"/>
+                      <a:tailEnd type="none" w="med" len="med"/>
+                    </a:lnL>
+                    <a:lnR w="12700" cap="flat" cmpd="sng" algn="ctr">
+                      <a:solidFill>
+                        <a:schemeClr val="bg1">
+                          <a:lumMod val="95000"/>
+                        </a:schemeClr>
+                      </a:solidFill>
+                      <a:prstDash val="solid"/>
+                      <a:round/>
+                      <a:headEnd type="none" w="med" len="med"/>
+                      <a:tailEnd type="none" w="med" len="med"/>
+                    </a:lnR>
+                    <a:lnT w="12700" cap="flat" cmpd="sng" algn="ctr">
+                      <a:solidFill>
+                        <a:schemeClr val="bg1">
+                          <a:lumMod val="95000"/>
+                        </a:schemeClr>
+                      </a:solidFill>
+                      <a:prstDash val="solid"/>
+                      <a:round/>
+                      <a:headEnd type="none" w="med" len="med"/>
+                      <a:tailEnd type="none" w="med" len="med"/>
+                    </a:lnT>
+                    <a:lnB w="12700" cap="flat" cmpd="sng" algn="ctr">
+                      <a:solidFill>
+                        <a:schemeClr val="bg1">
+                          <a:lumMod val="95000"/>
+                        </a:schemeClr>
+                      </a:solidFill>
+                      <a:prstDash val="solid"/>
+                      <a:round/>
+                      <a:headEnd type="none" w="med" len="med"/>
+                      <a:tailEnd type="none" w="med" len="med"/>
+                    </a:lnB>
+                    <a:noFill/>
+                  </a:tcPr>
+                </a:tc>
+                <a:tc>
+                  <a:txBody>
+                    <a:bodyPr/>
+                    <a:lstStyle/>
+                    <a:p>
+                      <a:pPr marL="0" indent="0">
+                        <a:buNone/>
+                      </a:pPr>
+                      <a:r>
+                        <a:rPr kumimoji="1" lang="en-US" altLang="ja-JP" sz="1100" b="0" dirty="0">
+                          <a:solidFill>
+                            <a:schemeClr val="tx1"/>
+                          </a:solidFill>
+                        </a:rPr>
+                        <a:t>1. Create Token: </a:t>
+                      </a:r>
+                      <a:r>
+                        <a:rPr kumimoji="1" lang="en-US" altLang="ja-JP" sz="1100" b="0" dirty="0">
+                          <a:solidFill>
+                            <a:schemeClr val="tx1"/>
+                          </a:solidFill>
+                          <a:hlinkClick r:id="rId2"/>
+                        </a:rPr>
+                        <a:t>2c67zVpfkUdJP2ZziC1nBmGsEPC3NoK6fisxDJKpZCuZERajyycchWunkSspjvdcxMnMSzxjvfoo7dKkNeDKbs6p</a:t>
+                      </a:r>
+                      <a:endParaRPr kumimoji="1" lang="en-US" altLang="ja-JP" sz="1100" b="0" dirty="0">
+                        <a:solidFill>
+                          <a:schemeClr val="tx1"/>
+                        </a:solidFill>
+                      </a:endParaRPr>
+                    </a:p>
+                    <a:p>
+                      <a:pPr marL="0" indent="0">
+                        <a:buNone/>
+                      </a:pPr>
+                      <a:r>
+                        <a:rPr kumimoji="1" lang="en-US" altLang="ja-JP" sz="1100" b="0" dirty="0">
+                          <a:solidFill>
+                            <a:schemeClr val="tx1"/>
+                          </a:solidFill>
+                        </a:rPr>
+                        <a:t>2. Create Token Account and Association): </a:t>
+                      </a:r>
+                      <a:r>
+                        <a:rPr kumimoji="1" lang="en-US" altLang="ja-JP" sz="1100" b="0" dirty="0">
+                          <a:solidFill>
+                            <a:schemeClr val="tx1"/>
+                          </a:solidFill>
+                          <a:hlinkClick r:id="rId3"/>
+                        </a:rPr>
+                        <a:t>28pZaLUia6BDcPARLcyDsVZhc3ADVsS9kxNeMxmKwEij1UhraYc4xV6cF85m4sJye1KofW9BjynVXGj83SF4uvQA</a:t>
+                      </a:r>
+                      <a:endParaRPr kumimoji="1" lang="en-US" altLang="ja-JP" sz="1100" b="0" dirty="0">
+                        <a:solidFill>
+                          <a:schemeClr val="tx1"/>
+                        </a:solidFill>
+                      </a:endParaRPr>
+                    </a:p>
+                    <a:p>
+                      <a:pPr marL="0" indent="0">
+                        <a:buNone/>
+                      </a:pPr>
+                      <a:r>
+                        <a:rPr kumimoji="1" lang="en-US" altLang="ja-JP" sz="1100" b="0" dirty="0">
+                          <a:solidFill>
+                            <a:schemeClr val="tx1"/>
+                          </a:solidFill>
+                        </a:rPr>
+                        <a:t>3. Mint 100 Tokens: </a:t>
+                      </a:r>
+                      <a:r>
+                        <a:rPr kumimoji="1" lang="en-US" altLang="ja-JP" sz="1100" b="0" dirty="0">
+                          <a:solidFill>
+                            <a:schemeClr val="tx1"/>
+                          </a:solidFill>
+                          <a:hlinkClick r:id="rId4"/>
+                        </a:rPr>
+                        <a:t>5U8bH6paBugh96HjTy1haUbCZijpVUK4MoPXqdCVZGNjP2kz5WQk3aGr4By5VPEtSfagpVZ91rTeWpj4tsNQRBs2</a:t>
+                      </a:r>
+                      <a:endParaRPr kumimoji="1" lang="en-US" altLang="ja-JP" sz="1100" b="0" dirty="0">
+                        <a:solidFill>
+                          <a:schemeClr val="tx1"/>
+                        </a:solidFill>
+                      </a:endParaRPr>
+                    </a:p>
+                    <a:p>
+                      <a:pPr marL="0" indent="0">
+                        <a:buNone/>
+                      </a:pPr>
+                      <a:r>
+                        <a:rPr kumimoji="1" lang="en-US" altLang="ja-JP" sz="1100" b="0" dirty="0">
+                          <a:solidFill>
+                            <a:schemeClr val="tx1"/>
+                          </a:solidFill>
+                        </a:rPr>
+                        <a:t>(Send 10 Tokens from Developer to Consumer: omit)</a:t>
+                      </a:r>
+                    </a:p>
+                    <a:p>
+                      <a:pPr marL="0" indent="0">
+                        <a:buNone/>
+                      </a:pPr>
+                      <a:r>
+                        <a:rPr kumimoji="1" lang="en-US" altLang="ja-JP" sz="1100" b="0" dirty="0">
+                          <a:solidFill>
+                            <a:schemeClr val="tx1"/>
+                          </a:solidFill>
+                        </a:rPr>
+                        <a:t>4. Send 1 Token from Consumer to Consumer: </a:t>
+                      </a:r>
+                      <a:r>
+                        <a:rPr kumimoji="1" lang="en-US" altLang="ja-JP" sz="1100" b="0" dirty="0">
+                          <a:solidFill>
+                            <a:schemeClr val="tx1"/>
+                          </a:solidFill>
+                          <a:hlinkClick r:id="rId5"/>
+                        </a:rPr>
+                        <a:t>3RQ52gXVRkphwJFJehcLawDyi2isZ4A6JkKonW8QnA9N28pUkAqZ8Yevi8R656drk8JzAXvWCDToiBQxMrkCsVif</a:t>
+                      </a:r>
+                      <a:endParaRPr kumimoji="1" lang="en-US" altLang="ja-JP" sz="1100" b="0" dirty="0">
+                        <a:solidFill>
+                          <a:schemeClr val="tx1"/>
+                        </a:solidFill>
+                      </a:endParaRPr>
+                    </a:p>
+                  </a:txBody>
+                  <a:tcPr>
+                    <a:lnL w="12700" cap="flat" cmpd="sng" algn="ctr">
+                      <a:solidFill>
+                        <a:schemeClr val="bg1">
+                          <a:lumMod val="95000"/>
+                        </a:schemeClr>
+                      </a:solidFill>
+                      <a:prstDash val="solid"/>
+                      <a:round/>
+                      <a:headEnd type="none" w="med" len="med"/>
+                      <a:tailEnd type="none" w="med" len="med"/>
+                    </a:lnL>
+                    <a:lnR w="12700" cap="flat" cmpd="sng" algn="ctr">
+                      <a:solidFill>
+                        <a:schemeClr val="bg1">
+                          <a:lumMod val="95000"/>
+                        </a:schemeClr>
+                      </a:solidFill>
+                      <a:prstDash val="solid"/>
+                      <a:round/>
+                      <a:headEnd type="none" w="med" len="med"/>
+                      <a:tailEnd type="none" w="med" len="med"/>
+                    </a:lnR>
+                    <a:lnT w="12700" cap="flat" cmpd="sng" algn="ctr">
+                      <a:solidFill>
+                        <a:schemeClr val="bg1">
+                          <a:lumMod val="95000"/>
+                        </a:schemeClr>
+                      </a:solidFill>
+                      <a:prstDash val="solid"/>
+                      <a:round/>
+                      <a:headEnd type="none" w="med" len="med"/>
+                      <a:tailEnd type="none" w="med" len="med"/>
+                    </a:lnT>
+                    <a:lnB w="12700" cap="flat" cmpd="sng" algn="ctr">
+                      <a:solidFill>
+                        <a:schemeClr val="bg1">
+                          <a:lumMod val="95000"/>
+                        </a:schemeClr>
+                      </a:solidFill>
+                      <a:prstDash val="solid"/>
+                      <a:round/>
+                      <a:headEnd type="none" w="med" len="med"/>
+                      <a:tailEnd type="none" w="med" len="med"/>
+                    </a:lnB>
+                    <a:noFill/>
+                  </a:tcPr>
+                </a:tc>
+                <a:extLst>
+                  <a:ext uri="{0D108BD9-81ED-4DB2-BD59-A6C34878D82A}">
+                    <a16:rowId xmlns:a16="http://schemas.microsoft.com/office/drawing/2014/main" val="1689043150"/>
+                  </a:ext>
+                </a:extLst>
+              </a:tr>
+            </a:tbl>
+          </a:graphicData>
+        </a:graphic>
+      </p:graphicFrame>
+      <p:sp>
+        <p:nvSpPr>
+          <p:cNvPr id="15" name="角丸四角形 14">
+            <a:extLst>
+              <a:ext uri="{FF2B5EF4-FFF2-40B4-BE49-F238E27FC236}">
+                <a16:creationId xmlns:a16="http://schemas.microsoft.com/office/drawing/2014/main" id="{F77D0405-A855-0B4A-943F-E6D92F458F5E}"/>
+              </a:ext>
+            </a:extLst>
+          </p:cNvPr>
+          <p:cNvSpPr/>
+          <p:nvPr/>
+        </p:nvSpPr>
+        <p:spPr>
+          <a:xfrm>
+            <a:off x="359198" y="1832557"/>
+            <a:ext cx="3312419" cy="1013547"/>
+          </a:xfrm>
+          <a:prstGeom prst="roundRect">
+            <a:avLst>
+              <a:gd name="adj" fmla="val 50000"/>
+            </a:avLst>
+          </a:prstGeom>
+          <a:noFill/>
+          <a:ln>
+            <a:solidFill>
+              <a:schemeClr val="tx1"/>
+            </a:solidFill>
+          </a:ln>
+        </p:spPr>
+        <p:style>
+          <a:lnRef idx="2">
+            <a:schemeClr val="accent1">
+              <a:shade val="50000"/>
+            </a:schemeClr>
+          </a:lnRef>
+          <a:fillRef idx="1">
+            <a:schemeClr val="accent1"/>
+          </a:fillRef>
+          <a:effectRef idx="0">
+            <a:schemeClr val="accent1"/>
+          </a:effectRef>
+          <a:fontRef idx="minor">
+            <a:schemeClr val="lt1"/>
+          </a:fontRef>
+        </p:style>
+        <p:txBody>
+          <a:bodyPr rtlCol="0" anchor="ctr"/>
+          <a:lstStyle/>
+          <a:p>
+            <a:r>
+              <a:rPr kumimoji="1" lang="en-US" altLang="ja-JP" sz="1200" b="1" dirty="0">
+                <a:solidFill>
+                  <a:schemeClr val="tx1"/>
+                </a:solidFill>
+              </a:rPr>
+              <a:t>Token</a:t>
+            </a:r>
+          </a:p>
+          <a:p>
+            <a:r>
+              <a:rPr kumimoji="1" lang="en-US" altLang="ja-JP" sz="1200" dirty="0">
+                <a:solidFill>
+                  <a:schemeClr val="tx1"/>
+                </a:solidFill>
+              </a:rPr>
+              <a:t>Address: </a:t>
+            </a:r>
+            <a:r>
+              <a:rPr kumimoji="1" lang="en-US" altLang="ja-JP" sz="1200" dirty="0">
+                <a:solidFill>
+                  <a:schemeClr val="tx1"/>
+                </a:solidFill>
+                <a:hlinkClick r:id="rId6"/>
+              </a:rPr>
+              <a:t>6cWx...pteX</a:t>
+            </a:r>
+            <a:endParaRPr kumimoji="1" lang="en-US" altLang="ja-JP" sz="1200" dirty="0">
+              <a:solidFill>
+                <a:schemeClr val="tx1"/>
+              </a:solidFill>
+            </a:endParaRPr>
+          </a:p>
+          <a:p>
+            <a:r>
+              <a:rPr kumimoji="1" lang="en-US" altLang="ja-JP" sz="1200" dirty="0">
+                <a:solidFill>
+                  <a:schemeClr val="tx1"/>
+                </a:solidFill>
+              </a:rPr>
+              <a:t>Supply: 100.000000000</a:t>
+            </a:r>
+          </a:p>
+          <a:p>
+            <a:r>
+              <a:rPr kumimoji="1" lang="en-US" altLang="ja-JP" sz="1200" dirty="0">
+                <a:solidFill>
+                  <a:schemeClr val="accent2"/>
+                </a:solidFill>
+              </a:rPr>
+              <a:t>Mint Authority: </a:t>
+            </a:r>
+            <a:r>
+              <a:rPr kumimoji="1" lang="en-US" altLang="ja-JP" sz="1200" dirty="0" err="1">
+                <a:solidFill>
+                  <a:schemeClr val="accent2"/>
+                </a:solidFill>
+              </a:rPr>
+              <a:t>HXtB</a:t>
+            </a:r>
+            <a:r>
+              <a:rPr kumimoji="1" lang="en-US" altLang="ja-JP" sz="1200" dirty="0">
+                <a:solidFill>
+                  <a:schemeClr val="accent2"/>
+                </a:solidFill>
+              </a:rPr>
+              <a:t>...</a:t>
+            </a:r>
+            <a:r>
+              <a:rPr kumimoji="1" lang="en-US" altLang="ja-JP" sz="1200" dirty="0" err="1">
+                <a:solidFill>
+                  <a:schemeClr val="accent2"/>
+                </a:solidFill>
+              </a:rPr>
+              <a:t>setg</a:t>
+            </a:r>
+            <a:endParaRPr kumimoji="1" lang="en-US" altLang="ja-JP" sz="1200" dirty="0">
+              <a:solidFill>
+                <a:schemeClr val="accent2"/>
+              </a:solidFill>
+            </a:endParaRPr>
+          </a:p>
+          <a:p>
+            <a:r>
+              <a:rPr kumimoji="1" lang="en-US" altLang="ja-JP" sz="1200" dirty="0">
+                <a:solidFill>
+                  <a:schemeClr val="accent2"/>
+                </a:solidFill>
+              </a:rPr>
+              <a:t>Owner: TokenkegQ...Q5DA</a:t>
+            </a:r>
+          </a:p>
+        </p:txBody>
+      </p:sp>
+      <p:sp>
+        <p:nvSpPr>
+          <p:cNvPr id="6" name="正方形/長方形 5">
+            <a:extLst>
+              <a:ext uri="{FF2B5EF4-FFF2-40B4-BE49-F238E27FC236}">
+                <a16:creationId xmlns:a16="http://schemas.microsoft.com/office/drawing/2014/main" id="{603D3353-8C08-0442-AA3D-CE30172DAFFA}"/>
+              </a:ext>
+            </a:extLst>
+          </p:cNvPr>
+          <p:cNvSpPr/>
+          <p:nvPr/>
+        </p:nvSpPr>
+        <p:spPr>
+          <a:xfrm>
+            <a:off x="359199" y="3009297"/>
+            <a:ext cx="3229026" cy="1016925"/>
+          </a:xfrm>
+          <a:prstGeom prst="rect">
+            <a:avLst/>
+          </a:prstGeom>
+          <a:noFill/>
+          <a:ln>
+            <a:solidFill>
+              <a:schemeClr val="tx1"/>
+            </a:solidFill>
+          </a:ln>
+        </p:spPr>
+        <p:style>
+          <a:lnRef idx="2">
+            <a:schemeClr val="accent1">
+              <a:shade val="50000"/>
+            </a:schemeClr>
+          </a:lnRef>
+          <a:fillRef idx="1">
+            <a:schemeClr val="accent1"/>
+          </a:fillRef>
+          <a:effectRef idx="0">
+            <a:schemeClr val="accent1"/>
+          </a:effectRef>
+          <a:fontRef idx="minor">
+            <a:schemeClr val="lt1"/>
+          </a:fontRef>
+        </p:style>
+        <p:txBody>
+          <a:bodyPr rtlCol="0" anchor="t"/>
+          <a:lstStyle/>
+          <a:p>
+            <a:r>
+              <a:rPr kumimoji="1" lang="en-US" altLang="ja-JP" sz="1200" b="1" dirty="0">
+                <a:solidFill>
+                  <a:schemeClr val="tx1"/>
+                </a:solidFill>
+              </a:rPr>
+              <a:t>User Account (Consumer)</a:t>
+            </a:r>
+          </a:p>
+          <a:p>
+            <a:endParaRPr kumimoji="1" lang="en-US" altLang="ja-JP" sz="1200" dirty="0">
+              <a:solidFill>
+                <a:schemeClr val="tx1"/>
+              </a:solidFill>
+            </a:endParaRPr>
+          </a:p>
+          <a:p>
+            <a:r>
+              <a:rPr kumimoji="1" lang="en-US" altLang="ja-JP" sz="1200" dirty="0">
+                <a:solidFill>
+                  <a:schemeClr val="tx1"/>
+                </a:solidFill>
+              </a:rPr>
+              <a:t>Overview: Consumer via Phantom</a:t>
+            </a:r>
+          </a:p>
+          <a:p>
+            <a:r>
+              <a:rPr kumimoji="1" lang="en-US" altLang="ja-JP" sz="1200" dirty="0">
+                <a:solidFill>
+                  <a:schemeClr val="tx1"/>
+                </a:solidFill>
+              </a:rPr>
+              <a:t>Address: 2SN6...</a:t>
+            </a:r>
+            <a:r>
+              <a:rPr kumimoji="1" lang="en-US" altLang="ja-JP" sz="1200" dirty="0" err="1">
+                <a:solidFill>
+                  <a:schemeClr val="tx1"/>
+                </a:solidFill>
+              </a:rPr>
+              <a:t>HRwn</a:t>
+            </a:r>
+            <a:endParaRPr kumimoji="1" lang="en-US" altLang="ja-JP" sz="1200" dirty="0">
+              <a:solidFill>
+                <a:schemeClr val="tx1"/>
+              </a:solidFill>
+            </a:endParaRPr>
+          </a:p>
+        </p:txBody>
+      </p:sp>
+      <p:sp>
+        <p:nvSpPr>
+          <p:cNvPr id="7" name="正方形/長方形 6">
+            <a:extLst>
+              <a:ext uri="{FF2B5EF4-FFF2-40B4-BE49-F238E27FC236}">
+                <a16:creationId xmlns:a16="http://schemas.microsoft.com/office/drawing/2014/main" id="{75C50FE2-8534-324A-8BA7-96E663860363}"/>
+              </a:ext>
+            </a:extLst>
+          </p:cNvPr>
+          <p:cNvSpPr/>
+          <p:nvPr/>
+        </p:nvSpPr>
+        <p:spPr>
+          <a:xfrm>
+            <a:off x="359199" y="4187242"/>
+            <a:ext cx="3229026" cy="1016925"/>
+          </a:xfrm>
+          <a:prstGeom prst="rect">
+            <a:avLst/>
+          </a:prstGeom>
+          <a:noFill/>
+          <a:ln>
+            <a:solidFill>
+              <a:schemeClr val="tx1"/>
+            </a:solidFill>
+          </a:ln>
+        </p:spPr>
+        <p:style>
+          <a:lnRef idx="2">
+            <a:schemeClr val="accent1">
+              <a:shade val="50000"/>
+            </a:schemeClr>
+          </a:lnRef>
+          <a:fillRef idx="1">
+            <a:schemeClr val="accent1"/>
+          </a:fillRef>
+          <a:effectRef idx="0">
+            <a:schemeClr val="accent1"/>
+          </a:effectRef>
+          <a:fontRef idx="minor">
+            <a:schemeClr val="lt1"/>
+          </a:fontRef>
+        </p:style>
+        <p:txBody>
+          <a:bodyPr rtlCol="0" anchor="t"/>
+          <a:lstStyle/>
+          <a:p>
+            <a:r>
+              <a:rPr kumimoji="1" lang="en-US" altLang="ja-JP" sz="1200" b="1" dirty="0">
+                <a:solidFill>
+                  <a:schemeClr val="tx1"/>
+                </a:solidFill>
+              </a:rPr>
+              <a:t>User Token Account (Consumer)</a:t>
+            </a:r>
+          </a:p>
+          <a:p>
+            <a:endParaRPr kumimoji="1" lang="en-US" altLang="ja-JP" sz="1200" dirty="0">
+              <a:solidFill>
+                <a:schemeClr val="tx1"/>
+              </a:solidFill>
+            </a:endParaRPr>
+          </a:p>
+          <a:p>
+            <a:r>
+              <a:rPr kumimoji="1" lang="en-US" altLang="ja-JP" sz="1200" dirty="0">
+                <a:solidFill>
+                  <a:schemeClr val="tx1"/>
+                </a:solidFill>
+              </a:rPr>
+              <a:t>Address: 772U...8ZkK</a:t>
+            </a:r>
+          </a:p>
+          <a:p>
+            <a:r>
+              <a:rPr kumimoji="1" lang="en-US" altLang="ja-JP" sz="1200" dirty="0">
+                <a:solidFill>
+                  <a:schemeClr val="accent2"/>
+                </a:solidFill>
+              </a:rPr>
+              <a:t>Mint: 6cWx...</a:t>
+            </a:r>
+            <a:r>
+              <a:rPr kumimoji="1" lang="en-US" altLang="ja-JP" sz="1200" dirty="0" err="1">
+                <a:solidFill>
+                  <a:schemeClr val="accent2"/>
+                </a:solidFill>
+              </a:rPr>
+              <a:t>pteX</a:t>
+            </a:r>
+            <a:endParaRPr kumimoji="1" lang="en-US" altLang="ja-JP" sz="1200" dirty="0">
+              <a:solidFill>
+                <a:schemeClr val="accent2"/>
+              </a:solidFill>
+            </a:endParaRPr>
+          </a:p>
+          <a:p>
+            <a:r>
+              <a:rPr kumimoji="1" lang="en-US" altLang="ja-JP" sz="1200" dirty="0">
+                <a:solidFill>
+                  <a:schemeClr val="accent2"/>
+                </a:solidFill>
+              </a:rPr>
+              <a:t>Owner: 2SN6...</a:t>
+            </a:r>
+            <a:r>
+              <a:rPr kumimoji="1" lang="en-US" altLang="ja-JP" sz="1200" dirty="0" err="1">
+                <a:solidFill>
+                  <a:schemeClr val="accent2"/>
+                </a:solidFill>
+              </a:rPr>
+              <a:t>HRwn</a:t>
+            </a:r>
+            <a:endParaRPr kumimoji="1" lang="en-US" altLang="ja-JP" sz="1200" dirty="0">
+              <a:solidFill>
+                <a:schemeClr val="accent2"/>
+              </a:solidFill>
+            </a:endParaRPr>
+          </a:p>
+        </p:txBody>
+      </p:sp>
+      <p:sp>
+        <p:nvSpPr>
+          <p:cNvPr id="10" name="正方形/長方形 9">
+            <a:extLst>
+              <a:ext uri="{FF2B5EF4-FFF2-40B4-BE49-F238E27FC236}">
+                <a16:creationId xmlns:a16="http://schemas.microsoft.com/office/drawing/2014/main" id="{A1741F00-BE24-C042-89C6-ACC768333EC2}"/>
+              </a:ext>
+            </a:extLst>
+          </p:cNvPr>
+          <p:cNvSpPr/>
+          <p:nvPr/>
+        </p:nvSpPr>
+        <p:spPr>
+          <a:xfrm>
+            <a:off x="4350642" y="655817"/>
+            <a:ext cx="3229026" cy="1016925"/>
+          </a:xfrm>
+          <a:prstGeom prst="rect">
+            <a:avLst/>
+          </a:prstGeom>
+          <a:noFill/>
+          <a:ln>
+            <a:solidFill>
+              <a:schemeClr val="tx1"/>
+            </a:solidFill>
+          </a:ln>
+        </p:spPr>
+        <p:style>
+          <a:lnRef idx="2">
+            <a:schemeClr val="accent1">
+              <a:shade val="50000"/>
+            </a:schemeClr>
+          </a:lnRef>
+          <a:fillRef idx="1">
+            <a:schemeClr val="accent1"/>
+          </a:fillRef>
+          <a:effectRef idx="0">
+            <a:schemeClr val="accent1"/>
+          </a:effectRef>
+          <a:fontRef idx="minor">
+            <a:schemeClr val="lt1"/>
+          </a:fontRef>
+        </p:style>
+        <p:txBody>
+          <a:bodyPr rtlCol="0" anchor="t"/>
+          <a:lstStyle/>
+          <a:p>
+            <a:r>
+              <a:rPr kumimoji="1" lang="en-US" altLang="ja-JP" sz="1200" b="1" dirty="0">
+                <a:solidFill>
+                  <a:schemeClr val="tx1"/>
+                </a:solidFill>
+              </a:rPr>
+              <a:t>User Account (Developer)</a:t>
+            </a:r>
+          </a:p>
+          <a:p>
+            <a:endParaRPr kumimoji="1" lang="en-US" altLang="ja-JP" sz="1200" dirty="0">
+              <a:solidFill>
+                <a:schemeClr val="tx1"/>
+              </a:solidFill>
+            </a:endParaRPr>
+          </a:p>
+          <a:p>
+            <a:r>
+              <a:rPr kumimoji="1" lang="en-US" altLang="ja-JP" sz="1200" dirty="0">
+                <a:solidFill>
+                  <a:schemeClr val="tx1"/>
+                </a:solidFill>
+              </a:rPr>
+              <a:t>Overview: Developer via Mac</a:t>
+            </a:r>
+          </a:p>
+          <a:p>
+            <a:r>
+              <a:rPr kumimoji="1" lang="en-US" altLang="ja-JP" sz="1200" dirty="0">
+                <a:solidFill>
+                  <a:schemeClr val="tx1"/>
+                </a:solidFill>
+              </a:rPr>
+              <a:t>Address: </a:t>
+            </a:r>
+            <a:r>
+              <a:rPr kumimoji="1" lang="en-US" altLang="ja-JP" sz="1200" dirty="0" err="1">
+                <a:solidFill>
+                  <a:schemeClr val="tx1"/>
+                </a:solidFill>
+              </a:rPr>
+              <a:t>HXtB</a:t>
+            </a:r>
+            <a:r>
+              <a:rPr kumimoji="1" lang="en-US" altLang="ja-JP" sz="1200" dirty="0">
+                <a:solidFill>
+                  <a:schemeClr val="tx1"/>
+                </a:solidFill>
+              </a:rPr>
+              <a:t>...</a:t>
+            </a:r>
+            <a:r>
+              <a:rPr kumimoji="1" lang="en-US" altLang="ja-JP" sz="1200" dirty="0" err="1">
+                <a:solidFill>
+                  <a:schemeClr val="tx1"/>
+                </a:solidFill>
+              </a:rPr>
+              <a:t>setg</a:t>
+            </a:r>
+            <a:endParaRPr kumimoji="1" lang="en-US" altLang="ja-JP" sz="1200" dirty="0">
+              <a:solidFill>
+                <a:schemeClr val="tx1"/>
+              </a:solidFill>
+            </a:endParaRPr>
+          </a:p>
+        </p:txBody>
+      </p:sp>
+      <p:sp>
+        <p:nvSpPr>
+          <p:cNvPr id="12" name="正方形/長方形 11">
+            <a:extLst>
+              <a:ext uri="{FF2B5EF4-FFF2-40B4-BE49-F238E27FC236}">
+                <a16:creationId xmlns:a16="http://schemas.microsoft.com/office/drawing/2014/main" id="{8C8B0FA4-BE36-7442-9943-915FF4789DAE}"/>
+              </a:ext>
+            </a:extLst>
+          </p:cNvPr>
+          <p:cNvSpPr/>
+          <p:nvPr/>
+        </p:nvSpPr>
+        <p:spPr>
+          <a:xfrm>
+            <a:off x="4350642" y="1832558"/>
+            <a:ext cx="3229026" cy="1016925"/>
+          </a:xfrm>
+          <a:prstGeom prst="rect">
+            <a:avLst/>
+          </a:prstGeom>
+          <a:noFill/>
+          <a:ln>
+            <a:solidFill>
+              <a:schemeClr val="tx1"/>
+            </a:solidFill>
+          </a:ln>
+        </p:spPr>
+        <p:style>
+          <a:lnRef idx="2">
+            <a:schemeClr val="accent1">
+              <a:shade val="50000"/>
+            </a:schemeClr>
+          </a:lnRef>
+          <a:fillRef idx="1">
+            <a:schemeClr val="accent1"/>
+          </a:fillRef>
+          <a:effectRef idx="0">
+            <a:schemeClr val="accent1"/>
+          </a:effectRef>
+          <a:fontRef idx="minor">
+            <a:schemeClr val="lt1"/>
+          </a:fontRef>
+        </p:style>
+        <p:txBody>
+          <a:bodyPr rtlCol="0" anchor="t"/>
+          <a:lstStyle/>
+          <a:p>
+            <a:r>
+              <a:rPr kumimoji="1" lang="en-US" altLang="ja-JP" sz="1200" b="1" dirty="0">
+                <a:solidFill>
+                  <a:schemeClr val="tx1"/>
+                </a:solidFill>
+              </a:rPr>
+              <a:t>User Token Account (Developer)</a:t>
+            </a:r>
+          </a:p>
+          <a:p>
+            <a:endParaRPr kumimoji="1" lang="en-US" altLang="ja-JP" sz="1200" dirty="0">
+              <a:solidFill>
+                <a:schemeClr val="tx1"/>
+              </a:solidFill>
+            </a:endParaRPr>
+          </a:p>
+          <a:p>
+            <a:r>
+              <a:rPr kumimoji="1" lang="en-US" altLang="ja-JP" sz="1200" dirty="0">
+                <a:solidFill>
+                  <a:schemeClr val="tx1"/>
+                </a:solidFill>
+              </a:rPr>
+              <a:t>Address: </a:t>
+            </a:r>
+            <a:r>
+              <a:rPr kumimoji="1" lang="en-US" altLang="ja-JP" sz="1200" dirty="0">
+                <a:solidFill>
+                  <a:schemeClr val="tx1"/>
+                </a:solidFill>
+                <a:hlinkClick r:id="rId7"/>
+              </a:rPr>
+              <a:t>FHx9...1Cm7</a:t>
+            </a:r>
+            <a:endParaRPr kumimoji="1" lang="en-US" altLang="ja-JP" sz="1200" dirty="0">
+              <a:solidFill>
+                <a:schemeClr val="tx1"/>
+              </a:solidFill>
+            </a:endParaRPr>
+          </a:p>
+          <a:p>
+            <a:r>
+              <a:rPr kumimoji="1" lang="en-US" altLang="ja-JP" sz="1200" dirty="0">
+                <a:solidFill>
+                  <a:schemeClr val="tx1"/>
+                </a:solidFill>
+              </a:rPr>
+              <a:t>Mint: 6cWx...</a:t>
+            </a:r>
+            <a:r>
+              <a:rPr kumimoji="1" lang="en-US" altLang="ja-JP" sz="1200" dirty="0" err="1">
+                <a:solidFill>
+                  <a:schemeClr val="tx1"/>
+                </a:solidFill>
+              </a:rPr>
+              <a:t>pteX</a:t>
+            </a:r>
+            <a:endParaRPr kumimoji="1" lang="en-US" altLang="ja-JP" sz="1200" dirty="0">
+              <a:solidFill>
+                <a:schemeClr val="tx1"/>
+              </a:solidFill>
+            </a:endParaRPr>
+          </a:p>
+          <a:p>
+            <a:r>
+              <a:rPr kumimoji="1" lang="en-US" altLang="ja-JP" sz="1200" dirty="0">
+                <a:solidFill>
+                  <a:schemeClr val="accent2"/>
+                </a:solidFill>
+              </a:rPr>
+              <a:t>Owner: </a:t>
+            </a:r>
+            <a:r>
+              <a:rPr kumimoji="1" lang="en-US" altLang="ja-JP" sz="1200" dirty="0" err="1">
+                <a:solidFill>
+                  <a:schemeClr val="accent2"/>
+                </a:solidFill>
+              </a:rPr>
+              <a:t>HXtB</a:t>
+            </a:r>
+            <a:r>
+              <a:rPr kumimoji="1" lang="en-US" altLang="ja-JP" sz="1200" dirty="0">
+                <a:solidFill>
+                  <a:schemeClr val="accent2"/>
+                </a:solidFill>
+              </a:rPr>
+              <a:t>...</a:t>
+            </a:r>
+            <a:r>
+              <a:rPr kumimoji="1" lang="en-US" altLang="ja-JP" sz="1200" dirty="0" err="1">
+                <a:solidFill>
+                  <a:schemeClr val="accent2"/>
+                </a:solidFill>
+              </a:rPr>
+              <a:t>setg</a:t>
+            </a:r>
+            <a:endParaRPr kumimoji="1" lang="en-US" altLang="ja-JP" sz="1200" dirty="0">
+              <a:solidFill>
+                <a:schemeClr val="accent2"/>
+              </a:solidFill>
+            </a:endParaRPr>
+          </a:p>
+        </p:txBody>
+      </p:sp>
+      <p:sp>
+        <p:nvSpPr>
+          <p:cNvPr id="16" name="正方形/長方形 15">
+            <a:extLst>
+              <a:ext uri="{FF2B5EF4-FFF2-40B4-BE49-F238E27FC236}">
+                <a16:creationId xmlns:a16="http://schemas.microsoft.com/office/drawing/2014/main" id="{A36A0593-D554-0747-B028-8A60CE863709}"/>
+              </a:ext>
+            </a:extLst>
+          </p:cNvPr>
+          <p:cNvSpPr/>
+          <p:nvPr/>
+        </p:nvSpPr>
+        <p:spPr>
+          <a:xfrm>
+            <a:off x="8342085" y="3009298"/>
+            <a:ext cx="3229026" cy="1016925"/>
+          </a:xfrm>
+          <a:prstGeom prst="rect">
+            <a:avLst/>
+          </a:prstGeom>
+          <a:noFill/>
+          <a:ln>
+            <a:solidFill>
+              <a:schemeClr val="tx1"/>
+            </a:solidFill>
+          </a:ln>
+        </p:spPr>
+        <p:style>
+          <a:lnRef idx="2">
+            <a:schemeClr val="accent1">
+              <a:shade val="50000"/>
+            </a:schemeClr>
+          </a:lnRef>
+          <a:fillRef idx="1">
+            <a:schemeClr val="accent1"/>
+          </a:fillRef>
+          <a:effectRef idx="0">
+            <a:schemeClr val="accent1"/>
+          </a:effectRef>
+          <a:fontRef idx="minor">
+            <a:schemeClr val="lt1"/>
+          </a:fontRef>
+        </p:style>
+        <p:txBody>
+          <a:bodyPr rtlCol="0" anchor="t"/>
+          <a:lstStyle/>
+          <a:p>
+            <a:r>
+              <a:rPr kumimoji="1" lang="en-US" altLang="ja-JP" sz="1200" b="1" dirty="0">
+                <a:solidFill>
+                  <a:schemeClr val="tx1"/>
+                </a:solidFill>
+              </a:rPr>
+              <a:t>User Account (Consumer)</a:t>
+            </a:r>
+          </a:p>
+          <a:p>
+            <a:endParaRPr kumimoji="1" lang="en-US" altLang="ja-JP" sz="1200" dirty="0">
+              <a:solidFill>
+                <a:schemeClr val="tx1"/>
+              </a:solidFill>
+            </a:endParaRPr>
+          </a:p>
+          <a:p>
+            <a:r>
+              <a:rPr kumimoji="1" lang="en-US" altLang="ja-JP" sz="1200" dirty="0">
+                <a:solidFill>
+                  <a:schemeClr val="tx1"/>
+                </a:solidFill>
+              </a:rPr>
+              <a:t>Overview: Consumer via Phantom</a:t>
+            </a:r>
+          </a:p>
+          <a:p>
+            <a:r>
+              <a:rPr kumimoji="1" lang="en-US" altLang="ja-JP" sz="1200" dirty="0">
+                <a:solidFill>
+                  <a:schemeClr val="tx1"/>
+                </a:solidFill>
+              </a:rPr>
+              <a:t>Address: GV2U...</a:t>
+            </a:r>
+            <a:r>
+              <a:rPr kumimoji="1" lang="en-US" altLang="ja-JP" sz="1200" dirty="0" err="1">
+                <a:solidFill>
+                  <a:schemeClr val="tx1"/>
+                </a:solidFill>
+              </a:rPr>
+              <a:t>VkcJ</a:t>
+            </a:r>
+            <a:endParaRPr kumimoji="1" lang="en-US" altLang="ja-JP" sz="1200" dirty="0">
+              <a:solidFill>
+                <a:schemeClr val="tx1"/>
+              </a:solidFill>
+            </a:endParaRPr>
+          </a:p>
+        </p:txBody>
+      </p:sp>
+      <p:sp>
+        <p:nvSpPr>
+          <p:cNvPr id="17" name="正方形/長方形 16">
+            <a:extLst>
+              <a:ext uri="{FF2B5EF4-FFF2-40B4-BE49-F238E27FC236}">
+                <a16:creationId xmlns:a16="http://schemas.microsoft.com/office/drawing/2014/main" id="{B8898FD0-FF87-6648-8069-666DB4B23A2F}"/>
+              </a:ext>
+            </a:extLst>
+          </p:cNvPr>
+          <p:cNvSpPr/>
+          <p:nvPr/>
+        </p:nvSpPr>
+        <p:spPr>
+          <a:xfrm>
+            <a:off x="8342085" y="4187243"/>
+            <a:ext cx="3229026" cy="1016925"/>
+          </a:xfrm>
+          <a:prstGeom prst="rect">
+            <a:avLst/>
+          </a:prstGeom>
+          <a:noFill/>
+          <a:ln>
+            <a:solidFill>
+              <a:schemeClr val="tx1"/>
+            </a:solidFill>
+          </a:ln>
+        </p:spPr>
+        <p:style>
+          <a:lnRef idx="2">
+            <a:schemeClr val="accent1">
+              <a:shade val="50000"/>
+            </a:schemeClr>
+          </a:lnRef>
+          <a:fillRef idx="1">
+            <a:schemeClr val="accent1"/>
+          </a:fillRef>
+          <a:effectRef idx="0">
+            <a:schemeClr val="accent1"/>
+          </a:effectRef>
+          <a:fontRef idx="minor">
+            <a:schemeClr val="lt1"/>
+          </a:fontRef>
+        </p:style>
+        <p:txBody>
+          <a:bodyPr rtlCol="0" anchor="t"/>
+          <a:lstStyle/>
+          <a:p>
+            <a:r>
+              <a:rPr kumimoji="1" lang="en-US" altLang="ja-JP" sz="1200" b="1" dirty="0">
+                <a:solidFill>
+                  <a:schemeClr val="tx1"/>
+                </a:solidFill>
+              </a:rPr>
+              <a:t>User Token Account (Consumer)</a:t>
+            </a:r>
+          </a:p>
+          <a:p>
+            <a:endParaRPr kumimoji="1" lang="en-US" altLang="ja-JP" sz="1200" dirty="0">
+              <a:solidFill>
+                <a:schemeClr val="tx1"/>
+              </a:solidFill>
+            </a:endParaRPr>
+          </a:p>
+          <a:p>
+            <a:r>
+              <a:rPr kumimoji="1" lang="en-US" altLang="ja-JP" sz="1200" dirty="0">
+                <a:solidFill>
+                  <a:schemeClr val="tx1"/>
+                </a:solidFill>
+              </a:rPr>
+              <a:t>Address: 9Ej4...</a:t>
+            </a:r>
+            <a:r>
+              <a:rPr kumimoji="1" lang="en-US" altLang="ja-JP" sz="1200" dirty="0" err="1">
+                <a:solidFill>
+                  <a:schemeClr val="tx1"/>
+                </a:solidFill>
+              </a:rPr>
+              <a:t>xVoK</a:t>
+            </a:r>
+            <a:endParaRPr kumimoji="1" lang="en-US" altLang="ja-JP" sz="1200" dirty="0">
+              <a:solidFill>
+                <a:schemeClr val="tx1"/>
+              </a:solidFill>
+            </a:endParaRPr>
+          </a:p>
+          <a:p>
+            <a:r>
+              <a:rPr kumimoji="1" lang="en-US" altLang="ja-JP" sz="1200" dirty="0">
+                <a:solidFill>
+                  <a:schemeClr val="accent2"/>
+                </a:solidFill>
+              </a:rPr>
+              <a:t>Mint: 6cWx...</a:t>
+            </a:r>
+            <a:r>
+              <a:rPr kumimoji="1" lang="en-US" altLang="ja-JP" sz="1200" dirty="0" err="1">
+                <a:solidFill>
+                  <a:schemeClr val="accent2"/>
+                </a:solidFill>
+              </a:rPr>
+              <a:t>pteX</a:t>
+            </a:r>
+            <a:endParaRPr kumimoji="1" lang="en-US" altLang="ja-JP" sz="1200" dirty="0">
+              <a:solidFill>
+                <a:schemeClr val="accent2"/>
+              </a:solidFill>
+            </a:endParaRPr>
+          </a:p>
+          <a:p>
+            <a:r>
+              <a:rPr kumimoji="1" lang="en-US" altLang="ja-JP" sz="1200" dirty="0">
+                <a:solidFill>
+                  <a:schemeClr val="accent2"/>
+                </a:solidFill>
+              </a:rPr>
+              <a:t>Owner: 2SN6...</a:t>
+            </a:r>
+            <a:r>
+              <a:rPr kumimoji="1" lang="en-US" altLang="ja-JP" sz="1200" dirty="0" err="1">
+                <a:solidFill>
+                  <a:schemeClr val="accent2"/>
+                </a:solidFill>
+              </a:rPr>
+              <a:t>HRwn</a:t>
+            </a:r>
+            <a:endParaRPr kumimoji="1" lang="en-US" altLang="ja-JP" sz="1200" dirty="0">
+              <a:solidFill>
+                <a:schemeClr val="accent2"/>
+              </a:solidFill>
+            </a:endParaRPr>
+          </a:p>
+        </p:txBody>
+      </p:sp>
+      <p:sp>
+        <p:nvSpPr>
+          <p:cNvPr id="18" name="正方形/長方形 17">
+            <a:extLst>
+              <a:ext uri="{FF2B5EF4-FFF2-40B4-BE49-F238E27FC236}">
+                <a16:creationId xmlns:a16="http://schemas.microsoft.com/office/drawing/2014/main" id="{0988D44D-5BC7-A941-99E8-4985A039DCE1}"/>
+              </a:ext>
+            </a:extLst>
+          </p:cNvPr>
+          <p:cNvSpPr/>
+          <p:nvPr/>
+        </p:nvSpPr>
+        <p:spPr>
+          <a:xfrm>
+            <a:off x="4350642" y="3045319"/>
+            <a:ext cx="3229026" cy="2158847"/>
+          </a:xfrm>
+          <a:prstGeom prst="rect">
+            <a:avLst/>
+          </a:prstGeom>
+          <a:noFill/>
+          <a:ln>
+            <a:solidFill>
+              <a:schemeClr val="tx1"/>
+            </a:solidFill>
+          </a:ln>
+        </p:spPr>
+        <p:style>
+          <a:lnRef idx="2">
+            <a:schemeClr val="accent1">
+              <a:shade val="50000"/>
+            </a:schemeClr>
+          </a:lnRef>
+          <a:fillRef idx="1">
+            <a:schemeClr val="accent1"/>
+          </a:fillRef>
+          <a:effectRef idx="0">
+            <a:schemeClr val="accent1"/>
+          </a:effectRef>
+          <a:fontRef idx="minor">
+            <a:schemeClr val="lt1"/>
+          </a:fontRef>
+        </p:style>
+        <p:txBody>
+          <a:bodyPr wrap="none" rtlCol="0" anchor="t"/>
+          <a:lstStyle/>
+          <a:p>
+            <a:r>
+              <a:rPr kumimoji="1" lang="en-US" altLang="ja-JP" sz="1200" b="1" dirty="0">
+                <a:solidFill>
+                  <a:schemeClr val="tx1"/>
+                </a:solidFill>
+              </a:rPr>
+              <a:t>Token Program Account</a:t>
+            </a:r>
+          </a:p>
+          <a:p>
+            <a:endParaRPr kumimoji="1" lang="en-US" altLang="ja-JP" sz="1200" dirty="0">
+              <a:solidFill>
+                <a:schemeClr val="tx1"/>
+              </a:solidFill>
+            </a:endParaRPr>
+          </a:p>
+          <a:p>
+            <a:r>
+              <a:rPr kumimoji="1" lang="en-US" altLang="ja-JP" sz="1200" dirty="0">
+                <a:solidFill>
+                  <a:schemeClr val="tx1"/>
+                </a:solidFill>
+              </a:rPr>
+              <a:t>Overview: Management Token? Escrow?</a:t>
+            </a:r>
+          </a:p>
+          <a:p>
+            <a:r>
+              <a:rPr kumimoji="1" lang="en-US" altLang="ja-JP" sz="1200" dirty="0">
+                <a:solidFill>
+                  <a:schemeClr val="tx1"/>
+                </a:solidFill>
+              </a:rPr>
+              <a:t>Address: </a:t>
+            </a:r>
+            <a:r>
+              <a:rPr kumimoji="1" lang="en-US" altLang="ja-JP" sz="1200" dirty="0">
+                <a:solidFill>
+                  <a:schemeClr val="tx1"/>
+                </a:solidFill>
+                <a:hlinkClick r:id="rId8"/>
+              </a:rPr>
+              <a:t>TokenkegQ...Q5DA</a:t>
+            </a:r>
+            <a:endParaRPr kumimoji="1" lang="en-US" altLang="ja-JP" sz="1200" dirty="0">
+              <a:solidFill>
+                <a:schemeClr val="tx1"/>
+              </a:solidFill>
+            </a:endParaRPr>
+          </a:p>
+          <a:p>
+            <a:r>
+              <a:rPr kumimoji="1" lang="en-US" altLang="ja-JP" sz="1200" dirty="0">
+                <a:solidFill>
+                  <a:schemeClr val="tx1"/>
+                </a:solidFill>
+              </a:rPr>
+              <a:t>Assigned Program: BPF Loader 2</a:t>
+            </a:r>
+          </a:p>
+        </p:txBody>
+      </p:sp>
+      <p:cxnSp>
+        <p:nvCxnSpPr>
+          <p:cNvPr id="21" name="直線矢印コネクタ 20">
+            <a:extLst>
+              <a:ext uri="{FF2B5EF4-FFF2-40B4-BE49-F238E27FC236}">
+                <a16:creationId xmlns:a16="http://schemas.microsoft.com/office/drawing/2014/main" id="{BC9C1A86-3EC0-7A49-B8BD-648CDE096C08}"/>
+              </a:ext>
+            </a:extLst>
+          </p:cNvPr>
+          <p:cNvCxnSpPr>
+            <a:cxnSpLocks/>
+          </p:cNvCxnSpPr>
+          <p:nvPr/>
+        </p:nvCxnSpPr>
+        <p:spPr>
+          <a:xfrm>
+            <a:off x="3588225" y="4662385"/>
+            <a:ext cx="762416" cy="0"/>
+          </a:xfrm>
+          <a:prstGeom prst="straightConnector1">
+            <a:avLst/>
+          </a:prstGeom>
+          <a:ln w="9525">
+            <a:solidFill>
+              <a:schemeClr val="tx1"/>
+            </a:solidFill>
+            <a:tailEnd type="arrow"/>
+          </a:ln>
+        </p:spPr>
+        <p:style>
+          <a:lnRef idx="1">
+            <a:schemeClr val="accent1"/>
+          </a:lnRef>
+          <a:fillRef idx="0">
+            <a:schemeClr val="accent1"/>
+          </a:fillRef>
+          <a:effectRef idx="0">
+            <a:schemeClr val="accent1"/>
+          </a:effectRef>
+          <a:fontRef idx="minor">
+            <a:schemeClr val="tx1"/>
+          </a:fontRef>
+        </p:style>
+      </p:cxnSp>
+      <p:cxnSp>
+        <p:nvCxnSpPr>
+          <p:cNvPr id="22" name="直線矢印コネクタ 21">
+            <a:extLst>
+              <a:ext uri="{FF2B5EF4-FFF2-40B4-BE49-F238E27FC236}">
+                <a16:creationId xmlns:a16="http://schemas.microsoft.com/office/drawing/2014/main" id="{6D134619-6792-8441-A112-EEF71ECA1700}"/>
+              </a:ext>
+            </a:extLst>
+          </p:cNvPr>
+          <p:cNvCxnSpPr>
+            <a:cxnSpLocks/>
+          </p:cNvCxnSpPr>
+          <p:nvPr/>
+        </p:nvCxnSpPr>
+        <p:spPr>
+          <a:xfrm>
+            <a:off x="7579668" y="4662385"/>
+            <a:ext cx="762416" cy="0"/>
+          </a:xfrm>
+          <a:prstGeom prst="straightConnector1">
+            <a:avLst/>
+          </a:prstGeom>
+          <a:ln w="9525">
+            <a:solidFill>
+              <a:schemeClr val="tx1"/>
+            </a:solidFill>
+            <a:tailEnd type="arrow"/>
+          </a:ln>
+        </p:spPr>
+        <p:style>
+          <a:lnRef idx="1">
+            <a:schemeClr val="accent1"/>
+          </a:lnRef>
+          <a:fillRef idx="0">
+            <a:schemeClr val="accent1"/>
+          </a:fillRef>
+          <a:effectRef idx="0">
+            <a:schemeClr val="accent1"/>
+          </a:effectRef>
+          <a:fontRef idx="minor">
+            <a:schemeClr val="tx1"/>
+          </a:fontRef>
+        </p:style>
+      </p:cxnSp>
+      <p:cxnSp>
+        <p:nvCxnSpPr>
+          <p:cNvPr id="25" name="直線コネクタ 24">
+            <a:extLst>
+              <a:ext uri="{FF2B5EF4-FFF2-40B4-BE49-F238E27FC236}">
+                <a16:creationId xmlns:a16="http://schemas.microsoft.com/office/drawing/2014/main" id="{82DEC4BE-05F1-B44E-80A2-D0376C3F8CEB}"/>
+              </a:ext>
+            </a:extLst>
+          </p:cNvPr>
+          <p:cNvCxnSpPr>
+            <a:cxnSpLocks/>
+            <a:stCxn id="6" idx="2"/>
+            <a:endCxn id="7" idx="0"/>
+          </p:cNvCxnSpPr>
+          <p:nvPr/>
+        </p:nvCxnSpPr>
+        <p:spPr>
+          <a:xfrm>
+            <a:off x="1973712" y="4026222"/>
+            <a:ext cx="0" cy="161020"/>
+          </a:xfrm>
+          <a:prstGeom prst="line">
+            <a:avLst/>
+          </a:prstGeom>
+          <a:ln w="9525">
+            <a:solidFill>
+              <a:schemeClr val="tx1"/>
+            </a:solidFill>
+            <a:headEnd type="oval"/>
+            <a:tailEnd type="oval"/>
+          </a:ln>
+        </p:spPr>
+        <p:style>
+          <a:lnRef idx="1">
+            <a:schemeClr val="accent1"/>
+          </a:lnRef>
+          <a:fillRef idx="0">
+            <a:schemeClr val="accent1"/>
+          </a:fillRef>
+          <a:effectRef idx="0">
+            <a:schemeClr val="accent1"/>
+          </a:effectRef>
+          <a:fontRef idx="minor">
+            <a:schemeClr val="tx1"/>
+          </a:fontRef>
+        </p:style>
+      </p:cxnSp>
+      <p:cxnSp>
+        <p:nvCxnSpPr>
+          <p:cNvPr id="26" name="直線コネクタ 25">
+            <a:extLst>
+              <a:ext uri="{FF2B5EF4-FFF2-40B4-BE49-F238E27FC236}">
+                <a16:creationId xmlns:a16="http://schemas.microsoft.com/office/drawing/2014/main" id="{C35C110C-BE26-6341-B809-9316A6BACDD5}"/>
+              </a:ext>
+            </a:extLst>
+          </p:cNvPr>
+          <p:cNvCxnSpPr>
+            <a:cxnSpLocks/>
+            <a:stCxn id="10" idx="2"/>
+            <a:endCxn id="12" idx="0"/>
+          </p:cNvCxnSpPr>
+          <p:nvPr/>
+        </p:nvCxnSpPr>
+        <p:spPr>
+          <a:xfrm>
+            <a:off x="5965155" y="1672742"/>
+            <a:ext cx="0" cy="159816"/>
+          </a:xfrm>
+          <a:prstGeom prst="line">
+            <a:avLst/>
+          </a:prstGeom>
+          <a:ln w="9525">
+            <a:solidFill>
+              <a:schemeClr val="tx1"/>
+            </a:solidFill>
+            <a:headEnd type="oval"/>
+            <a:tailEnd type="oval"/>
+          </a:ln>
+        </p:spPr>
+        <p:style>
+          <a:lnRef idx="1">
+            <a:schemeClr val="accent1"/>
+          </a:lnRef>
+          <a:fillRef idx="0">
+            <a:schemeClr val="accent1"/>
+          </a:fillRef>
+          <a:effectRef idx="0">
+            <a:schemeClr val="accent1"/>
+          </a:effectRef>
+          <a:fontRef idx="minor">
+            <a:schemeClr val="tx1"/>
+          </a:fontRef>
+        </p:style>
+      </p:cxnSp>
+      <p:cxnSp>
+        <p:nvCxnSpPr>
+          <p:cNvPr id="29" name="直線コネクタ 28">
+            <a:extLst>
+              <a:ext uri="{FF2B5EF4-FFF2-40B4-BE49-F238E27FC236}">
+                <a16:creationId xmlns:a16="http://schemas.microsoft.com/office/drawing/2014/main" id="{879E41E4-1D0A-8049-BF60-6EB2D29ECDF7}"/>
+              </a:ext>
+            </a:extLst>
+          </p:cNvPr>
+          <p:cNvCxnSpPr>
+            <a:cxnSpLocks/>
+            <a:stCxn id="16" idx="2"/>
+            <a:endCxn id="17" idx="0"/>
+          </p:cNvCxnSpPr>
+          <p:nvPr/>
+        </p:nvCxnSpPr>
+        <p:spPr>
+          <a:xfrm>
+            <a:off x="9956598" y="4026223"/>
+            <a:ext cx="0" cy="161020"/>
+          </a:xfrm>
+          <a:prstGeom prst="line">
+            <a:avLst/>
+          </a:prstGeom>
+          <a:ln w="9525">
+            <a:solidFill>
+              <a:schemeClr val="tx1"/>
+            </a:solidFill>
+            <a:headEnd type="oval"/>
+            <a:tailEnd type="oval"/>
+          </a:ln>
+        </p:spPr>
+        <p:style>
+          <a:lnRef idx="1">
+            <a:schemeClr val="accent1"/>
+          </a:lnRef>
+          <a:fillRef idx="0">
+            <a:schemeClr val="accent1"/>
+          </a:fillRef>
+          <a:effectRef idx="0">
+            <a:schemeClr val="accent1"/>
+          </a:effectRef>
+          <a:fontRef idx="minor">
+            <a:schemeClr val="tx1"/>
+          </a:fontRef>
+        </p:style>
+      </p:cxnSp>
+      <p:cxnSp>
+        <p:nvCxnSpPr>
+          <p:cNvPr id="39" name="直線コネクタ 38">
+            <a:extLst>
+              <a:ext uri="{FF2B5EF4-FFF2-40B4-BE49-F238E27FC236}">
+                <a16:creationId xmlns:a16="http://schemas.microsoft.com/office/drawing/2014/main" id="{C82EB186-1445-DA48-BF24-6C01C5C8A2E9}"/>
+              </a:ext>
+            </a:extLst>
+          </p:cNvPr>
+          <p:cNvCxnSpPr>
+            <a:cxnSpLocks/>
+            <a:stCxn id="10" idx="1"/>
+          </p:cNvCxnSpPr>
+          <p:nvPr/>
+        </p:nvCxnSpPr>
+        <p:spPr>
+          <a:xfrm flipH="1">
+            <a:off x="3431822" y="1164280"/>
+            <a:ext cx="918820" cy="734947"/>
+          </a:xfrm>
+          <a:prstGeom prst="line">
+            <a:avLst/>
+          </a:prstGeom>
+          <a:ln w="9525">
+            <a:solidFill>
+              <a:schemeClr val="tx1"/>
+            </a:solidFill>
+            <a:headEnd type="oval"/>
+            <a:tailEnd type="oval"/>
+          </a:ln>
+        </p:spPr>
+        <p:style>
+          <a:lnRef idx="1">
+            <a:schemeClr val="accent1"/>
+          </a:lnRef>
+          <a:fillRef idx="0">
+            <a:schemeClr val="accent1"/>
+          </a:fillRef>
+          <a:effectRef idx="0">
+            <a:schemeClr val="accent1"/>
+          </a:effectRef>
+          <a:fontRef idx="minor">
+            <a:schemeClr val="tx1"/>
+          </a:fontRef>
+        </p:style>
+      </p:cxnSp>
+      <p:cxnSp>
+        <p:nvCxnSpPr>
+          <p:cNvPr id="42" name="直線コネクタ 41">
+            <a:extLst>
+              <a:ext uri="{FF2B5EF4-FFF2-40B4-BE49-F238E27FC236}">
+                <a16:creationId xmlns:a16="http://schemas.microsoft.com/office/drawing/2014/main" id="{342DD550-FEAB-BC48-BA5C-7E9A87284E92}"/>
+              </a:ext>
+            </a:extLst>
+          </p:cNvPr>
+          <p:cNvCxnSpPr>
+            <a:cxnSpLocks/>
+          </p:cNvCxnSpPr>
+          <p:nvPr/>
+        </p:nvCxnSpPr>
+        <p:spPr>
+          <a:xfrm>
+            <a:off x="3504785" y="2689667"/>
+            <a:ext cx="845856" cy="355652"/>
+          </a:xfrm>
+          <a:prstGeom prst="line">
+            <a:avLst/>
+          </a:prstGeom>
+          <a:ln w="9525">
+            <a:solidFill>
+              <a:schemeClr val="tx1"/>
+            </a:solidFill>
+            <a:headEnd type="oval"/>
+            <a:tailEnd type="oval"/>
+          </a:ln>
+        </p:spPr>
+        <p:style>
+          <a:lnRef idx="1">
+            <a:schemeClr val="accent1"/>
+          </a:lnRef>
+          <a:fillRef idx="0">
+            <a:schemeClr val="accent1"/>
+          </a:fillRef>
+          <a:effectRef idx="0">
+            <a:schemeClr val="accent1"/>
+          </a:effectRef>
+          <a:fontRef idx="minor">
+            <a:schemeClr val="tx1"/>
+          </a:fontRef>
+        </p:style>
+      </p:cxnSp>
+      <p:sp>
+        <p:nvSpPr>
+          <p:cNvPr id="58" name="テキスト ボックス 57">
+            <a:extLst>
+              <a:ext uri="{FF2B5EF4-FFF2-40B4-BE49-F238E27FC236}">
+                <a16:creationId xmlns:a16="http://schemas.microsoft.com/office/drawing/2014/main" id="{84D76B64-2CB2-E04F-8B33-4D9B56C57E2E}"/>
+              </a:ext>
+            </a:extLst>
+          </p:cNvPr>
+          <p:cNvSpPr txBox="1"/>
+          <p:nvPr/>
+        </p:nvSpPr>
+        <p:spPr>
+          <a:xfrm>
+            <a:off x="3336387" y="4199019"/>
+            <a:ext cx="1266093" cy="276999"/>
+          </a:xfrm>
+          <a:prstGeom prst="rect">
+            <a:avLst/>
+          </a:prstGeom>
+          <a:noFill/>
+        </p:spPr>
+        <p:txBody>
+          <a:bodyPr wrap="none" rtlCol="0">
+            <a:noAutofit/>
+          </a:bodyPr>
+          <a:lstStyle/>
+          <a:p>
+            <a:pPr algn="ctr"/>
+            <a:r>
+              <a:rPr kumimoji="1" lang="en-US" altLang="ja-JP" sz="1200" dirty="0"/>
+              <a:t>Send?</a:t>
+            </a:r>
+          </a:p>
+          <a:p>
+            <a:pPr algn="ctr"/>
+            <a:r>
+              <a:rPr kumimoji="1" lang="en-US" altLang="ja-JP" sz="1200" dirty="0"/>
+              <a:t>1 Token</a:t>
+            </a:r>
+            <a:endParaRPr kumimoji="1" lang="ja-JP" altLang="en-US" sz="1200"/>
+          </a:p>
+        </p:txBody>
+      </p:sp>
+      <p:sp>
+        <p:nvSpPr>
+          <p:cNvPr id="59" name="テキスト ボックス 58">
+            <a:extLst>
+              <a:ext uri="{FF2B5EF4-FFF2-40B4-BE49-F238E27FC236}">
+                <a16:creationId xmlns:a16="http://schemas.microsoft.com/office/drawing/2014/main" id="{2165979C-18AE-6F45-B7C6-97EF1B118D5B}"/>
+              </a:ext>
+            </a:extLst>
+          </p:cNvPr>
+          <p:cNvSpPr txBox="1"/>
+          <p:nvPr/>
+        </p:nvSpPr>
+        <p:spPr>
+          <a:xfrm>
+            <a:off x="7327830" y="4199019"/>
+            <a:ext cx="1266093" cy="276999"/>
+          </a:xfrm>
+          <a:prstGeom prst="rect">
+            <a:avLst/>
+          </a:prstGeom>
+          <a:noFill/>
+        </p:spPr>
+        <p:txBody>
+          <a:bodyPr wrap="none" rtlCol="0">
+            <a:noAutofit/>
+          </a:bodyPr>
+          <a:lstStyle/>
+          <a:p>
+            <a:pPr algn="ctr"/>
+            <a:r>
+              <a:rPr kumimoji="1" lang="en-US" altLang="ja-JP" sz="1200" dirty="0" err="1"/>
+              <a:t>Recieve</a:t>
+            </a:r>
+            <a:r>
+              <a:rPr kumimoji="1" lang="en-US" altLang="ja-JP" sz="1200" dirty="0"/>
+              <a:t>?</a:t>
+            </a:r>
+          </a:p>
+          <a:p>
+            <a:pPr algn="ctr"/>
+            <a:r>
+              <a:rPr kumimoji="1" lang="en-US" altLang="ja-JP" sz="1200" dirty="0"/>
+              <a:t>1 Token</a:t>
+            </a:r>
+            <a:endParaRPr kumimoji="1" lang="ja-JP" altLang="en-US" sz="1200"/>
+          </a:p>
+        </p:txBody>
+      </p:sp>
+      <p:sp>
+        <p:nvSpPr>
+          <p:cNvPr id="60" name="正方形/長方形 59">
+            <a:extLst>
+              <a:ext uri="{FF2B5EF4-FFF2-40B4-BE49-F238E27FC236}">
+                <a16:creationId xmlns:a16="http://schemas.microsoft.com/office/drawing/2014/main" id="{7FE767BB-744B-EE4C-91EB-13C6F2D82122}"/>
+              </a:ext>
+            </a:extLst>
+          </p:cNvPr>
+          <p:cNvSpPr/>
+          <p:nvPr/>
+        </p:nvSpPr>
+        <p:spPr>
+          <a:xfrm>
+            <a:off x="253906" y="1750222"/>
+            <a:ext cx="3474557" cy="1178349"/>
+          </a:xfrm>
+          <a:prstGeom prst="rect">
+            <a:avLst/>
+          </a:prstGeom>
+          <a:noFill/>
+          <a:ln>
+            <a:solidFill>
+              <a:schemeClr val="bg1">
+                <a:lumMod val="75000"/>
+              </a:schemeClr>
+            </a:solidFill>
+            <a:prstDash val="dash"/>
+          </a:ln>
+        </p:spPr>
+        <p:style>
+          <a:lnRef idx="2">
+            <a:schemeClr val="accent1">
+              <a:shade val="50000"/>
+            </a:schemeClr>
+          </a:lnRef>
+          <a:fillRef idx="1">
+            <a:schemeClr val="accent1"/>
+          </a:fillRef>
+          <a:effectRef idx="0">
+            <a:schemeClr val="accent1"/>
+          </a:effectRef>
+          <a:fontRef idx="minor">
+            <a:schemeClr val="lt1"/>
+          </a:fontRef>
+        </p:style>
+        <p:txBody>
+          <a:bodyPr rtlCol="0" anchor="ctr"/>
+          <a:lstStyle/>
+          <a:p>
+            <a:pPr algn="ctr"/>
+            <a:endParaRPr kumimoji="1" lang="ja-JP" altLang="en-US" sz="1600">
+              <a:solidFill>
+                <a:schemeClr val="tx1"/>
+              </a:solidFill>
+            </a:endParaRPr>
+          </a:p>
+        </p:txBody>
+      </p:sp>
+      <p:sp>
+        <p:nvSpPr>
+          <p:cNvPr id="61" name="正方形/長方形 60">
+            <a:extLst>
+              <a:ext uri="{FF2B5EF4-FFF2-40B4-BE49-F238E27FC236}">
+                <a16:creationId xmlns:a16="http://schemas.microsoft.com/office/drawing/2014/main" id="{8A599F6F-D815-8C4D-A364-887CE5C015C6}"/>
+              </a:ext>
+            </a:extLst>
+          </p:cNvPr>
+          <p:cNvSpPr/>
+          <p:nvPr/>
+        </p:nvSpPr>
+        <p:spPr>
+          <a:xfrm>
+            <a:off x="4267202" y="1758859"/>
+            <a:ext cx="3417757" cy="1168187"/>
+          </a:xfrm>
+          <a:prstGeom prst="rect">
+            <a:avLst/>
+          </a:prstGeom>
+          <a:noFill/>
+          <a:ln>
+            <a:solidFill>
+              <a:schemeClr val="bg1">
+                <a:lumMod val="75000"/>
+              </a:schemeClr>
+            </a:solidFill>
+            <a:prstDash val="dash"/>
+          </a:ln>
+        </p:spPr>
+        <p:style>
+          <a:lnRef idx="2">
+            <a:schemeClr val="accent1">
+              <a:shade val="50000"/>
+            </a:schemeClr>
+          </a:lnRef>
+          <a:fillRef idx="1">
+            <a:schemeClr val="accent1"/>
+          </a:fillRef>
+          <a:effectRef idx="0">
+            <a:schemeClr val="accent1"/>
+          </a:effectRef>
+          <a:fontRef idx="minor">
+            <a:schemeClr val="lt1"/>
+          </a:fontRef>
+        </p:style>
+        <p:txBody>
+          <a:bodyPr rtlCol="0" anchor="ctr"/>
+          <a:lstStyle/>
+          <a:p>
+            <a:pPr algn="ctr"/>
+            <a:endParaRPr kumimoji="1" lang="ja-JP" altLang="en-US" sz="1600">
+              <a:solidFill>
+                <a:schemeClr val="tx1"/>
+              </a:solidFill>
+            </a:endParaRPr>
+          </a:p>
+        </p:txBody>
+      </p:sp>
+      <p:sp>
+        <p:nvSpPr>
+          <p:cNvPr id="62" name="正方形/長方形 61">
+            <a:extLst>
+              <a:ext uri="{FF2B5EF4-FFF2-40B4-BE49-F238E27FC236}">
+                <a16:creationId xmlns:a16="http://schemas.microsoft.com/office/drawing/2014/main" id="{8ED24FAA-A27A-4946-979C-E5925138E3FF}"/>
+              </a:ext>
+            </a:extLst>
+          </p:cNvPr>
+          <p:cNvSpPr/>
+          <p:nvPr/>
+        </p:nvSpPr>
+        <p:spPr>
+          <a:xfrm>
+            <a:off x="253906" y="2968411"/>
+            <a:ext cx="11441380" cy="2314787"/>
+          </a:xfrm>
+          <a:prstGeom prst="rect">
+            <a:avLst/>
+          </a:prstGeom>
+          <a:noFill/>
+          <a:ln>
+            <a:solidFill>
+              <a:schemeClr val="bg1">
+                <a:lumMod val="75000"/>
+              </a:schemeClr>
+            </a:solidFill>
+            <a:prstDash val="dash"/>
+          </a:ln>
+        </p:spPr>
+        <p:style>
+          <a:lnRef idx="2">
+            <a:schemeClr val="accent1">
+              <a:shade val="50000"/>
+            </a:schemeClr>
+          </a:lnRef>
+          <a:fillRef idx="1">
+            <a:schemeClr val="accent1"/>
+          </a:fillRef>
+          <a:effectRef idx="0">
+            <a:schemeClr val="accent1"/>
+          </a:effectRef>
+          <a:fontRef idx="minor">
+            <a:schemeClr val="lt1"/>
+          </a:fontRef>
+        </p:style>
+        <p:txBody>
+          <a:bodyPr rtlCol="0" anchor="ctr"/>
+          <a:lstStyle/>
+          <a:p>
+            <a:pPr algn="ctr"/>
+            <a:endParaRPr kumimoji="1" lang="ja-JP" altLang="en-US" sz="1600">
+              <a:solidFill>
+                <a:schemeClr val="tx1"/>
+              </a:solidFill>
+            </a:endParaRPr>
+          </a:p>
+        </p:txBody>
+      </p:sp>
+      <p:sp>
+        <p:nvSpPr>
+          <p:cNvPr id="63" name="正方形/長方形 62">
+            <a:extLst>
+              <a:ext uri="{FF2B5EF4-FFF2-40B4-BE49-F238E27FC236}">
+                <a16:creationId xmlns:a16="http://schemas.microsoft.com/office/drawing/2014/main" id="{A168F65D-C288-4040-A019-F84326DA3B99}"/>
+              </a:ext>
+            </a:extLst>
+          </p:cNvPr>
+          <p:cNvSpPr/>
+          <p:nvPr/>
+        </p:nvSpPr>
+        <p:spPr>
+          <a:xfrm>
+            <a:off x="253906" y="1582932"/>
+            <a:ext cx="1803199" cy="167158"/>
+          </a:xfrm>
+          <a:prstGeom prst="rect">
+            <a:avLst/>
+          </a:prstGeom>
+          <a:solidFill>
+            <a:schemeClr val="bg1">
+              <a:lumMod val="75000"/>
+            </a:schemeClr>
+          </a:solidFill>
+          <a:ln>
+            <a:noFill/>
+            <a:prstDash val="dash"/>
+          </a:ln>
+        </p:spPr>
+        <p:style>
+          <a:lnRef idx="2">
+            <a:schemeClr val="accent1">
+              <a:shade val="50000"/>
+            </a:schemeClr>
+          </a:lnRef>
+          <a:fillRef idx="1">
+            <a:schemeClr val="accent1"/>
+          </a:fillRef>
+          <a:effectRef idx="0">
+            <a:schemeClr val="accent1"/>
+          </a:effectRef>
+          <a:fontRef idx="minor">
+            <a:schemeClr val="lt1"/>
+          </a:fontRef>
+        </p:style>
+        <p:txBody>
+          <a:bodyPr wrap="none" rtlCol="0" anchor="ctr"/>
+          <a:lstStyle/>
+          <a:p>
+            <a:r>
+              <a:rPr kumimoji="1" lang="en-US" altLang="ja-JP" sz="1400" dirty="0">
+                <a:solidFill>
+                  <a:schemeClr val="tx1"/>
+                </a:solidFill>
+              </a:rPr>
+              <a:t>STEP 1 (Create Token)</a:t>
+            </a:r>
+            <a:endParaRPr kumimoji="1" lang="ja-JP" altLang="en-US" sz="1400">
+              <a:solidFill>
+                <a:schemeClr val="tx1"/>
+              </a:solidFill>
+            </a:endParaRPr>
+          </a:p>
+        </p:txBody>
+      </p:sp>
+      <p:sp>
+        <p:nvSpPr>
+          <p:cNvPr id="64" name="正方形/長方形 63">
+            <a:extLst>
+              <a:ext uri="{FF2B5EF4-FFF2-40B4-BE49-F238E27FC236}">
+                <a16:creationId xmlns:a16="http://schemas.microsoft.com/office/drawing/2014/main" id="{AC7CCEC7-6842-7342-BABC-05FB996891FE}"/>
+              </a:ext>
+            </a:extLst>
+          </p:cNvPr>
+          <p:cNvSpPr/>
+          <p:nvPr/>
+        </p:nvSpPr>
+        <p:spPr>
+          <a:xfrm>
+            <a:off x="7684959" y="1754363"/>
+            <a:ext cx="2710050" cy="461117"/>
+          </a:xfrm>
+          <a:prstGeom prst="rect">
+            <a:avLst/>
+          </a:prstGeom>
+          <a:solidFill>
+            <a:schemeClr val="bg1">
+              <a:lumMod val="75000"/>
+            </a:schemeClr>
+          </a:solidFill>
+          <a:ln>
+            <a:noFill/>
+            <a:prstDash val="dash"/>
+          </a:ln>
+        </p:spPr>
+        <p:style>
+          <a:lnRef idx="2">
+            <a:schemeClr val="accent1">
+              <a:shade val="50000"/>
+            </a:schemeClr>
+          </a:lnRef>
+          <a:fillRef idx="1">
+            <a:schemeClr val="accent1"/>
+          </a:fillRef>
+          <a:effectRef idx="0">
+            <a:schemeClr val="accent1"/>
+          </a:effectRef>
+          <a:fontRef idx="minor">
+            <a:schemeClr val="lt1"/>
+          </a:fontRef>
+        </p:style>
+        <p:txBody>
+          <a:bodyPr wrap="none" rtlCol="0" anchor="ctr"/>
+          <a:lstStyle/>
+          <a:p>
+            <a:r>
+              <a:rPr kumimoji="1" lang="en-US" altLang="ja-JP" sz="1400" dirty="0">
+                <a:solidFill>
+                  <a:schemeClr val="tx1"/>
+                </a:solidFill>
+              </a:rPr>
+              <a:t>STEP 2 (Create Token Account)</a:t>
+            </a:r>
+          </a:p>
+          <a:p>
+            <a:r>
+              <a:rPr kumimoji="1" lang="en-US" altLang="ja-JP" sz="1400" dirty="0">
+                <a:solidFill>
+                  <a:schemeClr val="tx1"/>
+                </a:solidFill>
+              </a:rPr>
+              <a:t>STEP 3 (Mint 100 Tokens)</a:t>
+            </a:r>
+            <a:endParaRPr kumimoji="1" lang="ja-JP" altLang="en-US" sz="1400">
+              <a:solidFill>
+                <a:schemeClr val="tx1"/>
+              </a:solidFill>
+            </a:endParaRPr>
+          </a:p>
+        </p:txBody>
+      </p:sp>
+      <p:sp>
+        <p:nvSpPr>
+          <p:cNvPr id="69" name="正方形/長方形 68">
+            <a:extLst>
+              <a:ext uri="{FF2B5EF4-FFF2-40B4-BE49-F238E27FC236}">
+                <a16:creationId xmlns:a16="http://schemas.microsoft.com/office/drawing/2014/main" id="{DA15588E-B43F-AA47-94C7-C4C526F4CBB7}"/>
+              </a:ext>
+            </a:extLst>
+          </p:cNvPr>
+          <p:cNvSpPr/>
+          <p:nvPr/>
+        </p:nvSpPr>
+        <p:spPr>
+          <a:xfrm>
+            <a:off x="253906" y="5280370"/>
+            <a:ext cx="1803199" cy="167158"/>
+          </a:xfrm>
+          <a:prstGeom prst="rect">
+            <a:avLst/>
+          </a:prstGeom>
+          <a:solidFill>
+            <a:schemeClr val="bg1">
+              <a:lumMod val="75000"/>
+            </a:schemeClr>
+          </a:solidFill>
+          <a:ln>
+            <a:noFill/>
+            <a:prstDash val="dash"/>
+          </a:ln>
+        </p:spPr>
+        <p:style>
+          <a:lnRef idx="2">
+            <a:schemeClr val="accent1">
+              <a:shade val="50000"/>
+            </a:schemeClr>
+          </a:lnRef>
+          <a:fillRef idx="1">
+            <a:schemeClr val="accent1"/>
+          </a:fillRef>
+          <a:effectRef idx="0">
+            <a:schemeClr val="accent1"/>
+          </a:effectRef>
+          <a:fontRef idx="minor">
+            <a:schemeClr val="lt1"/>
+          </a:fontRef>
+        </p:style>
+        <p:txBody>
+          <a:bodyPr wrap="none" rtlCol="0" anchor="ctr"/>
+          <a:lstStyle/>
+          <a:p>
+            <a:r>
+              <a:rPr kumimoji="1" lang="en-US" altLang="ja-JP" sz="1400" dirty="0">
+                <a:solidFill>
+                  <a:schemeClr val="tx1"/>
+                </a:solidFill>
+              </a:rPr>
+              <a:t>STEP 4 (Send Token)</a:t>
+            </a:r>
+            <a:endParaRPr kumimoji="1" lang="ja-JP" altLang="en-US" sz="1400">
+              <a:solidFill>
+                <a:schemeClr val="tx1"/>
+              </a:solidFill>
+            </a:endParaRPr>
+          </a:p>
+        </p:txBody>
+      </p:sp>
+      <p:grpSp>
+        <p:nvGrpSpPr>
+          <p:cNvPr id="80" name="グループ化 79">
+            <a:extLst>
+              <a:ext uri="{FF2B5EF4-FFF2-40B4-BE49-F238E27FC236}">
+                <a16:creationId xmlns:a16="http://schemas.microsoft.com/office/drawing/2014/main" id="{951946E7-AF87-C54A-B3F3-971521EC1F4B}"/>
+              </a:ext>
+            </a:extLst>
+          </p:cNvPr>
+          <p:cNvGrpSpPr/>
+          <p:nvPr/>
+        </p:nvGrpSpPr>
+        <p:grpSpPr>
+          <a:xfrm>
+            <a:off x="10526638" y="655817"/>
+            <a:ext cx="1044473" cy="832478"/>
+            <a:chOff x="10526638" y="655817"/>
+            <a:chExt cx="1044473" cy="832478"/>
+          </a:xfrm>
+        </p:grpSpPr>
+        <p:sp>
+          <p:nvSpPr>
+            <p:cNvPr id="71" name="正方形/長方形 70">
+              <a:extLst>
+                <a:ext uri="{FF2B5EF4-FFF2-40B4-BE49-F238E27FC236}">
+                  <a16:creationId xmlns:a16="http://schemas.microsoft.com/office/drawing/2014/main" id="{CA35E274-CEA3-2E4F-B312-64BD7F7CDB37}"/>
+                </a:ext>
+              </a:extLst>
+            </p:cNvPr>
+            <p:cNvSpPr/>
+            <p:nvPr/>
+          </p:nvSpPr>
+          <p:spPr>
+            <a:xfrm>
+              <a:off x="10526639" y="655818"/>
+              <a:ext cx="359660" cy="225665"/>
+            </a:xfrm>
+            <a:prstGeom prst="rect">
+              <a:avLst/>
+            </a:prstGeom>
+            <a:noFill/>
+            <a:ln>
+              <a:solidFill>
+                <a:schemeClr val="tx1"/>
+              </a:solidFill>
+            </a:ln>
+          </p:spPr>
+          <p:style>
+            <a:lnRef idx="2">
+              <a:schemeClr val="accent1">
+                <a:shade val="50000"/>
+              </a:schemeClr>
+            </a:lnRef>
+            <a:fillRef idx="1">
+              <a:schemeClr val="accent1"/>
+            </a:fillRef>
+            <a:effectRef idx="0">
+              <a:schemeClr val="accent1"/>
+            </a:effectRef>
+            <a:fontRef idx="minor">
+              <a:schemeClr val="lt1"/>
+            </a:fontRef>
+          </p:style>
+          <p:txBody>
+            <a:bodyPr rtlCol="0" anchor="ctr"/>
+            <a:lstStyle/>
+            <a:p>
+              <a:endParaRPr kumimoji="1" lang="en-US" altLang="ja-JP" sz="900" dirty="0">
+                <a:solidFill>
+                  <a:schemeClr val="tx1"/>
+                </a:solidFill>
+              </a:endParaRPr>
+            </a:p>
+          </p:txBody>
+        </p:sp>
+        <p:sp>
+          <p:nvSpPr>
+            <p:cNvPr id="72" name="角丸四角形 71">
+              <a:extLst>
+                <a:ext uri="{FF2B5EF4-FFF2-40B4-BE49-F238E27FC236}">
+                  <a16:creationId xmlns:a16="http://schemas.microsoft.com/office/drawing/2014/main" id="{F3C20E3F-1510-644C-A9E6-D13B2D52F4AD}"/>
+                </a:ext>
+              </a:extLst>
+            </p:cNvPr>
+            <p:cNvSpPr/>
+            <p:nvPr/>
+          </p:nvSpPr>
+          <p:spPr>
+            <a:xfrm>
+              <a:off x="10526638" y="961779"/>
+              <a:ext cx="359661" cy="225665"/>
+            </a:xfrm>
+            <a:prstGeom prst="roundRect">
+              <a:avLst>
+                <a:gd name="adj" fmla="val 50000"/>
+              </a:avLst>
+            </a:prstGeom>
+            <a:noFill/>
+            <a:ln>
+              <a:solidFill>
+                <a:schemeClr val="tx1"/>
+              </a:solidFill>
+            </a:ln>
+          </p:spPr>
+          <p:style>
+            <a:lnRef idx="2">
+              <a:schemeClr val="accent1">
+                <a:shade val="50000"/>
+              </a:schemeClr>
+            </a:lnRef>
+            <a:fillRef idx="1">
+              <a:schemeClr val="accent1"/>
+            </a:fillRef>
+            <a:effectRef idx="0">
+              <a:schemeClr val="accent1"/>
+            </a:effectRef>
+            <a:fontRef idx="minor">
+              <a:schemeClr val="lt1"/>
+            </a:fontRef>
+          </p:style>
+          <p:txBody>
+            <a:bodyPr rtlCol="0" anchor="ctr"/>
+            <a:lstStyle/>
+            <a:p>
+              <a:endParaRPr kumimoji="1" lang="en-US" altLang="ja-JP" sz="900" dirty="0">
+                <a:solidFill>
+                  <a:schemeClr val="tx1"/>
+                </a:solidFill>
+              </a:endParaRPr>
+            </a:p>
+          </p:txBody>
+        </p:sp>
+        <p:cxnSp>
+          <p:nvCxnSpPr>
+            <p:cNvPr id="73" name="直線コネクタ 72">
+              <a:extLst>
+                <a:ext uri="{FF2B5EF4-FFF2-40B4-BE49-F238E27FC236}">
+                  <a16:creationId xmlns:a16="http://schemas.microsoft.com/office/drawing/2014/main" id="{9336DF82-C8A0-374B-AF88-EF21C032203C}"/>
+                </a:ext>
+              </a:extLst>
+            </p:cNvPr>
+            <p:cNvCxnSpPr>
+              <a:cxnSpLocks/>
+            </p:cNvCxnSpPr>
+            <p:nvPr/>
+          </p:nvCxnSpPr>
+          <p:spPr>
+            <a:xfrm flipV="1">
+              <a:off x="10561838" y="1371124"/>
+              <a:ext cx="289259" cy="1"/>
+            </a:xfrm>
+            <a:prstGeom prst="line">
+              <a:avLst/>
+            </a:prstGeom>
+            <a:ln w="9525">
+              <a:solidFill>
+                <a:schemeClr val="tx1"/>
+              </a:solidFill>
+              <a:headEnd type="oval"/>
+              <a:tailEnd type="oval"/>
+            </a:ln>
+          </p:spPr>
+          <p:style>
+            <a:lnRef idx="1">
+              <a:schemeClr val="accent1"/>
+            </a:lnRef>
+            <a:fillRef idx="0">
+              <a:schemeClr val="accent1"/>
+            </a:fillRef>
+            <a:effectRef idx="0">
+              <a:schemeClr val="accent1"/>
+            </a:effectRef>
+            <a:fontRef idx="minor">
+              <a:schemeClr val="tx1"/>
+            </a:fontRef>
+          </p:style>
+        </p:cxnSp>
+        <p:sp>
+          <p:nvSpPr>
+            <p:cNvPr id="76" name="テキスト ボックス 75">
+              <a:extLst>
+                <a:ext uri="{FF2B5EF4-FFF2-40B4-BE49-F238E27FC236}">
+                  <a16:creationId xmlns:a16="http://schemas.microsoft.com/office/drawing/2014/main" id="{5682A2D9-1EE0-9A44-93AA-8D830B61B17A}"/>
+                </a:ext>
+              </a:extLst>
+            </p:cNvPr>
+            <p:cNvSpPr txBox="1"/>
+            <p:nvPr/>
+          </p:nvSpPr>
+          <p:spPr>
+            <a:xfrm>
+              <a:off x="10989220" y="961779"/>
+              <a:ext cx="581891" cy="225665"/>
+            </a:xfrm>
+            <a:prstGeom prst="rect">
+              <a:avLst/>
+            </a:prstGeom>
+            <a:noFill/>
+          </p:spPr>
+          <p:txBody>
+            <a:bodyPr wrap="none" rtlCol="0">
+              <a:noAutofit/>
+            </a:bodyPr>
+            <a:lstStyle/>
+            <a:p>
+              <a:r>
+                <a:rPr kumimoji="1" lang="en-US" altLang="ja-JP" sz="900" dirty="0"/>
+                <a:t>Token</a:t>
+              </a:r>
+              <a:endParaRPr kumimoji="1" lang="ja-JP" altLang="en-US" sz="900"/>
+            </a:p>
+          </p:txBody>
+        </p:sp>
+        <p:sp>
+          <p:nvSpPr>
+            <p:cNvPr id="78" name="テキスト ボックス 77">
+              <a:extLst>
+                <a:ext uri="{FF2B5EF4-FFF2-40B4-BE49-F238E27FC236}">
+                  <a16:creationId xmlns:a16="http://schemas.microsoft.com/office/drawing/2014/main" id="{28CFC158-6896-7C4E-B397-CFD1E263C4CF}"/>
+                </a:ext>
+              </a:extLst>
+            </p:cNvPr>
+            <p:cNvSpPr txBox="1"/>
+            <p:nvPr/>
+          </p:nvSpPr>
+          <p:spPr>
+            <a:xfrm>
+              <a:off x="10989220" y="655817"/>
+              <a:ext cx="581891" cy="225665"/>
+            </a:xfrm>
+            <a:prstGeom prst="rect">
+              <a:avLst/>
+            </a:prstGeom>
+            <a:noFill/>
+          </p:spPr>
+          <p:txBody>
+            <a:bodyPr wrap="none" rtlCol="0">
+              <a:noAutofit/>
+            </a:bodyPr>
+            <a:lstStyle/>
+            <a:p>
+              <a:r>
+                <a:rPr kumimoji="1" lang="en-US" altLang="ja-JP" sz="900" dirty="0"/>
+                <a:t>Account</a:t>
+              </a:r>
+              <a:endParaRPr kumimoji="1" lang="ja-JP" altLang="en-US" sz="900"/>
+            </a:p>
+          </p:txBody>
+        </p:sp>
+        <p:sp>
+          <p:nvSpPr>
+            <p:cNvPr id="79" name="テキスト ボックス 78">
+              <a:extLst>
+                <a:ext uri="{FF2B5EF4-FFF2-40B4-BE49-F238E27FC236}">
+                  <a16:creationId xmlns:a16="http://schemas.microsoft.com/office/drawing/2014/main" id="{CD8DE564-EAF6-2446-B272-8882EE619E7D}"/>
+                </a:ext>
+              </a:extLst>
+            </p:cNvPr>
+            <p:cNvSpPr txBox="1"/>
+            <p:nvPr/>
+          </p:nvSpPr>
+          <p:spPr>
+            <a:xfrm>
+              <a:off x="10989220" y="1262630"/>
+              <a:ext cx="581891" cy="225665"/>
+            </a:xfrm>
+            <a:prstGeom prst="rect">
+              <a:avLst/>
+            </a:prstGeom>
+            <a:noFill/>
+          </p:spPr>
+          <p:txBody>
+            <a:bodyPr wrap="none" rtlCol="0">
+              <a:noAutofit/>
+            </a:bodyPr>
+            <a:lstStyle/>
+            <a:p>
+              <a:r>
+                <a:rPr kumimoji="1" lang="en-US" altLang="ja-JP" sz="900" dirty="0"/>
+                <a:t>Relation</a:t>
+              </a:r>
+              <a:endParaRPr kumimoji="1" lang="ja-JP" altLang="en-US" sz="900"/>
+            </a:p>
+          </p:txBody>
+        </p:sp>
+      </p:grpSp>
+    </p:spTree>
+    <p:extLst>
+      <p:ext uri="{BB962C8B-B14F-4D97-AF65-F5344CB8AC3E}">
+        <p14:creationId xmlns:p14="http://schemas.microsoft.com/office/powerpoint/2010/main" val="3563487311"/>
       </p:ext>
     </p:extLst>
   </p:cSld>
@@ -6458,7 +8959,7 @@
           <a:solidFill>
             <a:schemeClr val="tx1"/>
           </a:solidFill>
-          <a:tailEnd type="arrow"/>
+          <a:tailEnd type="none"/>
         </a:ln>
       </a:spPr>
       <a:bodyPr/>

</xml_diff>

<commit_message>
cnore: change directory for entire
</commit_message>
<xml_diff>
--- a/docs/Solana_Blockchain_Outline_Figure.pptx
+++ b/docs/Solana_Blockchain_Outline_Figure.pptx
@@ -5,12 +5,13 @@
     <p:sldMasterId id="2147483672" r:id="rId1"/>
   </p:sldMasterIdLst>
   <p:notesMasterIdLst>
-    <p:notesMasterId r:id="rId5"/>
+    <p:notesMasterId r:id="rId6"/>
   </p:notesMasterIdLst>
   <p:sldIdLst>
     <p:sldId id="256" r:id="rId2"/>
-    <p:sldId id="258" r:id="rId3"/>
-    <p:sldId id="259" r:id="rId4"/>
+    <p:sldId id="260" r:id="rId3"/>
+    <p:sldId id="258" r:id="rId4"/>
+    <p:sldId id="259" r:id="rId5"/>
   </p:sldIdLst>
   <p:sldSz cx="12192000" cy="6858000"/>
   <p:notesSz cx="6858000" cy="9144000"/>
@@ -199,7 +200,7 @@
           <a:p>
             <a:fld id="{0E3AE901-84B3-3248-AD12-BEDA7F301CE3}" type="datetimeFigureOut">
               <a:rPr kumimoji="1" lang="ja-JP" altLang="en-US" smtClean="0"/>
-              <a:t>2021/12/19</a:t>
+              <a:t>2021/12/20</a:t>
             </a:fld>
             <a:endParaRPr kumimoji="1" lang="ja-JP" altLang="en-US"/>
           </a:p>
@@ -646,7 +647,7 @@
           <a:p>
             <a:fld id="{E6851339-B791-2543-A411-D5C0BF7CF832}" type="datetime1">
               <a:rPr kumimoji="1" lang="ja-JP" altLang="en-US" smtClean="0"/>
-              <a:t>2021/12/19</a:t>
+              <a:t>2021/12/20</a:t>
             </a:fld>
             <a:endParaRPr kumimoji="1" lang="ja-JP" altLang="en-US"/>
           </a:p>
@@ -867,7 +868,7 @@
           <a:p>
             <a:fld id="{A20C4B19-A868-3A49-8F38-E72DBA7F7CE3}" type="datetime1">
               <a:rPr kumimoji="1" lang="ja-JP" altLang="en-US" smtClean="0"/>
-              <a:t>2021/12/19</a:t>
+              <a:t>2021/12/20</a:t>
             </a:fld>
             <a:endParaRPr kumimoji="1" lang="ja-JP" altLang="en-US"/>
           </a:p>
@@ -1083,7 +1084,7 @@
           <a:p>
             <a:fld id="{D0090A48-633D-E844-AF07-48AC11C0415A}" type="datetime1">
               <a:rPr kumimoji="1" lang="ja-JP" altLang="en-US" smtClean="0"/>
-              <a:t>2021/12/19</a:t>
+              <a:t>2021/12/20</a:t>
             </a:fld>
             <a:endParaRPr kumimoji="1" lang="ja-JP" altLang="en-US"/>
           </a:p>
@@ -1289,7 +1290,7 @@
           <a:p>
             <a:fld id="{7E5C0873-C23F-1D43-B933-39E7CB65079A}" type="datetime1">
               <a:rPr kumimoji="1" lang="ja-JP" altLang="en-US" smtClean="0"/>
-              <a:t>2021/12/19</a:t>
+              <a:t>2021/12/20</a:t>
             </a:fld>
             <a:endParaRPr kumimoji="1" lang="ja-JP" altLang="en-US"/>
           </a:p>
@@ -1539,7 +1540,7 @@
           <a:p>
             <a:fld id="{551BEE3E-B5BC-3D4C-A34C-20B36F9869C7}" type="datetime1">
               <a:rPr kumimoji="1" lang="ja-JP" altLang="en-US" smtClean="0"/>
-              <a:t>2021/12/19</a:t>
+              <a:t>2021/12/20</a:t>
             </a:fld>
             <a:endParaRPr kumimoji="1" lang="ja-JP" altLang="en-US"/>
           </a:p>
@@ -1839,7 +1840,7 @@
           <a:p>
             <a:fld id="{5156D51A-F155-E24A-9B60-AE7D92900ACE}" type="datetime1">
               <a:rPr kumimoji="1" lang="ja-JP" altLang="en-US" smtClean="0"/>
-              <a:t>2021/12/19</a:t>
+              <a:t>2021/12/20</a:t>
             </a:fld>
             <a:endParaRPr kumimoji="1" lang="ja-JP" altLang="en-US"/>
           </a:p>
@@ -2274,7 +2275,7 @@
           <a:p>
             <a:fld id="{4EAC22FD-6838-EE46-ACA4-4E38E091F7A3}" type="datetime1">
               <a:rPr kumimoji="1" lang="ja-JP" altLang="en-US" smtClean="0"/>
-              <a:t>2021/12/19</a:t>
+              <a:t>2021/12/20</a:t>
             </a:fld>
             <a:endParaRPr kumimoji="1" lang="ja-JP" altLang="en-US"/>
           </a:p>
@@ -2396,7 +2397,7 @@
           <a:p>
             <a:fld id="{64A7ED88-7F83-7C47-9D22-0D7A856526C2}" type="datetime1">
               <a:rPr kumimoji="1" lang="ja-JP" altLang="en-US" smtClean="0"/>
-              <a:t>2021/12/19</a:t>
+              <a:t>2021/12/20</a:t>
             </a:fld>
             <a:endParaRPr kumimoji="1" lang="ja-JP" altLang="en-US"/>
           </a:p>
@@ -2495,7 +2496,7 @@
           <a:p>
             <a:fld id="{C4373173-78A3-1048-A596-5D63967B7249}" type="datetime1">
               <a:rPr kumimoji="1" lang="ja-JP" altLang="en-US" smtClean="0"/>
-              <a:t>2021/12/19</a:t>
+              <a:t>2021/12/20</a:t>
             </a:fld>
             <a:endParaRPr kumimoji="1" lang="ja-JP" altLang="en-US"/>
           </a:p>
@@ -2808,7 +2809,7 @@
           <a:p>
             <a:fld id="{0612A1EE-20E7-6749-936A-EFBEC5019122}" type="datetime1">
               <a:rPr kumimoji="1" lang="ja-JP" altLang="en-US" smtClean="0"/>
-              <a:t>2021/12/19</a:t>
+              <a:t>2021/12/20</a:t>
             </a:fld>
             <a:endParaRPr kumimoji="1" lang="ja-JP" altLang="en-US"/>
           </a:p>
@@ -3069,7 +3070,7 @@
           <a:p>
             <a:fld id="{6E6CDA51-427A-9F41-AA69-359B3BA14E04}" type="datetime1">
               <a:rPr kumimoji="1" lang="ja-JP" altLang="en-US" smtClean="0"/>
-              <a:t>2021/12/19</a:t>
+              <a:t>2021/12/20</a:t>
             </a:fld>
             <a:endParaRPr kumimoji="1" lang="ja-JP" altLang="en-US"/>
           </a:p>
@@ -3256,7 +3257,7 @@
           <a:p>
             <a:fld id="{95553651-B718-3C46-A48E-CCDE2AEA20A9}" type="datetime1">
               <a:rPr kumimoji="1" lang="ja-JP" altLang="en-US" smtClean="0"/>
-              <a:t>2021/12/19</a:t>
+              <a:t>2021/12/20</a:t>
             </a:fld>
             <a:endParaRPr kumimoji="1" lang="ja-JP" altLang="en-US"/>
           </a:p>
@@ -3829,6 +3830,2980 @@
           <p:cNvPr id="2" name="タイトル 1">
             <a:extLst>
               <a:ext uri="{FF2B5EF4-FFF2-40B4-BE49-F238E27FC236}">
+                <a16:creationId xmlns:a16="http://schemas.microsoft.com/office/drawing/2014/main" id="{247BFE88-7019-4F43-8B30-C0AC025035D4}"/>
+              </a:ext>
+            </a:extLst>
+          </p:cNvPr>
+          <p:cNvSpPr>
+            <a:spLocks noGrp="1"/>
+          </p:cNvSpPr>
+          <p:nvPr>
+            <p:ph type="title"/>
+          </p:nvPr>
+        </p:nvSpPr>
+        <p:spPr/>
+        <p:txBody>
+          <a:bodyPr/>
+          <a:lstStyle/>
+          <a:p>
+            <a:r>
+              <a:rPr kumimoji="1" lang="en-US" altLang="ja-JP" dirty="0"/>
+              <a:t>Production System Architecture</a:t>
+            </a:r>
+            <a:r>
+              <a:rPr kumimoji="1" lang="ja-JP" altLang="en-US"/>
+              <a:t> </a:t>
+            </a:r>
+            <a:r>
+              <a:rPr kumimoji="1" lang="en-US" altLang="ja-JP" dirty="0"/>
+              <a:t>(Draft Version)</a:t>
+            </a:r>
+            <a:endParaRPr kumimoji="1" lang="ja-JP" altLang="en-US"/>
+          </a:p>
+        </p:txBody>
+      </p:sp>
+      <p:sp>
+        <p:nvSpPr>
+          <p:cNvPr id="4" name="フッター プレースホルダー 3">
+            <a:extLst>
+              <a:ext uri="{FF2B5EF4-FFF2-40B4-BE49-F238E27FC236}">
+                <a16:creationId xmlns:a16="http://schemas.microsoft.com/office/drawing/2014/main" id="{669C2170-0645-D74B-BCA9-53705C62EA2E}"/>
+              </a:ext>
+            </a:extLst>
+          </p:cNvPr>
+          <p:cNvSpPr>
+            <a:spLocks noGrp="1"/>
+          </p:cNvSpPr>
+          <p:nvPr>
+            <p:ph type="ftr" sz="quarter" idx="11"/>
+          </p:nvPr>
+        </p:nvSpPr>
+        <p:spPr>
+          <a:xfrm>
+            <a:off x="3948288" y="6356350"/>
+            <a:ext cx="4114800" cy="365125"/>
+          </a:xfrm>
+        </p:spPr>
+        <p:txBody>
+          <a:bodyPr/>
+          <a:lstStyle/>
+          <a:p>
+            <a:r>
+              <a:rPr kumimoji="1" lang="en-US" altLang="ja-JP"/>
+              <a:t>256hax</a:t>
+            </a:r>
+            <a:endParaRPr kumimoji="1" lang="ja-JP" altLang="en-US"/>
+          </a:p>
+        </p:txBody>
+      </p:sp>
+      <p:sp>
+        <p:nvSpPr>
+          <p:cNvPr id="5" name="スライド番号プレースホルダー 4">
+            <a:extLst>
+              <a:ext uri="{FF2B5EF4-FFF2-40B4-BE49-F238E27FC236}">
+                <a16:creationId xmlns:a16="http://schemas.microsoft.com/office/drawing/2014/main" id="{C519304D-DB9E-0848-9482-0874A773055B}"/>
+              </a:ext>
+            </a:extLst>
+          </p:cNvPr>
+          <p:cNvSpPr>
+            <a:spLocks noGrp="1"/>
+          </p:cNvSpPr>
+          <p:nvPr>
+            <p:ph type="sldNum" sz="quarter" idx="12"/>
+          </p:nvPr>
+        </p:nvSpPr>
+        <p:spPr/>
+        <p:txBody>
+          <a:bodyPr/>
+          <a:lstStyle/>
+          <a:p>
+            <a:fld id="{51BE5F08-58E8-9243-A834-2B76637F595D}" type="slidenum">
+              <a:rPr kumimoji="1" lang="ja-JP" altLang="en-US" smtClean="0"/>
+              <a:t>1</a:t>
+            </a:fld>
+            <a:endParaRPr kumimoji="1" lang="ja-JP" altLang="en-US"/>
+          </a:p>
+        </p:txBody>
+      </p:sp>
+      <p:grpSp>
+        <p:nvGrpSpPr>
+          <p:cNvPr id="13" name="グループ化 12">
+            <a:extLst>
+              <a:ext uri="{FF2B5EF4-FFF2-40B4-BE49-F238E27FC236}">
+                <a16:creationId xmlns:a16="http://schemas.microsoft.com/office/drawing/2014/main" id="{F773E1F5-A2CC-E742-B513-66E69DC205B9}"/>
+              </a:ext>
+            </a:extLst>
+          </p:cNvPr>
+          <p:cNvGrpSpPr/>
+          <p:nvPr/>
+        </p:nvGrpSpPr>
+        <p:grpSpPr>
+          <a:xfrm>
+            <a:off x="302728" y="2382838"/>
+            <a:ext cx="348041" cy="450054"/>
+            <a:chOff x="490159" y="2239964"/>
+            <a:chExt cx="348041" cy="450054"/>
+          </a:xfrm>
+        </p:grpSpPr>
+        <p:sp>
+          <p:nvSpPr>
+            <p:cNvPr id="11" name="円/楕円 10">
+              <a:extLst>
+                <a:ext uri="{FF2B5EF4-FFF2-40B4-BE49-F238E27FC236}">
+                  <a16:creationId xmlns:a16="http://schemas.microsoft.com/office/drawing/2014/main" id="{47D0E64E-0144-454D-9AB4-39AC6F089A9A}"/>
+                </a:ext>
+              </a:extLst>
+            </p:cNvPr>
+            <p:cNvSpPr/>
+            <p:nvPr/>
+          </p:nvSpPr>
+          <p:spPr>
+            <a:xfrm>
+              <a:off x="514161" y="2239964"/>
+              <a:ext cx="300036" cy="300036"/>
+            </a:xfrm>
+            <a:prstGeom prst="ellipse">
+              <a:avLst/>
+            </a:prstGeom>
+            <a:solidFill>
+              <a:schemeClr val="bg1">
+                <a:lumMod val="75000"/>
+              </a:schemeClr>
+            </a:solidFill>
+            <a:ln>
+              <a:noFill/>
+            </a:ln>
+          </p:spPr>
+          <p:style>
+            <a:lnRef idx="2">
+              <a:schemeClr val="accent1">
+                <a:shade val="50000"/>
+              </a:schemeClr>
+            </a:lnRef>
+            <a:fillRef idx="1">
+              <a:schemeClr val="accent1"/>
+            </a:fillRef>
+            <a:effectRef idx="0">
+              <a:schemeClr val="accent1"/>
+            </a:effectRef>
+            <a:fontRef idx="minor">
+              <a:schemeClr val="lt1"/>
+            </a:fontRef>
+          </p:style>
+          <p:txBody>
+            <a:bodyPr rtlCol="0" anchor="ctr"/>
+            <a:lstStyle/>
+            <a:p>
+              <a:pPr algn="ctr"/>
+              <a:endParaRPr kumimoji="1" lang="ja-JP" altLang="en-US" sz="1600">
+                <a:solidFill>
+                  <a:schemeClr val="tx1"/>
+                </a:solidFill>
+              </a:endParaRPr>
+            </a:p>
+          </p:txBody>
+        </p:sp>
+        <p:sp>
+          <p:nvSpPr>
+            <p:cNvPr id="12" name="三角形 11">
+              <a:extLst>
+                <a:ext uri="{FF2B5EF4-FFF2-40B4-BE49-F238E27FC236}">
+                  <a16:creationId xmlns:a16="http://schemas.microsoft.com/office/drawing/2014/main" id="{258A3296-52CE-8D4B-93F1-9E487E22C304}"/>
+                </a:ext>
+              </a:extLst>
+            </p:cNvPr>
+            <p:cNvSpPr/>
+            <p:nvPr/>
+          </p:nvSpPr>
+          <p:spPr>
+            <a:xfrm>
+              <a:off x="490159" y="2389982"/>
+              <a:ext cx="348041" cy="300036"/>
+            </a:xfrm>
+            <a:prstGeom prst="triangle">
+              <a:avLst/>
+            </a:prstGeom>
+            <a:solidFill>
+              <a:schemeClr val="bg1">
+                <a:lumMod val="75000"/>
+              </a:schemeClr>
+            </a:solidFill>
+            <a:ln>
+              <a:noFill/>
+            </a:ln>
+          </p:spPr>
+          <p:style>
+            <a:lnRef idx="2">
+              <a:schemeClr val="accent1">
+                <a:shade val="50000"/>
+              </a:schemeClr>
+            </a:lnRef>
+            <a:fillRef idx="1">
+              <a:schemeClr val="accent1"/>
+            </a:fillRef>
+            <a:effectRef idx="0">
+              <a:schemeClr val="accent1"/>
+            </a:effectRef>
+            <a:fontRef idx="minor">
+              <a:schemeClr val="lt1"/>
+            </a:fontRef>
+          </p:style>
+          <p:txBody>
+            <a:bodyPr wrap="none" rtlCol="0" anchor="ctr"/>
+            <a:lstStyle/>
+            <a:p>
+              <a:pPr algn="ctr"/>
+              <a:endParaRPr kumimoji="1" lang="en-US" altLang="ja-JP" sz="1200" dirty="0">
+                <a:solidFill>
+                  <a:schemeClr val="tx1"/>
+                </a:solidFill>
+              </a:endParaRPr>
+            </a:p>
+            <a:p>
+              <a:pPr algn="ctr"/>
+              <a:endParaRPr kumimoji="1" lang="en-US" altLang="ja-JP" sz="1200" dirty="0">
+                <a:solidFill>
+                  <a:schemeClr val="tx1"/>
+                </a:solidFill>
+              </a:endParaRPr>
+            </a:p>
+            <a:p>
+              <a:pPr algn="ctr"/>
+              <a:r>
+                <a:rPr kumimoji="1" lang="en-US" altLang="ja-JP" sz="1200" dirty="0">
+                  <a:solidFill>
+                    <a:schemeClr val="tx1"/>
+                  </a:solidFill>
+                </a:rPr>
+                <a:t>User</a:t>
+              </a:r>
+              <a:endParaRPr kumimoji="1" lang="ja-JP" altLang="en-US" sz="1200">
+                <a:solidFill>
+                  <a:schemeClr val="tx1"/>
+                </a:solidFill>
+              </a:endParaRPr>
+            </a:p>
+          </p:txBody>
+        </p:sp>
+      </p:grpSp>
+      <p:sp>
+        <p:nvSpPr>
+          <p:cNvPr id="14" name="角丸四角形 13">
+            <a:extLst>
+              <a:ext uri="{FF2B5EF4-FFF2-40B4-BE49-F238E27FC236}">
+                <a16:creationId xmlns:a16="http://schemas.microsoft.com/office/drawing/2014/main" id="{79C4A2B2-FD98-B84F-AAA2-85E37DFF32CC}"/>
+              </a:ext>
+            </a:extLst>
+          </p:cNvPr>
+          <p:cNvSpPr/>
+          <p:nvPr/>
+        </p:nvSpPr>
+        <p:spPr>
+          <a:xfrm>
+            <a:off x="736600" y="2203682"/>
+            <a:ext cx="980314" cy="867600"/>
+          </a:xfrm>
+          <a:prstGeom prst="roundRect">
+            <a:avLst/>
+          </a:prstGeom>
+          <a:noFill/>
+          <a:ln>
+            <a:solidFill>
+              <a:schemeClr val="tx1"/>
+            </a:solidFill>
+          </a:ln>
+        </p:spPr>
+        <p:style>
+          <a:lnRef idx="2">
+            <a:schemeClr val="accent1">
+              <a:shade val="50000"/>
+            </a:schemeClr>
+          </a:lnRef>
+          <a:fillRef idx="1">
+            <a:schemeClr val="accent1"/>
+          </a:fillRef>
+          <a:effectRef idx="0">
+            <a:schemeClr val="accent1"/>
+          </a:effectRef>
+          <a:fontRef idx="minor">
+            <a:schemeClr val="lt1"/>
+          </a:fontRef>
+        </p:style>
+        <p:txBody>
+          <a:bodyPr rtlCol="0" anchor="t"/>
+          <a:lstStyle/>
+          <a:p>
+            <a:r>
+              <a:rPr kumimoji="1" lang="en-US" altLang="ja-JP" sz="1200" b="1" dirty="0">
+                <a:solidFill>
+                  <a:schemeClr val="tx1"/>
+                </a:solidFill>
+              </a:rPr>
+              <a:t>Wallet</a:t>
+            </a:r>
+          </a:p>
+          <a:p>
+            <a:endParaRPr kumimoji="1" lang="en-US" altLang="ja-JP" sz="1200" b="1" dirty="0">
+              <a:solidFill>
+                <a:schemeClr val="tx1"/>
+              </a:solidFill>
+            </a:endParaRPr>
+          </a:p>
+          <a:p>
+            <a:r>
+              <a:rPr kumimoji="1" lang="en-US" altLang="ja-JP" sz="1200" dirty="0">
+                <a:solidFill>
+                  <a:schemeClr val="tx1"/>
+                </a:solidFill>
+              </a:rPr>
+              <a:t>ex) Phantom</a:t>
+            </a:r>
+            <a:endParaRPr kumimoji="1" lang="ja-JP" altLang="en-US" sz="1200">
+              <a:solidFill>
+                <a:schemeClr val="tx1"/>
+              </a:solidFill>
+            </a:endParaRPr>
+          </a:p>
+        </p:txBody>
+      </p:sp>
+      <p:grpSp>
+        <p:nvGrpSpPr>
+          <p:cNvPr id="19" name="グループ化 18">
+            <a:extLst>
+              <a:ext uri="{FF2B5EF4-FFF2-40B4-BE49-F238E27FC236}">
+                <a16:creationId xmlns:a16="http://schemas.microsoft.com/office/drawing/2014/main" id="{B0E9CD14-2FB9-2748-8B4C-508B21636FDE}"/>
+              </a:ext>
+            </a:extLst>
+          </p:cNvPr>
+          <p:cNvGrpSpPr/>
+          <p:nvPr/>
+        </p:nvGrpSpPr>
+        <p:grpSpPr>
+          <a:xfrm>
+            <a:off x="10808860" y="5769023"/>
+            <a:ext cx="348041" cy="450054"/>
+            <a:chOff x="490159" y="2239964"/>
+            <a:chExt cx="348041" cy="450054"/>
+          </a:xfrm>
+        </p:grpSpPr>
+        <p:sp>
+          <p:nvSpPr>
+            <p:cNvPr id="20" name="円/楕円 19">
+              <a:extLst>
+                <a:ext uri="{FF2B5EF4-FFF2-40B4-BE49-F238E27FC236}">
+                  <a16:creationId xmlns:a16="http://schemas.microsoft.com/office/drawing/2014/main" id="{C9DC9F2C-3947-924A-8B0E-9DF60EE6293B}"/>
+                </a:ext>
+              </a:extLst>
+            </p:cNvPr>
+            <p:cNvSpPr/>
+            <p:nvPr/>
+          </p:nvSpPr>
+          <p:spPr>
+            <a:xfrm>
+              <a:off x="514161" y="2239964"/>
+              <a:ext cx="300036" cy="300036"/>
+            </a:xfrm>
+            <a:prstGeom prst="ellipse">
+              <a:avLst/>
+            </a:prstGeom>
+            <a:solidFill>
+              <a:schemeClr val="bg1">
+                <a:lumMod val="75000"/>
+              </a:schemeClr>
+            </a:solidFill>
+            <a:ln>
+              <a:noFill/>
+            </a:ln>
+          </p:spPr>
+          <p:style>
+            <a:lnRef idx="2">
+              <a:schemeClr val="accent1">
+                <a:shade val="50000"/>
+              </a:schemeClr>
+            </a:lnRef>
+            <a:fillRef idx="1">
+              <a:schemeClr val="accent1"/>
+            </a:fillRef>
+            <a:effectRef idx="0">
+              <a:schemeClr val="accent1"/>
+            </a:effectRef>
+            <a:fontRef idx="minor">
+              <a:schemeClr val="lt1"/>
+            </a:fontRef>
+          </p:style>
+          <p:txBody>
+            <a:bodyPr rtlCol="0" anchor="ctr"/>
+            <a:lstStyle/>
+            <a:p>
+              <a:pPr algn="ctr"/>
+              <a:endParaRPr kumimoji="1" lang="ja-JP" altLang="en-US" sz="1600">
+                <a:solidFill>
+                  <a:schemeClr val="tx1"/>
+                </a:solidFill>
+              </a:endParaRPr>
+            </a:p>
+          </p:txBody>
+        </p:sp>
+        <p:sp>
+          <p:nvSpPr>
+            <p:cNvPr id="21" name="三角形 20">
+              <a:extLst>
+                <a:ext uri="{FF2B5EF4-FFF2-40B4-BE49-F238E27FC236}">
+                  <a16:creationId xmlns:a16="http://schemas.microsoft.com/office/drawing/2014/main" id="{526B37ED-45DD-064F-BB18-00AC56B4CCA2}"/>
+                </a:ext>
+              </a:extLst>
+            </p:cNvPr>
+            <p:cNvSpPr/>
+            <p:nvPr/>
+          </p:nvSpPr>
+          <p:spPr>
+            <a:xfrm>
+              <a:off x="490159" y="2389982"/>
+              <a:ext cx="348041" cy="300036"/>
+            </a:xfrm>
+            <a:prstGeom prst="triangle">
+              <a:avLst/>
+            </a:prstGeom>
+            <a:solidFill>
+              <a:schemeClr val="bg1">
+                <a:lumMod val="75000"/>
+              </a:schemeClr>
+            </a:solidFill>
+            <a:ln>
+              <a:noFill/>
+            </a:ln>
+          </p:spPr>
+          <p:style>
+            <a:lnRef idx="2">
+              <a:schemeClr val="accent1">
+                <a:shade val="50000"/>
+              </a:schemeClr>
+            </a:lnRef>
+            <a:fillRef idx="1">
+              <a:schemeClr val="accent1"/>
+            </a:fillRef>
+            <a:effectRef idx="0">
+              <a:schemeClr val="accent1"/>
+            </a:effectRef>
+            <a:fontRef idx="minor">
+              <a:schemeClr val="lt1"/>
+            </a:fontRef>
+          </p:style>
+          <p:txBody>
+            <a:bodyPr wrap="none" rtlCol="0" anchor="ctr"/>
+            <a:lstStyle/>
+            <a:p>
+              <a:pPr algn="ctr"/>
+              <a:endParaRPr kumimoji="1" lang="en-US" altLang="ja-JP" sz="1200" dirty="0">
+                <a:solidFill>
+                  <a:schemeClr val="tx1"/>
+                </a:solidFill>
+              </a:endParaRPr>
+            </a:p>
+            <a:p>
+              <a:pPr algn="ctr"/>
+              <a:endParaRPr kumimoji="1" lang="en-US" altLang="ja-JP" sz="1200" dirty="0">
+                <a:solidFill>
+                  <a:schemeClr val="tx1"/>
+                </a:solidFill>
+              </a:endParaRPr>
+            </a:p>
+            <a:p>
+              <a:pPr algn="ctr"/>
+              <a:r>
+                <a:rPr kumimoji="1" lang="en-US" altLang="ja-JP" sz="1200" dirty="0">
+                  <a:solidFill>
+                    <a:schemeClr val="tx1"/>
+                  </a:solidFill>
+                </a:rPr>
+                <a:t>Developer</a:t>
+              </a:r>
+              <a:endParaRPr kumimoji="1" lang="ja-JP" altLang="en-US" sz="1200">
+                <a:solidFill>
+                  <a:schemeClr val="tx1"/>
+                </a:solidFill>
+              </a:endParaRPr>
+            </a:p>
+          </p:txBody>
+        </p:sp>
+      </p:grpSp>
+      <p:sp>
+        <p:nvSpPr>
+          <p:cNvPr id="6" name="正方形/長方形 5">
+            <a:extLst>
+              <a:ext uri="{FF2B5EF4-FFF2-40B4-BE49-F238E27FC236}">
+                <a16:creationId xmlns:a16="http://schemas.microsoft.com/office/drawing/2014/main" id="{9B520C55-8C20-894C-A1A4-37152A9A8B87}"/>
+              </a:ext>
+            </a:extLst>
+          </p:cNvPr>
+          <p:cNvSpPr/>
+          <p:nvPr/>
+        </p:nvSpPr>
+        <p:spPr>
+          <a:xfrm>
+            <a:off x="8788758" y="2140999"/>
+            <a:ext cx="1788513" cy="933731"/>
+          </a:xfrm>
+          <a:prstGeom prst="rect">
+            <a:avLst/>
+          </a:prstGeom>
+          <a:noFill/>
+          <a:ln>
+            <a:solidFill>
+              <a:schemeClr val="tx1"/>
+            </a:solidFill>
+          </a:ln>
+        </p:spPr>
+        <p:style>
+          <a:lnRef idx="2">
+            <a:schemeClr val="accent1">
+              <a:shade val="50000"/>
+            </a:schemeClr>
+          </a:lnRef>
+          <a:fillRef idx="1">
+            <a:schemeClr val="accent1"/>
+          </a:fillRef>
+          <a:effectRef idx="0">
+            <a:schemeClr val="accent1"/>
+          </a:effectRef>
+          <a:fontRef idx="minor">
+            <a:schemeClr val="lt1"/>
+          </a:fontRef>
+        </p:style>
+        <p:txBody>
+          <a:bodyPr rtlCol="0" anchor="t"/>
+          <a:lstStyle/>
+          <a:p>
+            <a:r>
+              <a:rPr kumimoji="1" lang="en-US" altLang="ja-JP" sz="1200" b="1" dirty="0">
+                <a:solidFill>
+                  <a:schemeClr val="tx1"/>
+                </a:solidFill>
+              </a:rPr>
+              <a:t>Solana Cluster</a:t>
+            </a:r>
+          </a:p>
+          <a:p>
+            <a:r>
+              <a:rPr kumimoji="1" lang="en-US" altLang="ja-JP" sz="1200" b="1" dirty="0">
+                <a:solidFill>
+                  <a:schemeClr val="tx1"/>
+                </a:solidFill>
+              </a:rPr>
+              <a:t>(Blockchain)</a:t>
+            </a:r>
+          </a:p>
+          <a:p>
+            <a:endParaRPr kumimoji="1" lang="en-US" altLang="ja-JP" sz="1200" b="1" dirty="0">
+              <a:solidFill>
+                <a:schemeClr val="tx1"/>
+              </a:solidFill>
+            </a:endParaRPr>
+          </a:p>
+          <a:p>
+            <a:r>
+              <a:rPr kumimoji="1" lang="en-US" altLang="ja-JP" sz="1200" dirty="0">
+                <a:solidFill>
+                  <a:schemeClr val="tx1"/>
+                </a:solidFill>
+              </a:rPr>
+              <a:t>ex) Solana </a:t>
+            </a:r>
+            <a:r>
+              <a:rPr kumimoji="1" lang="en-US" altLang="ja-JP" sz="1200" dirty="0" err="1">
+                <a:solidFill>
+                  <a:schemeClr val="tx1"/>
+                </a:solidFill>
+              </a:rPr>
+              <a:t>Mainnet</a:t>
+            </a:r>
+            <a:r>
+              <a:rPr kumimoji="1" lang="en-US" altLang="ja-JP" sz="1200" dirty="0">
+                <a:solidFill>
+                  <a:schemeClr val="tx1"/>
+                </a:solidFill>
+              </a:rPr>
+              <a:t> Beta</a:t>
+            </a:r>
+            <a:endParaRPr kumimoji="1" lang="ja-JP" altLang="en-US" sz="1200">
+              <a:solidFill>
+                <a:schemeClr val="tx1"/>
+              </a:solidFill>
+            </a:endParaRPr>
+          </a:p>
+        </p:txBody>
+      </p:sp>
+      <p:sp>
+        <p:nvSpPr>
+          <p:cNvPr id="7" name="正方形/長方形 6">
+            <a:extLst>
+              <a:ext uri="{FF2B5EF4-FFF2-40B4-BE49-F238E27FC236}">
+                <a16:creationId xmlns:a16="http://schemas.microsoft.com/office/drawing/2014/main" id="{46B27697-0F8F-514F-BA7C-825CE8DF450E}"/>
+              </a:ext>
+            </a:extLst>
+          </p:cNvPr>
+          <p:cNvSpPr/>
+          <p:nvPr/>
+        </p:nvSpPr>
+        <p:spPr>
+          <a:xfrm>
+            <a:off x="8788759" y="3474796"/>
+            <a:ext cx="1788513" cy="933731"/>
+          </a:xfrm>
+          <a:prstGeom prst="rect">
+            <a:avLst/>
+          </a:prstGeom>
+          <a:noFill/>
+          <a:ln>
+            <a:solidFill>
+              <a:schemeClr val="tx1"/>
+            </a:solidFill>
+          </a:ln>
+        </p:spPr>
+        <p:style>
+          <a:lnRef idx="2">
+            <a:schemeClr val="accent1">
+              <a:shade val="50000"/>
+            </a:schemeClr>
+          </a:lnRef>
+          <a:fillRef idx="1">
+            <a:schemeClr val="accent1"/>
+          </a:fillRef>
+          <a:effectRef idx="0">
+            <a:schemeClr val="accent1"/>
+          </a:effectRef>
+          <a:fontRef idx="minor">
+            <a:schemeClr val="lt1"/>
+          </a:fontRef>
+        </p:style>
+        <p:txBody>
+          <a:bodyPr rtlCol="0" anchor="t"/>
+          <a:lstStyle/>
+          <a:p>
+            <a:r>
+              <a:rPr kumimoji="1" lang="en-US" altLang="ja-JP" sz="1200" b="1" dirty="0">
+                <a:solidFill>
+                  <a:schemeClr val="tx1"/>
+                </a:solidFill>
+              </a:rPr>
+              <a:t>IPFS Storage</a:t>
+            </a:r>
+          </a:p>
+          <a:p>
+            <a:endParaRPr kumimoji="1" lang="en-US" altLang="ja-JP" sz="1200" b="1" dirty="0">
+              <a:solidFill>
+                <a:schemeClr val="tx1"/>
+              </a:solidFill>
+            </a:endParaRPr>
+          </a:p>
+          <a:p>
+            <a:r>
+              <a:rPr kumimoji="1" lang="en-US" altLang="ja-JP" sz="1200" dirty="0">
+                <a:solidFill>
+                  <a:schemeClr val="tx1"/>
+                </a:solidFill>
+              </a:rPr>
+              <a:t>ex) </a:t>
+            </a:r>
+            <a:r>
+              <a:rPr kumimoji="1" lang="en-US" altLang="ja-JP" sz="1200" dirty="0" err="1">
+                <a:solidFill>
+                  <a:schemeClr val="tx1"/>
+                </a:solidFill>
+              </a:rPr>
+              <a:t>NFT.Storage</a:t>
+            </a:r>
+            <a:r>
+              <a:rPr kumimoji="1" lang="en-US" altLang="ja-JP" sz="1200" dirty="0">
+                <a:solidFill>
+                  <a:schemeClr val="tx1"/>
+                </a:solidFill>
+              </a:rPr>
+              <a:t>, Pinata Cloud</a:t>
+            </a:r>
+          </a:p>
+        </p:txBody>
+      </p:sp>
+      <p:sp>
+        <p:nvSpPr>
+          <p:cNvPr id="8" name="正方形/長方形 7">
+            <a:extLst>
+              <a:ext uri="{FF2B5EF4-FFF2-40B4-BE49-F238E27FC236}">
+                <a16:creationId xmlns:a16="http://schemas.microsoft.com/office/drawing/2014/main" id="{5BD0F255-547D-4243-80B1-B7CF73F35F8C}"/>
+              </a:ext>
+            </a:extLst>
+          </p:cNvPr>
+          <p:cNvSpPr/>
+          <p:nvPr/>
+        </p:nvSpPr>
+        <p:spPr>
+          <a:xfrm>
+            <a:off x="6554334" y="2143964"/>
+            <a:ext cx="1788513" cy="933731"/>
+          </a:xfrm>
+          <a:prstGeom prst="rect">
+            <a:avLst/>
+          </a:prstGeom>
+          <a:noFill/>
+          <a:ln>
+            <a:solidFill>
+              <a:schemeClr val="tx1"/>
+            </a:solidFill>
+          </a:ln>
+        </p:spPr>
+        <p:style>
+          <a:lnRef idx="2">
+            <a:schemeClr val="accent1">
+              <a:shade val="50000"/>
+            </a:schemeClr>
+          </a:lnRef>
+          <a:fillRef idx="1">
+            <a:schemeClr val="accent1"/>
+          </a:fillRef>
+          <a:effectRef idx="0">
+            <a:schemeClr val="accent1"/>
+          </a:effectRef>
+          <a:fontRef idx="minor">
+            <a:schemeClr val="lt1"/>
+          </a:fontRef>
+        </p:style>
+        <p:txBody>
+          <a:bodyPr rtlCol="0" anchor="t"/>
+          <a:lstStyle/>
+          <a:p>
+            <a:r>
+              <a:rPr kumimoji="1" lang="en-US" altLang="ja-JP" sz="1200" b="1" dirty="0">
+                <a:solidFill>
+                  <a:schemeClr val="tx1"/>
+                </a:solidFill>
+              </a:rPr>
+              <a:t>Frontend</a:t>
+            </a:r>
+          </a:p>
+          <a:p>
+            <a:endParaRPr kumimoji="1" lang="en-US" altLang="ja-JP" sz="1200" b="1" dirty="0">
+              <a:solidFill>
+                <a:schemeClr val="tx1"/>
+              </a:solidFill>
+            </a:endParaRPr>
+          </a:p>
+          <a:p>
+            <a:r>
+              <a:rPr kumimoji="1" lang="en-US" altLang="ja-JP" sz="1200" dirty="0">
+                <a:solidFill>
+                  <a:schemeClr val="tx1"/>
+                </a:solidFill>
+              </a:rPr>
+              <a:t>ex) JS (Solana/Anchor Web3), React, Vue</a:t>
+            </a:r>
+            <a:endParaRPr kumimoji="1" lang="ja-JP" altLang="en-US" sz="1200">
+              <a:solidFill>
+                <a:schemeClr val="tx1"/>
+              </a:solidFill>
+            </a:endParaRPr>
+          </a:p>
+        </p:txBody>
+      </p:sp>
+      <p:sp>
+        <p:nvSpPr>
+          <p:cNvPr id="9" name="正方形/長方形 8">
+            <a:extLst>
+              <a:ext uri="{FF2B5EF4-FFF2-40B4-BE49-F238E27FC236}">
+                <a16:creationId xmlns:a16="http://schemas.microsoft.com/office/drawing/2014/main" id="{8D882191-7DAA-C44A-B78F-C105645615CA}"/>
+              </a:ext>
+            </a:extLst>
+          </p:cNvPr>
+          <p:cNvSpPr/>
+          <p:nvPr/>
+        </p:nvSpPr>
+        <p:spPr>
+          <a:xfrm>
+            <a:off x="4314271" y="3474796"/>
+            <a:ext cx="1788513" cy="933731"/>
+          </a:xfrm>
+          <a:prstGeom prst="rect">
+            <a:avLst/>
+          </a:prstGeom>
+          <a:noFill/>
+          <a:ln>
+            <a:solidFill>
+              <a:schemeClr val="tx1"/>
+            </a:solidFill>
+          </a:ln>
+        </p:spPr>
+        <p:style>
+          <a:lnRef idx="2">
+            <a:schemeClr val="accent1">
+              <a:shade val="50000"/>
+            </a:schemeClr>
+          </a:lnRef>
+          <a:fillRef idx="1">
+            <a:schemeClr val="accent1"/>
+          </a:fillRef>
+          <a:effectRef idx="0">
+            <a:schemeClr val="accent1"/>
+          </a:effectRef>
+          <a:fontRef idx="minor">
+            <a:schemeClr val="lt1"/>
+          </a:fontRef>
+        </p:style>
+        <p:txBody>
+          <a:bodyPr rtlCol="0" anchor="t"/>
+          <a:lstStyle/>
+          <a:p>
+            <a:r>
+              <a:rPr kumimoji="1" lang="en-US" altLang="ja-JP" sz="1200" b="1" dirty="0">
+                <a:solidFill>
+                  <a:schemeClr val="tx1"/>
+                </a:solidFill>
+              </a:rPr>
+              <a:t>Backend</a:t>
+            </a:r>
+          </a:p>
+          <a:p>
+            <a:endParaRPr kumimoji="1" lang="en-US" altLang="ja-JP" sz="1200" b="1" dirty="0">
+              <a:solidFill>
+                <a:schemeClr val="tx1"/>
+              </a:solidFill>
+            </a:endParaRPr>
+          </a:p>
+          <a:p>
+            <a:r>
+              <a:rPr kumimoji="1" lang="en-US" altLang="ja-JP" sz="1200" dirty="0">
+                <a:solidFill>
+                  <a:schemeClr val="tx1"/>
+                </a:solidFill>
+              </a:rPr>
+              <a:t>ex) Ruby on Rails, PHP, Python</a:t>
+            </a:r>
+            <a:endParaRPr kumimoji="1" lang="ja-JP" altLang="en-US" sz="1200">
+              <a:solidFill>
+                <a:schemeClr val="tx1"/>
+              </a:solidFill>
+            </a:endParaRPr>
+          </a:p>
+        </p:txBody>
+      </p:sp>
+      <p:sp>
+        <p:nvSpPr>
+          <p:cNvPr id="10" name="正方形/長方形 9">
+            <a:extLst>
+              <a:ext uri="{FF2B5EF4-FFF2-40B4-BE49-F238E27FC236}">
+                <a16:creationId xmlns:a16="http://schemas.microsoft.com/office/drawing/2014/main" id="{376FC0B0-CF17-D845-B24F-AA3BB6A4F9C9}"/>
+              </a:ext>
+            </a:extLst>
+          </p:cNvPr>
+          <p:cNvSpPr/>
+          <p:nvPr/>
+        </p:nvSpPr>
+        <p:spPr>
+          <a:xfrm>
+            <a:off x="8788758" y="818310"/>
+            <a:ext cx="1788513" cy="933731"/>
+          </a:xfrm>
+          <a:prstGeom prst="rect">
+            <a:avLst/>
+          </a:prstGeom>
+          <a:noFill/>
+          <a:ln>
+            <a:solidFill>
+              <a:schemeClr val="tx1"/>
+            </a:solidFill>
+          </a:ln>
+        </p:spPr>
+        <p:style>
+          <a:lnRef idx="2">
+            <a:schemeClr val="accent1">
+              <a:shade val="50000"/>
+            </a:schemeClr>
+          </a:lnRef>
+          <a:fillRef idx="1">
+            <a:schemeClr val="accent1"/>
+          </a:fillRef>
+          <a:effectRef idx="0">
+            <a:schemeClr val="accent1"/>
+          </a:effectRef>
+          <a:fontRef idx="minor">
+            <a:schemeClr val="lt1"/>
+          </a:fontRef>
+        </p:style>
+        <p:txBody>
+          <a:bodyPr rtlCol="0" anchor="t"/>
+          <a:lstStyle/>
+          <a:p>
+            <a:r>
+              <a:rPr kumimoji="1" lang="en-US" altLang="ja-JP" sz="1200" b="1" dirty="0">
+                <a:solidFill>
+                  <a:schemeClr val="tx1"/>
+                </a:solidFill>
+              </a:rPr>
+              <a:t>Security Check</a:t>
+            </a:r>
+          </a:p>
+          <a:p>
+            <a:endParaRPr kumimoji="1" lang="en-US" altLang="ja-JP" sz="1200" b="1" dirty="0">
+              <a:solidFill>
+                <a:schemeClr val="tx1"/>
+              </a:solidFill>
+            </a:endParaRPr>
+          </a:p>
+          <a:p>
+            <a:r>
+              <a:rPr kumimoji="1" lang="en-US" altLang="ja-JP" sz="1200" dirty="0">
+                <a:solidFill>
+                  <a:schemeClr val="tx1"/>
+                </a:solidFill>
+              </a:rPr>
+              <a:t>ex) </a:t>
+            </a:r>
+            <a:r>
+              <a:rPr kumimoji="1" lang="en-US" altLang="ja-JP" sz="1200" dirty="0" err="1">
+                <a:solidFill>
+                  <a:schemeClr val="tx1"/>
+                </a:solidFill>
+              </a:rPr>
+              <a:t>Certik</a:t>
+            </a:r>
+            <a:endParaRPr kumimoji="1" lang="en-US" altLang="ja-JP" sz="1200" dirty="0">
+              <a:solidFill>
+                <a:schemeClr val="tx1"/>
+              </a:solidFill>
+            </a:endParaRPr>
+          </a:p>
+        </p:txBody>
+      </p:sp>
+      <p:sp>
+        <p:nvSpPr>
+          <p:cNvPr id="16" name="正方形/長方形 15">
+            <a:extLst>
+              <a:ext uri="{FF2B5EF4-FFF2-40B4-BE49-F238E27FC236}">
+                <a16:creationId xmlns:a16="http://schemas.microsoft.com/office/drawing/2014/main" id="{ABFD7B9B-2C35-0844-BAAB-AB107AF85A12}"/>
+              </a:ext>
+            </a:extLst>
+          </p:cNvPr>
+          <p:cNvSpPr/>
+          <p:nvPr/>
+        </p:nvSpPr>
+        <p:spPr>
+          <a:xfrm>
+            <a:off x="2077027" y="3455933"/>
+            <a:ext cx="1788513" cy="933731"/>
+          </a:xfrm>
+          <a:prstGeom prst="rect">
+            <a:avLst/>
+          </a:prstGeom>
+          <a:noFill/>
+          <a:ln>
+            <a:solidFill>
+              <a:schemeClr val="tx1"/>
+            </a:solidFill>
+          </a:ln>
+        </p:spPr>
+        <p:style>
+          <a:lnRef idx="2">
+            <a:schemeClr val="accent1">
+              <a:shade val="50000"/>
+            </a:schemeClr>
+          </a:lnRef>
+          <a:fillRef idx="1">
+            <a:schemeClr val="accent1"/>
+          </a:fillRef>
+          <a:effectRef idx="0">
+            <a:schemeClr val="accent1"/>
+          </a:effectRef>
+          <a:fontRef idx="minor">
+            <a:schemeClr val="lt1"/>
+          </a:fontRef>
+        </p:style>
+        <p:txBody>
+          <a:bodyPr rtlCol="0" anchor="t"/>
+          <a:lstStyle/>
+          <a:p>
+            <a:r>
+              <a:rPr kumimoji="1" lang="en-US" altLang="ja-JP" sz="1200" b="1" dirty="0">
+                <a:solidFill>
+                  <a:schemeClr val="tx1"/>
+                </a:solidFill>
+              </a:rPr>
+              <a:t>Market Prices/Analytics</a:t>
+            </a:r>
+          </a:p>
+          <a:p>
+            <a:endParaRPr kumimoji="1" lang="en-US" altLang="ja-JP" sz="1200" b="1" dirty="0">
+              <a:solidFill>
+                <a:schemeClr val="tx1"/>
+              </a:solidFill>
+            </a:endParaRPr>
+          </a:p>
+          <a:p>
+            <a:r>
+              <a:rPr kumimoji="1" lang="en-US" altLang="ja-JP" sz="1200" dirty="0">
+                <a:solidFill>
+                  <a:schemeClr val="tx1"/>
+                </a:solidFill>
+              </a:rPr>
+              <a:t>ex) </a:t>
+            </a:r>
+            <a:r>
+              <a:rPr kumimoji="1" lang="en-US" altLang="ja-JP" sz="1200" dirty="0" err="1">
+                <a:solidFill>
+                  <a:schemeClr val="tx1"/>
+                </a:solidFill>
+              </a:rPr>
+              <a:t>CoinMarketCap</a:t>
+            </a:r>
+            <a:r>
+              <a:rPr kumimoji="1" lang="en-US" altLang="ja-JP" sz="1200" dirty="0">
+                <a:solidFill>
+                  <a:schemeClr val="tx1"/>
+                </a:solidFill>
+              </a:rPr>
+              <a:t>, </a:t>
+            </a:r>
+            <a:r>
+              <a:rPr kumimoji="1" lang="en-US" altLang="ja-JP" sz="1200" dirty="0" err="1">
+                <a:solidFill>
+                  <a:schemeClr val="tx1"/>
+                </a:solidFill>
+              </a:rPr>
+              <a:t>CoinGecko</a:t>
+            </a:r>
+            <a:r>
+              <a:rPr kumimoji="1" lang="en-US" altLang="ja-JP" sz="1200" dirty="0">
+                <a:solidFill>
+                  <a:schemeClr val="tx1"/>
+                </a:solidFill>
+              </a:rPr>
+              <a:t>, </a:t>
+            </a:r>
+            <a:r>
+              <a:rPr kumimoji="1" lang="en-US" altLang="ja-JP" sz="1200" dirty="0" err="1">
+                <a:solidFill>
+                  <a:schemeClr val="tx1"/>
+                </a:solidFill>
+              </a:rPr>
+              <a:t>DefiLlama</a:t>
+            </a:r>
+            <a:endParaRPr kumimoji="1" lang="en-US" altLang="ja-JP" sz="1200" dirty="0">
+              <a:solidFill>
+                <a:schemeClr val="tx1"/>
+              </a:solidFill>
+            </a:endParaRPr>
+          </a:p>
+        </p:txBody>
+      </p:sp>
+      <p:sp>
+        <p:nvSpPr>
+          <p:cNvPr id="17" name="正方形/長方形 16">
+            <a:extLst>
+              <a:ext uri="{FF2B5EF4-FFF2-40B4-BE49-F238E27FC236}">
+                <a16:creationId xmlns:a16="http://schemas.microsoft.com/office/drawing/2014/main" id="{408FB114-7357-BE4E-B3E7-80E4F644A17C}"/>
+              </a:ext>
+            </a:extLst>
+          </p:cNvPr>
+          <p:cNvSpPr/>
+          <p:nvPr/>
+        </p:nvSpPr>
+        <p:spPr>
+          <a:xfrm>
+            <a:off x="4314271" y="818310"/>
+            <a:ext cx="1788513" cy="933731"/>
+          </a:xfrm>
+          <a:prstGeom prst="rect">
+            <a:avLst/>
+          </a:prstGeom>
+          <a:noFill/>
+          <a:ln>
+            <a:solidFill>
+              <a:schemeClr val="tx1"/>
+            </a:solidFill>
+          </a:ln>
+        </p:spPr>
+        <p:style>
+          <a:lnRef idx="2">
+            <a:schemeClr val="accent1">
+              <a:shade val="50000"/>
+            </a:schemeClr>
+          </a:lnRef>
+          <a:fillRef idx="1">
+            <a:schemeClr val="accent1"/>
+          </a:fillRef>
+          <a:effectRef idx="0">
+            <a:schemeClr val="accent1"/>
+          </a:effectRef>
+          <a:fontRef idx="minor">
+            <a:schemeClr val="lt1"/>
+          </a:fontRef>
+        </p:style>
+        <p:txBody>
+          <a:bodyPr rtlCol="0" anchor="t"/>
+          <a:lstStyle/>
+          <a:p>
+            <a:r>
+              <a:rPr kumimoji="1" lang="en-US" altLang="ja-JP" sz="1200" b="1" dirty="0">
+                <a:solidFill>
+                  <a:schemeClr val="tx1"/>
+                </a:solidFill>
+              </a:rPr>
+              <a:t>Web Analytics</a:t>
+            </a:r>
+          </a:p>
+          <a:p>
+            <a:endParaRPr kumimoji="1" lang="en-US" altLang="ja-JP" sz="1200" b="1" dirty="0">
+              <a:solidFill>
+                <a:schemeClr val="tx1"/>
+              </a:solidFill>
+            </a:endParaRPr>
+          </a:p>
+          <a:p>
+            <a:r>
+              <a:rPr kumimoji="1" lang="en-US" altLang="ja-JP" sz="1200" dirty="0">
+                <a:solidFill>
+                  <a:schemeClr val="tx1"/>
+                </a:solidFill>
+              </a:rPr>
+              <a:t>ex) Google Analytics</a:t>
+            </a:r>
+          </a:p>
+        </p:txBody>
+      </p:sp>
+      <p:sp>
+        <p:nvSpPr>
+          <p:cNvPr id="22" name="正方形/長方形 21">
+            <a:extLst>
+              <a:ext uri="{FF2B5EF4-FFF2-40B4-BE49-F238E27FC236}">
+                <a16:creationId xmlns:a16="http://schemas.microsoft.com/office/drawing/2014/main" id="{69E1A7FD-FDBE-6F4F-B95F-EC815E30F536}"/>
+              </a:ext>
+            </a:extLst>
+          </p:cNvPr>
+          <p:cNvSpPr/>
+          <p:nvPr/>
+        </p:nvSpPr>
+        <p:spPr>
+          <a:xfrm>
+            <a:off x="2077028" y="818310"/>
+            <a:ext cx="1788513" cy="933731"/>
+          </a:xfrm>
+          <a:prstGeom prst="rect">
+            <a:avLst/>
+          </a:prstGeom>
+          <a:noFill/>
+          <a:ln>
+            <a:solidFill>
+              <a:schemeClr val="tx1"/>
+            </a:solidFill>
+          </a:ln>
+        </p:spPr>
+        <p:style>
+          <a:lnRef idx="2">
+            <a:schemeClr val="accent1">
+              <a:shade val="50000"/>
+            </a:schemeClr>
+          </a:lnRef>
+          <a:fillRef idx="1">
+            <a:schemeClr val="accent1"/>
+          </a:fillRef>
+          <a:effectRef idx="0">
+            <a:schemeClr val="accent1"/>
+          </a:effectRef>
+          <a:fontRef idx="minor">
+            <a:schemeClr val="lt1"/>
+          </a:fontRef>
+        </p:style>
+        <p:txBody>
+          <a:bodyPr rtlCol="0" anchor="t"/>
+          <a:lstStyle/>
+          <a:p>
+            <a:r>
+              <a:rPr kumimoji="1" lang="en-US" altLang="ja-JP" sz="1200" b="1" dirty="0">
+                <a:solidFill>
+                  <a:schemeClr val="tx1"/>
+                </a:solidFill>
+              </a:rPr>
+              <a:t>UI/UX Improvement</a:t>
+            </a:r>
+          </a:p>
+          <a:p>
+            <a:endParaRPr kumimoji="1" lang="en-US" altLang="ja-JP" sz="1200" b="1" dirty="0">
+              <a:solidFill>
+                <a:schemeClr val="tx1"/>
+              </a:solidFill>
+            </a:endParaRPr>
+          </a:p>
+          <a:p>
+            <a:r>
+              <a:rPr kumimoji="1" lang="en-US" altLang="ja-JP" sz="1200" dirty="0">
+                <a:solidFill>
+                  <a:schemeClr val="tx1"/>
+                </a:solidFill>
+              </a:rPr>
+              <a:t>ex) The Graph</a:t>
+            </a:r>
+          </a:p>
+        </p:txBody>
+      </p:sp>
+      <p:sp>
+        <p:nvSpPr>
+          <p:cNvPr id="25" name="テキスト ボックス 24">
+            <a:extLst>
+              <a:ext uri="{FF2B5EF4-FFF2-40B4-BE49-F238E27FC236}">
+                <a16:creationId xmlns:a16="http://schemas.microsoft.com/office/drawing/2014/main" id="{CC53FFAA-6687-4B49-9B50-899181A0D5AA}"/>
+              </a:ext>
+            </a:extLst>
+          </p:cNvPr>
+          <p:cNvSpPr txBox="1"/>
+          <p:nvPr/>
+        </p:nvSpPr>
+        <p:spPr>
+          <a:xfrm>
+            <a:off x="9072419" y="4594863"/>
+            <a:ext cx="1762137" cy="276999"/>
+          </a:xfrm>
+          <a:prstGeom prst="rect">
+            <a:avLst/>
+          </a:prstGeom>
+          <a:noFill/>
+        </p:spPr>
+        <p:txBody>
+          <a:bodyPr wrap="square" rtlCol="0">
+            <a:spAutoFit/>
+          </a:bodyPr>
+          <a:lstStyle/>
+          <a:p>
+            <a:r>
+              <a:rPr kumimoji="1" lang="en-US" altLang="ja-JP" sz="1200" dirty="0"/>
+              <a:t>Deploy Solana Programs</a:t>
+            </a:r>
+          </a:p>
+        </p:txBody>
+      </p:sp>
+      <p:sp>
+        <p:nvSpPr>
+          <p:cNvPr id="26" name="フリーフォーム 25">
+            <a:extLst>
+              <a:ext uri="{FF2B5EF4-FFF2-40B4-BE49-F238E27FC236}">
+                <a16:creationId xmlns:a16="http://schemas.microsoft.com/office/drawing/2014/main" id="{67B216BA-D93A-AC49-8FE8-126A44195EEF}"/>
+              </a:ext>
+            </a:extLst>
+          </p:cNvPr>
+          <p:cNvSpPr/>
+          <p:nvPr/>
+        </p:nvSpPr>
+        <p:spPr>
+          <a:xfrm>
+            <a:off x="5166912" y="1744673"/>
+            <a:ext cx="1381783" cy="530577"/>
+          </a:xfrm>
+          <a:custGeom>
+            <a:avLst/>
+            <a:gdLst>
+              <a:gd name="connsiteX0" fmla="*/ 0 w 1365955"/>
+              <a:gd name="connsiteY0" fmla="*/ 0 h 530577"/>
+              <a:gd name="connsiteX1" fmla="*/ 0 w 1365955"/>
+              <a:gd name="connsiteY1" fmla="*/ 530577 h 530577"/>
+              <a:gd name="connsiteX2" fmla="*/ 1365955 w 1365955"/>
+              <a:gd name="connsiteY2" fmla="*/ 530577 h 530577"/>
+            </a:gdLst>
+            <a:ahLst/>
+            <a:cxnLst>
+              <a:cxn ang="0">
+                <a:pos x="connsiteX0" y="connsiteY0"/>
+              </a:cxn>
+              <a:cxn ang="0">
+                <a:pos x="connsiteX1" y="connsiteY1"/>
+              </a:cxn>
+              <a:cxn ang="0">
+                <a:pos x="connsiteX2" y="connsiteY2"/>
+              </a:cxn>
+            </a:cxnLst>
+            <a:rect l="l" t="t" r="r" b="b"/>
+            <a:pathLst>
+              <a:path w="1365955" h="530577">
+                <a:moveTo>
+                  <a:pt x="0" y="0"/>
+                </a:moveTo>
+                <a:lnTo>
+                  <a:pt x="0" y="530577"/>
+                </a:lnTo>
+                <a:lnTo>
+                  <a:pt x="1365955" y="530577"/>
+                </a:lnTo>
+              </a:path>
+            </a:pathLst>
+          </a:custGeom>
+          <a:noFill/>
+          <a:ln>
+            <a:solidFill>
+              <a:schemeClr val="tx1"/>
+            </a:solidFill>
+            <a:headEnd type="none" w="med" len="med"/>
+            <a:tailEnd type="arrow" w="med" len="med"/>
+          </a:ln>
+        </p:spPr>
+        <p:style>
+          <a:lnRef idx="2">
+            <a:schemeClr val="accent1">
+              <a:shade val="50000"/>
+            </a:schemeClr>
+          </a:lnRef>
+          <a:fillRef idx="1">
+            <a:schemeClr val="accent1"/>
+          </a:fillRef>
+          <a:effectRef idx="0">
+            <a:schemeClr val="accent1"/>
+          </a:effectRef>
+          <a:fontRef idx="minor">
+            <a:schemeClr val="lt1"/>
+          </a:fontRef>
+        </p:style>
+        <p:txBody>
+          <a:bodyPr rtlCol="0" anchor="ctr"/>
+          <a:lstStyle/>
+          <a:p>
+            <a:pPr algn="ctr"/>
+            <a:endParaRPr kumimoji="1" lang="ja-JP" altLang="en-US"/>
+          </a:p>
+        </p:txBody>
+      </p:sp>
+      <p:sp>
+        <p:nvSpPr>
+          <p:cNvPr id="27" name="フリーフォーム 26">
+            <a:extLst>
+              <a:ext uri="{FF2B5EF4-FFF2-40B4-BE49-F238E27FC236}">
+                <a16:creationId xmlns:a16="http://schemas.microsoft.com/office/drawing/2014/main" id="{A84E36C0-8CE8-1644-A92C-DB3203D2894C}"/>
+              </a:ext>
+            </a:extLst>
+          </p:cNvPr>
+          <p:cNvSpPr/>
+          <p:nvPr/>
+        </p:nvSpPr>
+        <p:spPr>
+          <a:xfrm>
+            <a:off x="2830113" y="1744673"/>
+            <a:ext cx="3724222" cy="696776"/>
+          </a:xfrm>
+          <a:custGeom>
+            <a:avLst/>
+            <a:gdLst>
+              <a:gd name="connsiteX0" fmla="*/ 0 w 1365955"/>
+              <a:gd name="connsiteY0" fmla="*/ 0 h 530577"/>
+              <a:gd name="connsiteX1" fmla="*/ 0 w 1365955"/>
+              <a:gd name="connsiteY1" fmla="*/ 530577 h 530577"/>
+              <a:gd name="connsiteX2" fmla="*/ 1365955 w 1365955"/>
+              <a:gd name="connsiteY2" fmla="*/ 530577 h 530577"/>
+            </a:gdLst>
+            <a:ahLst/>
+            <a:cxnLst>
+              <a:cxn ang="0">
+                <a:pos x="connsiteX0" y="connsiteY0"/>
+              </a:cxn>
+              <a:cxn ang="0">
+                <a:pos x="connsiteX1" y="connsiteY1"/>
+              </a:cxn>
+              <a:cxn ang="0">
+                <a:pos x="connsiteX2" y="connsiteY2"/>
+              </a:cxn>
+            </a:cxnLst>
+            <a:rect l="l" t="t" r="r" b="b"/>
+            <a:pathLst>
+              <a:path w="1365955" h="530577">
+                <a:moveTo>
+                  <a:pt x="0" y="0"/>
+                </a:moveTo>
+                <a:lnTo>
+                  <a:pt x="0" y="530577"/>
+                </a:lnTo>
+                <a:lnTo>
+                  <a:pt x="1365955" y="530577"/>
+                </a:lnTo>
+              </a:path>
+            </a:pathLst>
+          </a:custGeom>
+          <a:noFill/>
+          <a:ln>
+            <a:solidFill>
+              <a:schemeClr val="tx1"/>
+            </a:solidFill>
+            <a:headEnd type="arrow" w="med" len="med"/>
+            <a:tailEnd type="none" w="med" len="med"/>
+          </a:ln>
+        </p:spPr>
+        <p:style>
+          <a:lnRef idx="2">
+            <a:schemeClr val="accent1">
+              <a:shade val="50000"/>
+            </a:schemeClr>
+          </a:lnRef>
+          <a:fillRef idx="1">
+            <a:schemeClr val="accent1"/>
+          </a:fillRef>
+          <a:effectRef idx="0">
+            <a:schemeClr val="accent1"/>
+          </a:effectRef>
+          <a:fontRef idx="minor">
+            <a:schemeClr val="lt1"/>
+          </a:fontRef>
+        </p:style>
+        <p:txBody>
+          <a:bodyPr rtlCol="0" anchor="ctr"/>
+          <a:lstStyle/>
+          <a:p>
+            <a:pPr algn="ctr"/>
+            <a:endParaRPr kumimoji="1" lang="ja-JP" altLang="en-US"/>
+          </a:p>
+        </p:txBody>
+      </p:sp>
+      <p:sp>
+        <p:nvSpPr>
+          <p:cNvPr id="28" name="フリーフォーム 27">
+            <a:extLst>
+              <a:ext uri="{FF2B5EF4-FFF2-40B4-BE49-F238E27FC236}">
+                <a16:creationId xmlns:a16="http://schemas.microsoft.com/office/drawing/2014/main" id="{7B7C8492-25A3-9E4B-99AD-83C4F41AE782}"/>
+              </a:ext>
+            </a:extLst>
+          </p:cNvPr>
+          <p:cNvSpPr/>
+          <p:nvPr/>
+        </p:nvSpPr>
+        <p:spPr>
+          <a:xfrm flipV="1">
+            <a:off x="5166912" y="2944219"/>
+            <a:ext cx="1381783" cy="530577"/>
+          </a:xfrm>
+          <a:custGeom>
+            <a:avLst/>
+            <a:gdLst>
+              <a:gd name="connsiteX0" fmla="*/ 0 w 1365955"/>
+              <a:gd name="connsiteY0" fmla="*/ 0 h 530577"/>
+              <a:gd name="connsiteX1" fmla="*/ 0 w 1365955"/>
+              <a:gd name="connsiteY1" fmla="*/ 530577 h 530577"/>
+              <a:gd name="connsiteX2" fmla="*/ 1365955 w 1365955"/>
+              <a:gd name="connsiteY2" fmla="*/ 530577 h 530577"/>
+            </a:gdLst>
+            <a:ahLst/>
+            <a:cxnLst>
+              <a:cxn ang="0">
+                <a:pos x="connsiteX0" y="connsiteY0"/>
+              </a:cxn>
+              <a:cxn ang="0">
+                <a:pos x="connsiteX1" y="connsiteY1"/>
+              </a:cxn>
+              <a:cxn ang="0">
+                <a:pos x="connsiteX2" y="connsiteY2"/>
+              </a:cxn>
+            </a:cxnLst>
+            <a:rect l="l" t="t" r="r" b="b"/>
+            <a:pathLst>
+              <a:path w="1365955" h="530577">
+                <a:moveTo>
+                  <a:pt x="0" y="0"/>
+                </a:moveTo>
+                <a:lnTo>
+                  <a:pt x="0" y="530577"/>
+                </a:lnTo>
+                <a:lnTo>
+                  <a:pt x="1365955" y="530577"/>
+                </a:lnTo>
+              </a:path>
+            </a:pathLst>
+          </a:custGeom>
+          <a:noFill/>
+          <a:ln>
+            <a:solidFill>
+              <a:schemeClr val="tx1"/>
+            </a:solidFill>
+            <a:headEnd type="arrow" w="med" len="med"/>
+            <a:tailEnd type="arrow" w="med" len="med"/>
+          </a:ln>
+        </p:spPr>
+        <p:style>
+          <a:lnRef idx="2">
+            <a:schemeClr val="accent1">
+              <a:shade val="50000"/>
+            </a:schemeClr>
+          </a:lnRef>
+          <a:fillRef idx="1">
+            <a:schemeClr val="accent1"/>
+          </a:fillRef>
+          <a:effectRef idx="0">
+            <a:schemeClr val="accent1"/>
+          </a:effectRef>
+          <a:fontRef idx="minor">
+            <a:schemeClr val="lt1"/>
+          </a:fontRef>
+        </p:style>
+        <p:txBody>
+          <a:bodyPr rtlCol="0" anchor="ctr"/>
+          <a:lstStyle/>
+          <a:p>
+            <a:pPr algn="ctr"/>
+            <a:endParaRPr kumimoji="1" lang="ja-JP" altLang="en-US"/>
+          </a:p>
+        </p:txBody>
+      </p:sp>
+      <p:sp>
+        <p:nvSpPr>
+          <p:cNvPr id="29" name="フリーフォーム 28">
+            <a:extLst>
+              <a:ext uri="{FF2B5EF4-FFF2-40B4-BE49-F238E27FC236}">
+                <a16:creationId xmlns:a16="http://schemas.microsoft.com/office/drawing/2014/main" id="{942E7C27-A8FB-234F-B546-E2FD62BB3D01}"/>
+              </a:ext>
+            </a:extLst>
+          </p:cNvPr>
+          <p:cNvSpPr/>
+          <p:nvPr/>
+        </p:nvSpPr>
+        <p:spPr>
+          <a:xfrm flipV="1">
+            <a:off x="2830113" y="2762294"/>
+            <a:ext cx="3724222" cy="696776"/>
+          </a:xfrm>
+          <a:custGeom>
+            <a:avLst/>
+            <a:gdLst>
+              <a:gd name="connsiteX0" fmla="*/ 0 w 1365955"/>
+              <a:gd name="connsiteY0" fmla="*/ 0 h 530577"/>
+              <a:gd name="connsiteX1" fmla="*/ 0 w 1365955"/>
+              <a:gd name="connsiteY1" fmla="*/ 530577 h 530577"/>
+              <a:gd name="connsiteX2" fmla="*/ 1365955 w 1365955"/>
+              <a:gd name="connsiteY2" fmla="*/ 530577 h 530577"/>
+            </a:gdLst>
+            <a:ahLst/>
+            <a:cxnLst>
+              <a:cxn ang="0">
+                <a:pos x="connsiteX0" y="connsiteY0"/>
+              </a:cxn>
+              <a:cxn ang="0">
+                <a:pos x="connsiteX1" y="connsiteY1"/>
+              </a:cxn>
+              <a:cxn ang="0">
+                <a:pos x="connsiteX2" y="connsiteY2"/>
+              </a:cxn>
+            </a:cxnLst>
+            <a:rect l="l" t="t" r="r" b="b"/>
+            <a:pathLst>
+              <a:path w="1365955" h="530577">
+                <a:moveTo>
+                  <a:pt x="0" y="0"/>
+                </a:moveTo>
+                <a:lnTo>
+                  <a:pt x="0" y="530577"/>
+                </a:lnTo>
+                <a:lnTo>
+                  <a:pt x="1365955" y="530577"/>
+                </a:lnTo>
+              </a:path>
+            </a:pathLst>
+          </a:custGeom>
+          <a:noFill/>
+          <a:ln>
+            <a:solidFill>
+              <a:schemeClr val="tx1"/>
+            </a:solidFill>
+            <a:headEnd type="arrow" w="med" len="med"/>
+            <a:tailEnd type="none" w="med" len="med"/>
+          </a:ln>
+        </p:spPr>
+        <p:style>
+          <a:lnRef idx="2">
+            <a:schemeClr val="accent1">
+              <a:shade val="50000"/>
+            </a:schemeClr>
+          </a:lnRef>
+          <a:fillRef idx="1">
+            <a:schemeClr val="accent1"/>
+          </a:fillRef>
+          <a:effectRef idx="0">
+            <a:schemeClr val="accent1"/>
+          </a:effectRef>
+          <a:fontRef idx="minor">
+            <a:schemeClr val="lt1"/>
+          </a:fontRef>
+        </p:style>
+        <p:txBody>
+          <a:bodyPr rtlCol="0" anchor="ctr"/>
+          <a:lstStyle/>
+          <a:p>
+            <a:pPr algn="ctr"/>
+            <a:endParaRPr kumimoji="1" lang="ja-JP" altLang="en-US"/>
+          </a:p>
+        </p:txBody>
+      </p:sp>
+      <p:sp>
+        <p:nvSpPr>
+          <p:cNvPr id="30" name="テキスト ボックス 29">
+            <a:extLst>
+              <a:ext uri="{FF2B5EF4-FFF2-40B4-BE49-F238E27FC236}">
+                <a16:creationId xmlns:a16="http://schemas.microsoft.com/office/drawing/2014/main" id="{BF6818FA-E851-1E46-B877-3B40A1342B7F}"/>
+              </a:ext>
+            </a:extLst>
+          </p:cNvPr>
+          <p:cNvSpPr txBox="1"/>
+          <p:nvPr/>
+        </p:nvSpPr>
+        <p:spPr>
+          <a:xfrm>
+            <a:off x="5328256" y="1857629"/>
+            <a:ext cx="1059093" cy="276999"/>
+          </a:xfrm>
+          <a:prstGeom prst="rect">
+            <a:avLst/>
+          </a:prstGeom>
+          <a:noFill/>
+        </p:spPr>
+        <p:txBody>
+          <a:bodyPr wrap="square" rtlCol="0">
+            <a:spAutoFit/>
+          </a:bodyPr>
+          <a:lstStyle/>
+          <a:p>
+            <a:r>
+              <a:rPr kumimoji="1" lang="en-US" altLang="ja-JP" sz="1200" dirty="0"/>
+              <a:t>Read</a:t>
+            </a:r>
+            <a:endParaRPr kumimoji="1" lang="ja-JP" altLang="en-US" sz="1200"/>
+          </a:p>
+        </p:txBody>
+      </p:sp>
+      <p:sp>
+        <p:nvSpPr>
+          <p:cNvPr id="31" name="テキスト ボックス 30">
+            <a:extLst>
+              <a:ext uri="{FF2B5EF4-FFF2-40B4-BE49-F238E27FC236}">
+                <a16:creationId xmlns:a16="http://schemas.microsoft.com/office/drawing/2014/main" id="{9FAC6B58-3663-FB4C-969F-B2CAAB0A2260}"/>
+              </a:ext>
+            </a:extLst>
+          </p:cNvPr>
+          <p:cNvSpPr txBox="1"/>
+          <p:nvPr/>
+        </p:nvSpPr>
+        <p:spPr>
+          <a:xfrm>
+            <a:off x="5328256" y="3042963"/>
+            <a:ext cx="1059093" cy="276999"/>
+          </a:xfrm>
+          <a:prstGeom prst="rect">
+            <a:avLst/>
+          </a:prstGeom>
+          <a:noFill/>
+        </p:spPr>
+        <p:txBody>
+          <a:bodyPr wrap="square" rtlCol="0">
+            <a:spAutoFit/>
+          </a:bodyPr>
+          <a:lstStyle/>
+          <a:p>
+            <a:r>
+              <a:rPr kumimoji="1" lang="en-US" altLang="ja-JP" sz="1200" dirty="0"/>
+              <a:t>Read/Write</a:t>
+            </a:r>
+            <a:endParaRPr kumimoji="1" lang="ja-JP" altLang="en-US" sz="1200"/>
+          </a:p>
+        </p:txBody>
+      </p:sp>
+      <p:sp>
+        <p:nvSpPr>
+          <p:cNvPr id="32" name="テキスト ボックス 31">
+            <a:extLst>
+              <a:ext uri="{FF2B5EF4-FFF2-40B4-BE49-F238E27FC236}">
+                <a16:creationId xmlns:a16="http://schemas.microsoft.com/office/drawing/2014/main" id="{15AD56B4-9535-B248-AF38-235AF84CAA49}"/>
+              </a:ext>
+            </a:extLst>
+          </p:cNvPr>
+          <p:cNvSpPr txBox="1"/>
+          <p:nvPr/>
+        </p:nvSpPr>
+        <p:spPr>
+          <a:xfrm>
+            <a:off x="3032221" y="1857629"/>
+            <a:ext cx="1059093" cy="276999"/>
+          </a:xfrm>
+          <a:prstGeom prst="rect">
+            <a:avLst/>
+          </a:prstGeom>
+          <a:noFill/>
+        </p:spPr>
+        <p:txBody>
+          <a:bodyPr wrap="square" rtlCol="0">
+            <a:spAutoFit/>
+          </a:bodyPr>
+          <a:lstStyle/>
+          <a:p>
+            <a:r>
+              <a:rPr kumimoji="1" lang="en-US" altLang="ja-JP" sz="1200" dirty="0"/>
+              <a:t>Read</a:t>
+            </a:r>
+            <a:endParaRPr kumimoji="1" lang="ja-JP" altLang="en-US" sz="1200"/>
+          </a:p>
+        </p:txBody>
+      </p:sp>
+      <p:sp>
+        <p:nvSpPr>
+          <p:cNvPr id="33" name="テキスト ボックス 32">
+            <a:extLst>
+              <a:ext uri="{FF2B5EF4-FFF2-40B4-BE49-F238E27FC236}">
+                <a16:creationId xmlns:a16="http://schemas.microsoft.com/office/drawing/2014/main" id="{B39F1665-97BE-FA4A-8E2C-D8731DE867BB}"/>
+              </a:ext>
+            </a:extLst>
+          </p:cNvPr>
+          <p:cNvSpPr txBox="1"/>
+          <p:nvPr/>
+        </p:nvSpPr>
+        <p:spPr>
+          <a:xfrm>
+            <a:off x="3032221" y="3042962"/>
+            <a:ext cx="1059093" cy="276999"/>
+          </a:xfrm>
+          <a:prstGeom prst="rect">
+            <a:avLst/>
+          </a:prstGeom>
+          <a:noFill/>
+        </p:spPr>
+        <p:txBody>
+          <a:bodyPr wrap="square" rtlCol="0">
+            <a:spAutoFit/>
+          </a:bodyPr>
+          <a:lstStyle/>
+          <a:p>
+            <a:r>
+              <a:rPr kumimoji="1" lang="en-US" altLang="ja-JP" sz="1200" dirty="0"/>
+              <a:t>Read</a:t>
+            </a:r>
+            <a:endParaRPr kumimoji="1" lang="ja-JP" altLang="en-US" sz="1200"/>
+          </a:p>
+        </p:txBody>
+      </p:sp>
+      <p:cxnSp>
+        <p:nvCxnSpPr>
+          <p:cNvPr id="35" name="直線矢印コネクタ 34">
+            <a:extLst>
+              <a:ext uri="{FF2B5EF4-FFF2-40B4-BE49-F238E27FC236}">
+                <a16:creationId xmlns:a16="http://schemas.microsoft.com/office/drawing/2014/main" id="{F4320851-533F-1646-B6A9-2492603297D1}"/>
+              </a:ext>
+            </a:extLst>
+          </p:cNvPr>
+          <p:cNvCxnSpPr>
+            <a:stCxn id="8" idx="3"/>
+            <a:endCxn id="6" idx="1"/>
+          </p:cNvCxnSpPr>
+          <p:nvPr/>
+        </p:nvCxnSpPr>
+        <p:spPr>
+          <a:xfrm flipV="1">
+            <a:off x="8342847" y="2607865"/>
+            <a:ext cx="445911" cy="2965"/>
+          </a:xfrm>
+          <a:prstGeom prst="straightConnector1">
+            <a:avLst/>
+          </a:prstGeom>
+          <a:ln w="9525">
+            <a:solidFill>
+              <a:schemeClr val="tx1"/>
+            </a:solidFill>
+            <a:headEnd type="none" w="med" len="med"/>
+            <a:tailEnd type="arrow" w="med" len="med"/>
+          </a:ln>
+        </p:spPr>
+        <p:style>
+          <a:lnRef idx="1">
+            <a:schemeClr val="accent1"/>
+          </a:lnRef>
+          <a:fillRef idx="0">
+            <a:schemeClr val="accent1"/>
+          </a:fillRef>
+          <a:effectRef idx="0">
+            <a:schemeClr val="accent1"/>
+          </a:effectRef>
+          <a:fontRef idx="minor">
+            <a:schemeClr val="tx1"/>
+          </a:fontRef>
+        </p:style>
+      </p:cxnSp>
+      <p:sp>
+        <p:nvSpPr>
+          <p:cNvPr id="36" name="テキスト ボックス 35">
+            <a:extLst>
+              <a:ext uri="{FF2B5EF4-FFF2-40B4-BE49-F238E27FC236}">
+                <a16:creationId xmlns:a16="http://schemas.microsoft.com/office/drawing/2014/main" id="{A4367297-3B22-1F44-960D-858604C80859}"/>
+              </a:ext>
+            </a:extLst>
+          </p:cNvPr>
+          <p:cNvSpPr txBox="1"/>
+          <p:nvPr/>
+        </p:nvSpPr>
+        <p:spPr>
+          <a:xfrm>
+            <a:off x="8036255" y="1857629"/>
+            <a:ext cx="1059093" cy="276999"/>
+          </a:xfrm>
+          <a:prstGeom prst="rect">
+            <a:avLst/>
+          </a:prstGeom>
+          <a:noFill/>
+        </p:spPr>
+        <p:txBody>
+          <a:bodyPr wrap="square" rtlCol="0">
+            <a:spAutoFit/>
+          </a:bodyPr>
+          <a:lstStyle/>
+          <a:p>
+            <a:pPr algn="ctr"/>
+            <a:r>
+              <a:rPr kumimoji="1" lang="en-US" altLang="ja-JP" sz="1200" dirty="0"/>
+              <a:t>Write</a:t>
+            </a:r>
+            <a:endParaRPr kumimoji="1" lang="ja-JP" altLang="en-US" sz="1200"/>
+          </a:p>
+        </p:txBody>
+      </p:sp>
+      <p:cxnSp>
+        <p:nvCxnSpPr>
+          <p:cNvPr id="37" name="直線矢印コネクタ 36">
+            <a:extLst>
+              <a:ext uri="{FF2B5EF4-FFF2-40B4-BE49-F238E27FC236}">
+                <a16:creationId xmlns:a16="http://schemas.microsoft.com/office/drawing/2014/main" id="{3FC636CF-710A-9D47-BBCC-888F9865663E}"/>
+              </a:ext>
+            </a:extLst>
+          </p:cNvPr>
+          <p:cNvCxnSpPr>
+            <a:cxnSpLocks/>
+            <a:stCxn id="14" idx="3"/>
+            <a:endCxn id="8" idx="1"/>
+          </p:cNvCxnSpPr>
+          <p:nvPr/>
+        </p:nvCxnSpPr>
+        <p:spPr>
+          <a:xfrm flipV="1">
+            <a:off x="1716914" y="2610830"/>
+            <a:ext cx="4837420" cy="26652"/>
+          </a:xfrm>
+          <a:prstGeom prst="straightConnector1">
+            <a:avLst/>
+          </a:prstGeom>
+          <a:ln w="9525">
+            <a:solidFill>
+              <a:schemeClr val="tx1"/>
+            </a:solidFill>
+            <a:headEnd type="none" w="med" len="med"/>
+            <a:tailEnd type="arrow" w="med" len="med"/>
+          </a:ln>
+        </p:spPr>
+        <p:style>
+          <a:lnRef idx="1">
+            <a:schemeClr val="accent1"/>
+          </a:lnRef>
+          <a:fillRef idx="0">
+            <a:schemeClr val="accent1"/>
+          </a:fillRef>
+          <a:effectRef idx="0">
+            <a:schemeClr val="accent1"/>
+          </a:effectRef>
+          <a:fontRef idx="minor">
+            <a:schemeClr val="tx1"/>
+          </a:fontRef>
+        </p:style>
+      </p:cxnSp>
+      <p:sp>
+        <p:nvSpPr>
+          <p:cNvPr id="40" name="テキスト ボックス 39">
+            <a:extLst>
+              <a:ext uri="{FF2B5EF4-FFF2-40B4-BE49-F238E27FC236}">
+                <a16:creationId xmlns:a16="http://schemas.microsoft.com/office/drawing/2014/main" id="{41F47871-FEE0-9448-A6E0-7BBF5533F890}"/>
+              </a:ext>
+            </a:extLst>
+          </p:cNvPr>
+          <p:cNvSpPr txBox="1"/>
+          <p:nvPr/>
+        </p:nvSpPr>
+        <p:spPr>
+          <a:xfrm>
+            <a:off x="1716914" y="2218906"/>
+            <a:ext cx="1059093" cy="276999"/>
+          </a:xfrm>
+          <a:prstGeom prst="rect">
+            <a:avLst/>
+          </a:prstGeom>
+          <a:noFill/>
+        </p:spPr>
+        <p:txBody>
+          <a:bodyPr wrap="square" rtlCol="0">
+            <a:spAutoFit/>
+          </a:bodyPr>
+          <a:lstStyle/>
+          <a:p>
+            <a:r>
+              <a:rPr kumimoji="1" lang="en-US" altLang="ja-JP" sz="1200" dirty="0"/>
+              <a:t>Send/</a:t>
+            </a:r>
+            <a:r>
+              <a:rPr kumimoji="1" lang="en-US" altLang="ja-JP" sz="1200" dirty="0" err="1"/>
+              <a:t>Recieve</a:t>
+            </a:r>
+            <a:endParaRPr kumimoji="1" lang="ja-JP" altLang="en-US" sz="1200"/>
+          </a:p>
+        </p:txBody>
+      </p:sp>
+      <p:sp>
+        <p:nvSpPr>
+          <p:cNvPr id="41" name="フリーフォーム 40">
+            <a:extLst>
+              <a:ext uri="{FF2B5EF4-FFF2-40B4-BE49-F238E27FC236}">
+                <a16:creationId xmlns:a16="http://schemas.microsoft.com/office/drawing/2014/main" id="{A600AB6C-3A12-7246-9F3C-11BC8AB9B5CE}"/>
+              </a:ext>
+            </a:extLst>
+          </p:cNvPr>
+          <p:cNvSpPr/>
+          <p:nvPr/>
+        </p:nvSpPr>
+        <p:spPr>
+          <a:xfrm flipV="1">
+            <a:off x="7756152" y="1277033"/>
+            <a:ext cx="1038246" cy="851516"/>
+          </a:xfrm>
+          <a:custGeom>
+            <a:avLst/>
+            <a:gdLst>
+              <a:gd name="connsiteX0" fmla="*/ 0 w 1365955"/>
+              <a:gd name="connsiteY0" fmla="*/ 0 h 530577"/>
+              <a:gd name="connsiteX1" fmla="*/ 0 w 1365955"/>
+              <a:gd name="connsiteY1" fmla="*/ 530577 h 530577"/>
+              <a:gd name="connsiteX2" fmla="*/ 1365955 w 1365955"/>
+              <a:gd name="connsiteY2" fmla="*/ 530577 h 530577"/>
+            </a:gdLst>
+            <a:ahLst/>
+            <a:cxnLst>
+              <a:cxn ang="0">
+                <a:pos x="connsiteX0" y="connsiteY0"/>
+              </a:cxn>
+              <a:cxn ang="0">
+                <a:pos x="connsiteX1" y="connsiteY1"/>
+              </a:cxn>
+              <a:cxn ang="0">
+                <a:pos x="connsiteX2" y="connsiteY2"/>
+              </a:cxn>
+            </a:cxnLst>
+            <a:rect l="l" t="t" r="r" b="b"/>
+            <a:pathLst>
+              <a:path w="1365955" h="530577">
+                <a:moveTo>
+                  <a:pt x="0" y="0"/>
+                </a:moveTo>
+                <a:lnTo>
+                  <a:pt x="0" y="530577"/>
+                </a:lnTo>
+                <a:lnTo>
+                  <a:pt x="1365955" y="530577"/>
+                </a:lnTo>
+              </a:path>
+            </a:pathLst>
+          </a:custGeom>
+          <a:noFill/>
+          <a:ln>
+            <a:solidFill>
+              <a:schemeClr val="tx1"/>
+            </a:solidFill>
+            <a:headEnd type="arrow" w="med" len="med"/>
+            <a:tailEnd type="none" w="med" len="med"/>
+          </a:ln>
+        </p:spPr>
+        <p:style>
+          <a:lnRef idx="2">
+            <a:schemeClr val="accent1">
+              <a:shade val="50000"/>
+            </a:schemeClr>
+          </a:lnRef>
+          <a:fillRef idx="1">
+            <a:schemeClr val="accent1"/>
+          </a:fillRef>
+          <a:effectRef idx="0">
+            <a:schemeClr val="accent1"/>
+          </a:effectRef>
+          <a:fontRef idx="minor">
+            <a:schemeClr val="lt1"/>
+          </a:fontRef>
+        </p:style>
+        <p:txBody>
+          <a:bodyPr rtlCol="0" anchor="ctr"/>
+          <a:lstStyle/>
+          <a:p>
+            <a:pPr algn="ctr"/>
+            <a:endParaRPr kumimoji="1" lang="ja-JP" altLang="en-US"/>
+          </a:p>
+        </p:txBody>
+      </p:sp>
+      <p:sp>
+        <p:nvSpPr>
+          <p:cNvPr id="42" name="テキスト ボックス 41">
+            <a:extLst>
+              <a:ext uri="{FF2B5EF4-FFF2-40B4-BE49-F238E27FC236}">
+                <a16:creationId xmlns:a16="http://schemas.microsoft.com/office/drawing/2014/main" id="{79ACEB0C-4C02-884B-9F16-6B2D23734C8E}"/>
+              </a:ext>
+            </a:extLst>
+          </p:cNvPr>
+          <p:cNvSpPr txBox="1"/>
+          <p:nvPr/>
+        </p:nvSpPr>
+        <p:spPr>
+          <a:xfrm>
+            <a:off x="8036255" y="818310"/>
+            <a:ext cx="1059093" cy="276999"/>
+          </a:xfrm>
+          <a:prstGeom prst="rect">
+            <a:avLst/>
+          </a:prstGeom>
+          <a:noFill/>
+        </p:spPr>
+        <p:txBody>
+          <a:bodyPr wrap="square" rtlCol="0">
+            <a:spAutoFit/>
+          </a:bodyPr>
+          <a:lstStyle/>
+          <a:p>
+            <a:pPr algn="ctr"/>
+            <a:r>
+              <a:rPr kumimoji="1" lang="en-US" altLang="ja-JP" sz="1200" dirty="0"/>
+              <a:t>Read</a:t>
+            </a:r>
+            <a:endParaRPr kumimoji="1" lang="ja-JP" altLang="en-US" sz="1200"/>
+          </a:p>
+        </p:txBody>
+      </p:sp>
+      <p:sp>
+        <p:nvSpPr>
+          <p:cNvPr id="43" name="フリーフォーム 42">
+            <a:extLst>
+              <a:ext uri="{FF2B5EF4-FFF2-40B4-BE49-F238E27FC236}">
+                <a16:creationId xmlns:a16="http://schemas.microsoft.com/office/drawing/2014/main" id="{37CA76A8-B14A-1741-AFC7-9C7C40184A52}"/>
+              </a:ext>
+            </a:extLst>
+          </p:cNvPr>
+          <p:cNvSpPr/>
+          <p:nvPr/>
+        </p:nvSpPr>
+        <p:spPr>
+          <a:xfrm>
+            <a:off x="7756152" y="3071282"/>
+            <a:ext cx="1038246" cy="851516"/>
+          </a:xfrm>
+          <a:custGeom>
+            <a:avLst/>
+            <a:gdLst>
+              <a:gd name="connsiteX0" fmla="*/ 0 w 1365955"/>
+              <a:gd name="connsiteY0" fmla="*/ 0 h 530577"/>
+              <a:gd name="connsiteX1" fmla="*/ 0 w 1365955"/>
+              <a:gd name="connsiteY1" fmla="*/ 530577 h 530577"/>
+              <a:gd name="connsiteX2" fmla="*/ 1365955 w 1365955"/>
+              <a:gd name="connsiteY2" fmla="*/ 530577 h 530577"/>
+            </a:gdLst>
+            <a:ahLst/>
+            <a:cxnLst>
+              <a:cxn ang="0">
+                <a:pos x="connsiteX0" y="connsiteY0"/>
+              </a:cxn>
+              <a:cxn ang="0">
+                <a:pos x="connsiteX1" y="connsiteY1"/>
+              </a:cxn>
+              <a:cxn ang="0">
+                <a:pos x="connsiteX2" y="connsiteY2"/>
+              </a:cxn>
+            </a:cxnLst>
+            <a:rect l="l" t="t" r="r" b="b"/>
+            <a:pathLst>
+              <a:path w="1365955" h="530577">
+                <a:moveTo>
+                  <a:pt x="0" y="0"/>
+                </a:moveTo>
+                <a:lnTo>
+                  <a:pt x="0" y="530577"/>
+                </a:lnTo>
+                <a:lnTo>
+                  <a:pt x="1365955" y="530577"/>
+                </a:lnTo>
+              </a:path>
+            </a:pathLst>
+          </a:custGeom>
+          <a:noFill/>
+          <a:ln>
+            <a:solidFill>
+              <a:schemeClr val="tx1"/>
+            </a:solidFill>
+            <a:headEnd type="none" w="med" len="med"/>
+            <a:tailEnd type="arrow" w="med" len="med"/>
+          </a:ln>
+        </p:spPr>
+        <p:style>
+          <a:lnRef idx="2">
+            <a:schemeClr val="accent1">
+              <a:shade val="50000"/>
+            </a:schemeClr>
+          </a:lnRef>
+          <a:fillRef idx="1">
+            <a:schemeClr val="accent1"/>
+          </a:fillRef>
+          <a:effectRef idx="0">
+            <a:schemeClr val="accent1"/>
+          </a:effectRef>
+          <a:fontRef idx="minor">
+            <a:schemeClr val="lt1"/>
+          </a:fontRef>
+        </p:style>
+        <p:txBody>
+          <a:bodyPr rtlCol="0" anchor="ctr"/>
+          <a:lstStyle/>
+          <a:p>
+            <a:pPr algn="ctr"/>
+            <a:endParaRPr kumimoji="1" lang="ja-JP" altLang="en-US"/>
+          </a:p>
+        </p:txBody>
+      </p:sp>
+      <p:sp>
+        <p:nvSpPr>
+          <p:cNvPr id="44" name="テキスト ボックス 43">
+            <a:extLst>
+              <a:ext uri="{FF2B5EF4-FFF2-40B4-BE49-F238E27FC236}">
+                <a16:creationId xmlns:a16="http://schemas.microsoft.com/office/drawing/2014/main" id="{B764D03D-4F20-034D-AB9A-ADC13650B8DE}"/>
+              </a:ext>
+            </a:extLst>
+          </p:cNvPr>
+          <p:cNvSpPr txBox="1"/>
+          <p:nvPr/>
+        </p:nvSpPr>
+        <p:spPr>
+          <a:xfrm>
+            <a:off x="8036255" y="3463034"/>
+            <a:ext cx="1059093" cy="276999"/>
+          </a:xfrm>
+          <a:prstGeom prst="rect">
+            <a:avLst/>
+          </a:prstGeom>
+          <a:noFill/>
+        </p:spPr>
+        <p:txBody>
+          <a:bodyPr wrap="square" rtlCol="0">
+            <a:spAutoFit/>
+          </a:bodyPr>
+          <a:lstStyle/>
+          <a:p>
+            <a:pPr algn="ctr"/>
+            <a:r>
+              <a:rPr kumimoji="1" lang="en-US" altLang="ja-JP" sz="1200" dirty="0"/>
+              <a:t>Write</a:t>
+            </a:r>
+            <a:endParaRPr kumimoji="1" lang="ja-JP" altLang="en-US" sz="1200"/>
+          </a:p>
+        </p:txBody>
+      </p:sp>
+      <p:sp>
+        <p:nvSpPr>
+          <p:cNvPr id="56" name="フリーフォーム 55">
+            <a:extLst>
+              <a:ext uri="{FF2B5EF4-FFF2-40B4-BE49-F238E27FC236}">
+                <a16:creationId xmlns:a16="http://schemas.microsoft.com/office/drawing/2014/main" id="{B29A11F9-9C57-8C41-BC39-B8DFDCDDEF14}"/>
+              </a:ext>
+            </a:extLst>
+          </p:cNvPr>
+          <p:cNvSpPr/>
+          <p:nvPr/>
+        </p:nvSpPr>
+        <p:spPr>
+          <a:xfrm rot="10800000">
+            <a:off x="10566143" y="2352611"/>
+            <a:ext cx="908589" cy="2548935"/>
+          </a:xfrm>
+          <a:custGeom>
+            <a:avLst/>
+            <a:gdLst>
+              <a:gd name="connsiteX0" fmla="*/ 0 w 1365955"/>
+              <a:gd name="connsiteY0" fmla="*/ 0 h 530577"/>
+              <a:gd name="connsiteX1" fmla="*/ 0 w 1365955"/>
+              <a:gd name="connsiteY1" fmla="*/ 530577 h 530577"/>
+              <a:gd name="connsiteX2" fmla="*/ 1365955 w 1365955"/>
+              <a:gd name="connsiteY2" fmla="*/ 530577 h 530577"/>
+            </a:gdLst>
+            <a:ahLst/>
+            <a:cxnLst>
+              <a:cxn ang="0">
+                <a:pos x="connsiteX0" y="connsiteY0"/>
+              </a:cxn>
+              <a:cxn ang="0">
+                <a:pos x="connsiteX1" y="connsiteY1"/>
+              </a:cxn>
+              <a:cxn ang="0">
+                <a:pos x="connsiteX2" y="connsiteY2"/>
+              </a:cxn>
+            </a:cxnLst>
+            <a:rect l="l" t="t" r="r" b="b"/>
+            <a:pathLst>
+              <a:path w="1365955" h="530577">
+                <a:moveTo>
+                  <a:pt x="0" y="0"/>
+                </a:moveTo>
+                <a:lnTo>
+                  <a:pt x="0" y="530577"/>
+                </a:lnTo>
+                <a:lnTo>
+                  <a:pt x="1365955" y="530577"/>
+                </a:lnTo>
+              </a:path>
+            </a:pathLst>
+          </a:custGeom>
+          <a:noFill/>
+          <a:ln>
+            <a:solidFill>
+              <a:schemeClr val="tx1"/>
+            </a:solidFill>
+            <a:headEnd type="none" w="med" len="med"/>
+            <a:tailEnd type="arrow" w="med" len="med"/>
+          </a:ln>
+        </p:spPr>
+        <p:style>
+          <a:lnRef idx="2">
+            <a:schemeClr val="accent1">
+              <a:shade val="50000"/>
+            </a:schemeClr>
+          </a:lnRef>
+          <a:fillRef idx="1">
+            <a:schemeClr val="accent1"/>
+          </a:fillRef>
+          <a:effectRef idx="0">
+            <a:schemeClr val="accent1"/>
+          </a:effectRef>
+          <a:fontRef idx="minor">
+            <a:schemeClr val="lt1"/>
+          </a:fontRef>
+        </p:style>
+        <p:txBody>
+          <a:bodyPr rtlCol="0" anchor="ctr"/>
+          <a:lstStyle/>
+          <a:p>
+            <a:pPr algn="ctr"/>
+            <a:endParaRPr kumimoji="1" lang="ja-JP" altLang="en-US"/>
+          </a:p>
+        </p:txBody>
+      </p:sp>
+      <p:sp>
+        <p:nvSpPr>
+          <p:cNvPr id="58" name="テキスト ボックス 57">
+            <a:extLst>
+              <a:ext uri="{FF2B5EF4-FFF2-40B4-BE49-F238E27FC236}">
+                <a16:creationId xmlns:a16="http://schemas.microsoft.com/office/drawing/2014/main" id="{5FF2CD93-63E9-FA44-8FCC-823DF5BDA98C}"/>
+              </a:ext>
+            </a:extLst>
+          </p:cNvPr>
+          <p:cNvSpPr txBox="1"/>
+          <p:nvPr/>
+        </p:nvSpPr>
+        <p:spPr>
+          <a:xfrm>
+            <a:off x="10555724" y="1857629"/>
+            <a:ext cx="1059093" cy="276999"/>
+          </a:xfrm>
+          <a:prstGeom prst="rect">
+            <a:avLst/>
+          </a:prstGeom>
+          <a:noFill/>
+        </p:spPr>
+        <p:txBody>
+          <a:bodyPr wrap="square" rtlCol="0">
+            <a:spAutoFit/>
+          </a:bodyPr>
+          <a:lstStyle/>
+          <a:p>
+            <a:pPr algn="ctr"/>
+            <a:r>
+              <a:rPr kumimoji="1" lang="en-US" altLang="ja-JP" sz="1200" dirty="0"/>
+              <a:t>Mint</a:t>
+            </a:r>
+            <a:endParaRPr kumimoji="1" lang="ja-JP" altLang="en-US" sz="1200"/>
+          </a:p>
+        </p:txBody>
+      </p:sp>
+      <p:sp>
+        <p:nvSpPr>
+          <p:cNvPr id="59" name="フリーフォーム 58">
+            <a:extLst>
+              <a:ext uri="{FF2B5EF4-FFF2-40B4-BE49-F238E27FC236}">
+                <a16:creationId xmlns:a16="http://schemas.microsoft.com/office/drawing/2014/main" id="{4584A906-5BF6-9143-A827-A8A9790CA4CF}"/>
+              </a:ext>
+            </a:extLst>
+          </p:cNvPr>
+          <p:cNvSpPr/>
+          <p:nvPr/>
+        </p:nvSpPr>
+        <p:spPr>
+          <a:xfrm rot="10800000">
+            <a:off x="10577269" y="2860608"/>
+            <a:ext cx="233283" cy="2040937"/>
+          </a:xfrm>
+          <a:custGeom>
+            <a:avLst/>
+            <a:gdLst>
+              <a:gd name="connsiteX0" fmla="*/ 0 w 1365955"/>
+              <a:gd name="connsiteY0" fmla="*/ 0 h 530577"/>
+              <a:gd name="connsiteX1" fmla="*/ 0 w 1365955"/>
+              <a:gd name="connsiteY1" fmla="*/ 530577 h 530577"/>
+              <a:gd name="connsiteX2" fmla="*/ 1365955 w 1365955"/>
+              <a:gd name="connsiteY2" fmla="*/ 530577 h 530577"/>
+            </a:gdLst>
+            <a:ahLst/>
+            <a:cxnLst>
+              <a:cxn ang="0">
+                <a:pos x="connsiteX0" y="connsiteY0"/>
+              </a:cxn>
+              <a:cxn ang="0">
+                <a:pos x="connsiteX1" y="connsiteY1"/>
+              </a:cxn>
+              <a:cxn ang="0">
+                <a:pos x="connsiteX2" y="connsiteY2"/>
+              </a:cxn>
+            </a:cxnLst>
+            <a:rect l="l" t="t" r="r" b="b"/>
+            <a:pathLst>
+              <a:path w="1365955" h="530577">
+                <a:moveTo>
+                  <a:pt x="0" y="0"/>
+                </a:moveTo>
+                <a:lnTo>
+                  <a:pt x="0" y="530577"/>
+                </a:lnTo>
+                <a:lnTo>
+                  <a:pt x="1365955" y="530577"/>
+                </a:lnTo>
+              </a:path>
+            </a:pathLst>
+          </a:custGeom>
+          <a:noFill/>
+          <a:ln>
+            <a:solidFill>
+              <a:schemeClr val="tx1"/>
+            </a:solidFill>
+            <a:headEnd type="none" w="med" len="med"/>
+            <a:tailEnd type="arrow" w="med" len="med"/>
+          </a:ln>
+        </p:spPr>
+        <p:style>
+          <a:lnRef idx="2">
+            <a:schemeClr val="accent1">
+              <a:shade val="50000"/>
+            </a:schemeClr>
+          </a:lnRef>
+          <a:fillRef idx="1">
+            <a:schemeClr val="accent1"/>
+          </a:fillRef>
+          <a:effectRef idx="0">
+            <a:schemeClr val="accent1"/>
+          </a:effectRef>
+          <a:fontRef idx="minor">
+            <a:schemeClr val="lt1"/>
+          </a:fontRef>
+        </p:style>
+        <p:txBody>
+          <a:bodyPr rtlCol="0" anchor="ctr"/>
+          <a:lstStyle/>
+          <a:p>
+            <a:pPr algn="ctr"/>
+            <a:endParaRPr kumimoji="1" lang="ja-JP" altLang="en-US"/>
+          </a:p>
+        </p:txBody>
+      </p:sp>
+      <p:sp>
+        <p:nvSpPr>
+          <p:cNvPr id="60" name="フリーフォーム 59">
+            <a:extLst>
+              <a:ext uri="{FF2B5EF4-FFF2-40B4-BE49-F238E27FC236}">
+                <a16:creationId xmlns:a16="http://schemas.microsoft.com/office/drawing/2014/main" id="{D6175A75-3CC3-894B-8607-953FDDDD081A}"/>
+              </a:ext>
+            </a:extLst>
+          </p:cNvPr>
+          <p:cNvSpPr/>
+          <p:nvPr/>
+        </p:nvSpPr>
+        <p:spPr>
+          <a:xfrm>
+            <a:off x="5166911" y="4408528"/>
+            <a:ext cx="4743296" cy="930202"/>
+          </a:xfrm>
+          <a:custGeom>
+            <a:avLst/>
+            <a:gdLst>
+              <a:gd name="connsiteX0" fmla="*/ 0 w 1365955"/>
+              <a:gd name="connsiteY0" fmla="*/ 0 h 530577"/>
+              <a:gd name="connsiteX1" fmla="*/ 0 w 1365955"/>
+              <a:gd name="connsiteY1" fmla="*/ 530577 h 530577"/>
+              <a:gd name="connsiteX2" fmla="*/ 1365955 w 1365955"/>
+              <a:gd name="connsiteY2" fmla="*/ 530577 h 530577"/>
+            </a:gdLst>
+            <a:ahLst/>
+            <a:cxnLst>
+              <a:cxn ang="0">
+                <a:pos x="connsiteX0" y="connsiteY0"/>
+              </a:cxn>
+              <a:cxn ang="0">
+                <a:pos x="connsiteX1" y="connsiteY1"/>
+              </a:cxn>
+              <a:cxn ang="0">
+                <a:pos x="connsiteX2" y="connsiteY2"/>
+              </a:cxn>
+            </a:cxnLst>
+            <a:rect l="l" t="t" r="r" b="b"/>
+            <a:pathLst>
+              <a:path w="1365955" h="530577">
+                <a:moveTo>
+                  <a:pt x="0" y="0"/>
+                </a:moveTo>
+                <a:lnTo>
+                  <a:pt x="0" y="530577"/>
+                </a:lnTo>
+                <a:lnTo>
+                  <a:pt x="1365955" y="530577"/>
+                </a:lnTo>
+              </a:path>
+            </a:pathLst>
+          </a:custGeom>
+          <a:noFill/>
+          <a:ln>
+            <a:solidFill>
+              <a:schemeClr val="tx1"/>
+            </a:solidFill>
+            <a:headEnd type="arrow" w="med" len="med"/>
+            <a:tailEnd type="none" w="med" len="med"/>
+          </a:ln>
+        </p:spPr>
+        <p:style>
+          <a:lnRef idx="2">
+            <a:schemeClr val="accent1">
+              <a:shade val="50000"/>
+            </a:schemeClr>
+          </a:lnRef>
+          <a:fillRef idx="1">
+            <a:schemeClr val="accent1"/>
+          </a:fillRef>
+          <a:effectRef idx="0">
+            <a:schemeClr val="accent1"/>
+          </a:effectRef>
+          <a:fontRef idx="minor">
+            <a:schemeClr val="lt1"/>
+          </a:fontRef>
+        </p:style>
+        <p:txBody>
+          <a:bodyPr rtlCol="0" anchor="ctr"/>
+          <a:lstStyle/>
+          <a:p>
+            <a:pPr algn="ctr"/>
+            <a:endParaRPr kumimoji="1" lang="ja-JP" altLang="en-US"/>
+          </a:p>
+        </p:txBody>
+      </p:sp>
+      <p:sp>
+        <p:nvSpPr>
+          <p:cNvPr id="61" name="テキスト ボックス 60">
+            <a:extLst>
+              <a:ext uri="{FF2B5EF4-FFF2-40B4-BE49-F238E27FC236}">
+                <a16:creationId xmlns:a16="http://schemas.microsoft.com/office/drawing/2014/main" id="{7E4DE582-B9F7-B74F-9925-74992F3630D6}"/>
+              </a:ext>
+            </a:extLst>
+          </p:cNvPr>
+          <p:cNvSpPr txBox="1"/>
+          <p:nvPr/>
+        </p:nvSpPr>
+        <p:spPr>
+          <a:xfrm>
+            <a:off x="5328256" y="4757616"/>
+            <a:ext cx="2080687" cy="276999"/>
+          </a:xfrm>
+          <a:prstGeom prst="rect">
+            <a:avLst/>
+          </a:prstGeom>
+          <a:noFill/>
+        </p:spPr>
+        <p:txBody>
+          <a:bodyPr wrap="square" rtlCol="0">
+            <a:spAutoFit/>
+          </a:bodyPr>
+          <a:lstStyle/>
+          <a:p>
+            <a:r>
+              <a:rPr kumimoji="1" lang="en-US" altLang="ja-JP" sz="1200" dirty="0"/>
+              <a:t>Deploy Files</a:t>
+            </a:r>
+            <a:endParaRPr kumimoji="1" lang="ja-JP" altLang="en-US" sz="1200"/>
+          </a:p>
+        </p:txBody>
+      </p:sp>
+      <p:sp>
+        <p:nvSpPr>
+          <p:cNvPr id="63" name="角丸四角形 62">
+            <a:extLst>
+              <a:ext uri="{FF2B5EF4-FFF2-40B4-BE49-F238E27FC236}">
+                <a16:creationId xmlns:a16="http://schemas.microsoft.com/office/drawing/2014/main" id="{A6EBC820-EA0A-BB4C-B09E-57CA9958BF34}"/>
+              </a:ext>
+            </a:extLst>
+          </p:cNvPr>
+          <p:cNvSpPr/>
+          <p:nvPr/>
+        </p:nvSpPr>
+        <p:spPr>
+          <a:xfrm>
+            <a:off x="9910207" y="4901547"/>
+            <a:ext cx="980314" cy="867600"/>
+          </a:xfrm>
+          <a:prstGeom prst="roundRect">
+            <a:avLst/>
+          </a:prstGeom>
+          <a:noFill/>
+          <a:ln>
+            <a:solidFill>
+              <a:schemeClr val="tx1"/>
+            </a:solidFill>
+          </a:ln>
+        </p:spPr>
+        <p:style>
+          <a:lnRef idx="2">
+            <a:schemeClr val="accent1">
+              <a:shade val="50000"/>
+            </a:schemeClr>
+          </a:lnRef>
+          <a:fillRef idx="1">
+            <a:schemeClr val="accent1"/>
+          </a:fillRef>
+          <a:effectRef idx="0">
+            <a:schemeClr val="accent1"/>
+          </a:effectRef>
+          <a:fontRef idx="minor">
+            <a:schemeClr val="lt1"/>
+          </a:fontRef>
+        </p:style>
+        <p:txBody>
+          <a:bodyPr rtlCol="0" anchor="t"/>
+          <a:lstStyle/>
+          <a:p>
+            <a:r>
+              <a:rPr kumimoji="1" lang="en-US" altLang="ja-JP" sz="1200" b="1" dirty="0">
+                <a:solidFill>
+                  <a:schemeClr val="tx1"/>
+                </a:solidFill>
+              </a:rPr>
+              <a:t>Develop</a:t>
+            </a:r>
+          </a:p>
+          <a:p>
+            <a:r>
+              <a:rPr kumimoji="1" lang="en-US" altLang="ja-JP" sz="1200" dirty="0">
+                <a:solidFill>
+                  <a:schemeClr val="tx1"/>
+                </a:solidFill>
+              </a:rPr>
+              <a:t>ex) Solana CLI, Rust, Anchor</a:t>
+            </a:r>
+            <a:endParaRPr kumimoji="1" lang="ja-JP" altLang="en-US" sz="1200">
+              <a:solidFill>
+                <a:schemeClr val="tx1"/>
+              </a:solidFill>
+            </a:endParaRPr>
+          </a:p>
+        </p:txBody>
+      </p:sp>
+      <p:sp>
+        <p:nvSpPr>
+          <p:cNvPr id="65" name="角丸四角形 64">
+            <a:extLst>
+              <a:ext uri="{FF2B5EF4-FFF2-40B4-BE49-F238E27FC236}">
+                <a16:creationId xmlns:a16="http://schemas.microsoft.com/office/drawing/2014/main" id="{1F40A375-F1A1-FB43-AE9B-AA734FADC17E}"/>
+              </a:ext>
+            </a:extLst>
+          </p:cNvPr>
+          <p:cNvSpPr/>
+          <p:nvPr/>
+        </p:nvSpPr>
+        <p:spPr>
+          <a:xfrm>
+            <a:off x="11039576" y="4901548"/>
+            <a:ext cx="980314" cy="867475"/>
+          </a:xfrm>
+          <a:prstGeom prst="roundRect">
+            <a:avLst/>
+          </a:prstGeom>
+          <a:noFill/>
+          <a:ln>
+            <a:solidFill>
+              <a:schemeClr val="tx1"/>
+            </a:solidFill>
+          </a:ln>
+        </p:spPr>
+        <p:style>
+          <a:lnRef idx="2">
+            <a:schemeClr val="accent1">
+              <a:shade val="50000"/>
+            </a:schemeClr>
+          </a:lnRef>
+          <a:fillRef idx="1">
+            <a:schemeClr val="accent1"/>
+          </a:fillRef>
+          <a:effectRef idx="0">
+            <a:schemeClr val="accent1"/>
+          </a:effectRef>
+          <a:fontRef idx="minor">
+            <a:schemeClr val="lt1"/>
+          </a:fontRef>
+        </p:style>
+        <p:txBody>
+          <a:bodyPr rtlCol="0" anchor="t"/>
+          <a:lstStyle/>
+          <a:p>
+            <a:r>
+              <a:rPr kumimoji="1" lang="en-US" altLang="ja-JP" sz="1200" b="1" dirty="0">
+                <a:solidFill>
+                  <a:schemeClr val="tx1"/>
+                </a:solidFill>
+              </a:rPr>
+              <a:t>Wallet</a:t>
+            </a:r>
+          </a:p>
+          <a:p>
+            <a:endParaRPr kumimoji="1" lang="en-US" altLang="ja-JP" sz="1200" b="1" dirty="0">
+              <a:solidFill>
+                <a:schemeClr val="tx1"/>
+              </a:solidFill>
+            </a:endParaRPr>
+          </a:p>
+          <a:p>
+            <a:r>
+              <a:rPr kumimoji="1" lang="en-US" altLang="ja-JP" sz="1200" dirty="0">
+                <a:solidFill>
+                  <a:schemeClr val="tx1"/>
+                </a:solidFill>
+              </a:rPr>
+              <a:t>ex) Solana CLI</a:t>
+            </a:r>
+            <a:endParaRPr kumimoji="1" lang="ja-JP" altLang="en-US" sz="1200">
+              <a:solidFill>
+                <a:schemeClr val="tx1"/>
+              </a:solidFill>
+            </a:endParaRPr>
+          </a:p>
+        </p:txBody>
+      </p:sp>
+      <p:grpSp>
+        <p:nvGrpSpPr>
+          <p:cNvPr id="67" name="グループ化 66">
+            <a:extLst>
+              <a:ext uri="{FF2B5EF4-FFF2-40B4-BE49-F238E27FC236}">
+                <a16:creationId xmlns:a16="http://schemas.microsoft.com/office/drawing/2014/main" id="{2195D7D3-B4D0-0349-B900-4F7E377334B1}"/>
+              </a:ext>
+            </a:extLst>
+          </p:cNvPr>
+          <p:cNvGrpSpPr/>
+          <p:nvPr/>
+        </p:nvGrpSpPr>
+        <p:grpSpPr>
+          <a:xfrm>
+            <a:off x="302728" y="5502802"/>
+            <a:ext cx="1044473" cy="832478"/>
+            <a:chOff x="10526638" y="655817"/>
+            <a:chExt cx="1044473" cy="832478"/>
+          </a:xfrm>
+        </p:grpSpPr>
+        <p:sp>
+          <p:nvSpPr>
+            <p:cNvPr id="68" name="正方形/長方形 67">
+              <a:extLst>
+                <a:ext uri="{FF2B5EF4-FFF2-40B4-BE49-F238E27FC236}">
+                  <a16:creationId xmlns:a16="http://schemas.microsoft.com/office/drawing/2014/main" id="{FD4C105B-7D18-8B44-BC1C-EF24BF99AEA7}"/>
+                </a:ext>
+              </a:extLst>
+            </p:cNvPr>
+            <p:cNvSpPr/>
+            <p:nvPr/>
+          </p:nvSpPr>
+          <p:spPr>
+            <a:xfrm>
+              <a:off x="10526639" y="655818"/>
+              <a:ext cx="359660" cy="225665"/>
+            </a:xfrm>
+            <a:prstGeom prst="rect">
+              <a:avLst/>
+            </a:prstGeom>
+            <a:noFill/>
+            <a:ln>
+              <a:solidFill>
+                <a:schemeClr val="tx1"/>
+              </a:solidFill>
+            </a:ln>
+          </p:spPr>
+          <p:style>
+            <a:lnRef idx="2">
+              <a:schemeClr val="accent1">
+                <a:shade val="50000"/>
+              </a:schemeClr>
+            </a:lnRef>
+            <a:fillRef idx="1">
+              <a:schemeClr val="accent1"/>
+            </a:fillRef>
+            <a:effectRef idx="0">
+              <a:schemeClr val="accent1"/>
+            </a:effectRef>
+            <a:fontRef idx="minor">
+              <a:schemeClr val="lt1"/>
+            </a:fontRef>
+          </p:style>
+          <p:txBody>
+            <a:bodyPr rtlCol="0" anchor="ctr"/>
+            <a:lstStyle/>
+            <a:p>
+              <a:endParaRPr kumimoji="1" lang="en-US" altLang="ja-JP" sz="900" dirty="0">
+                <a:solidFill>
+                  <a:schemeClr val="tx1"/>
+                </a:solidFill>
+              </a:endParaRPr>
+            </a:p>
+          </p:txBody>
+        </p:sp>
+        <p:sp>
+          <p:nvSpPr>
+            <p:cNvPr id="69" name="角丸四角形 68">
+              <a:extLst>
+                <a:ext uri="{FF2B5EF4-FFF2-40B4-BE49-F238E27FC236}">
+                  <a16:creationId xmlns:a16="http://schemas.microsoft.com/office/drawing/2014/main" id="{7115418D-6FD7-F84F-B1C4-A64E62A2A20E}"/>
+                </a:ext>
+              </a:extLst>
+            </p:cNvPr>
+            <p:cNvSpPr/>
+            <p:nvPr/>
+          </p:nvSpPr>
+          <p:spPr>
+            <a:xfrm>
+              <a:off x="10526638" y="961779"/>
+              <a:ext cx="359661" cy="225665"/>
+            </a:xfrm>
+            <a:prstGeom prst="roundRect">
+              <a:avLst>
+                <a:gd name="adj" fmla="val 50000"/>
+              </a:avLst>
+            </a:prstGeom>
+            <a:noFill/>
+            <a:ln>
+              <a:solidFill>
+                <a:schemeClr val="tx1"/>
+              </a:solidFill>
+            </a:ln>
+          </p:spPr>
+          <p:style>
+            <a:lnRef idx="2">
+              <a:schemeClr val="accent1">
+                <a:shade val="50000"/>
+              </a:schemeClr>
+            </a:lnRef>
+            <a:fillRef idx="1">
+              <a:schemeClr val="accent1"/>
+            </a:fillRef>
+            <a:effectRef idx="0">
+              <a:schemeClr val="accent1"/>
+            </a:effectRef>
+            <a:fontRef idx="minor">
+              <a:schemeClr val="lt1"/>
+            </a:fontRef>
+          </p:style>
+          <p:txBody>
+            <a:bodyPr rtlCol="0" anchor="ctr"/>
+            <a:lstStyle/>
+            <a:p>
+              <a:endParaRPr kumimoji="1" lang="en-US" altLang="ja-JP" sz="900" dirty="0">
+                <a:solidFill>
+                  <a:schemeClr val="tx1"/>
+                </a:solidFill>
+              </a:endParaRPr>
+            </a:p>
+          </p:txBody>
+        </p:sp>
+        <p:cxnSp>
+          <p:nvCxnSpPr>
+            <p:cNvPr id="70" name="直線コネクタ 69">
+              <a:extLst>
+                <a:ext uri="{FF2B5EF4-FFF2-40B4-BE49-F238E27FC236}">
+                  <a16:creationId xmlns:a16="http://schemas.microsoft.com/office/drawing/2014/main" id="{8F025BBC-4384-4A47-91A1-1C01B72E54AB}"/>
+                </a:ext>
+              </a:extLst>
+            </p:cNvPr>
+            <p:cNvCxnSpPr>
+              <a:cxnSpLocks/>
+            </p:cNvCxnSpPr>
+            <p:nvPr/>
+          </p:nvCxnSpPr>
+          <p:spPr>
+            <a:xfrm flipV="1">
+              <a:off x="10561838" y="1371124"/>
+              <a:ext cx="289259" cy="1"/>
+            </a:xfrm>
+            <a:prstGeom prst="line">
+              <a:avLst/>
+            </a:prstGeom>
+            <a:ln w="9525">
+              <a:solidFill>
+                <a:schemeClr val="tx1"/>
+              </a:solidFill>
+              <a:headEnd type="none" w="med" len="med"/>
+              <a:tailEnd type="arrow" w="med" len="med"/>
+            </a:ln>
+          </p:spPr>
+          <p:style>
+            <a:lnRef idx="1">
+              <a:schemeClr val="accent1"/>
+            </a:lnRef>
+            <a:fillRef idx="0">
+              <a:schemeClr val="accent1"/>
+            </a:fillRef>
+            <a:effectRef idx="0">
+              <a:schemeClr val="accent1"/>
+            </a:effectRef>
+            <a:fontRef idx="minor">
+              <a:schemeClr val="tx1"/>
+            </a:fontRef>
+          </p:style>
+        </p:cxnSp>
+        <p:sp>
+          <p:nvSpPr>
+            <p:cNvPr id="71" name="テキスト ボックス 70">
+              <a:extLst>
+                <a:ext uri="{FF2B5EF4-FFF2-40B4-BE49-F238E27FC236}">
+                  <a16:creationId xmlns:a16="http://schemas.microsoft.com/office/drawing/2014/main" id="{B2AB3508-FD18-B34E-8373-304A48280E5B}"/>
+                </a:ext>
+              </a:extLst>
+            </p:cNvPr>
+            <p:cNvSpPr txBox="1"/>
+            <p:nvPr/>
+          </p:nvSpPr>
+          <p:spPr>
+            <a:xfrm>
+              <a:off x="10989220" y="961779"/>
+              <a:ext cx="581891" cy="225665"/>
+            </a:xfrm>
+            <a:prstGeom prst="rect">
+              <a:avLst/>
+            </a:prstGeom>
+            <a:noFill/>
+          </p:spPr>
+          <p:txBody>
+            <a:bodyPr wrap="none" rtlCol="0">
+              <a:noAutofit/>
+            </a:bodyPr>
+            <a:lstStyle/>
+            <a:p>
+              <a:r>
+                <a:rPr kumimoji="1" lang="en-US" altLang="ja-JP" sz="900" dirty="0"/>
+                <a:t>Device</a:t>
+              </a:r>
+              <a:endParaRPr kumimoji="1" lang="ja-JP" altLang="en-US" sz="900"/>
+            </a:p>
+          </p:txBody>
+        </p:sp>
+        <p:sp>
+          <p:nvSpPr>
+            <p:cNvPr id="72" name="テキスト ボックス 71">
+              <a:extLst>
+                <a:ext uri="{FF2B5EF4-FFF2-40B4-BE49-F238E27FC236}">
+                  <a16:creationId xmlns:a16="http://schemas.microsoft.com/office/drawing/2014/main" id="{2960CD50-C95A-6C48-A1B0-40EAA1529C4A}"/>
+                </a:ext>
+              </a:extLst>
+            </p:cNvPr>
+            <p:cNvSpPr txBox="1"/>
+            <p:nvPr/>
+          </p:nvSpPr>
+          <p:spPr>
+            <a:xfrm>
+              <a:off x="10989220" y="655817"/>
+              <a:ext cx="581891" cy="225665"/>
+            </a:xfrm>
+            <a:prstGeom prst="rect">
+              <a:avLst/>
+            </a:prstGeom>
+            <a:noFill/>
+          </p:spPr>
+          <p:txBody>
+            <a:bodyPr wrap="none" rtlCol="0">
+              <a:noAutofit/>
+            </a:bodyPr>
+            <a:lstStyle/>
+            <a:p>
+              <a:r>
+                <a:rPr kumimoji="1" lang="en-US" altLang="ja-JP" sz="900" dirty="0"/>
+                <a:t>System</a:t>
+              </a:r>
+              <a:endParaRPr kumimoji="1" lang="ja-JP" altLang="en-US" sz="900"/>
+            </a:p>
+          </p:txBody>
+        </p:sp>
+        <p:sp>
+          <p:nvSpPr>
+            <p:cNvPr id="73" name="テキスト ボックス 72">
+              <a:extLst>
+                <a:ext uri="{FF2B5EF4-FFF2-40B4-BE49-F238E27FC236}">
+                  <a16:creationId xmlns:a16="http://schemas.microsoft.com/office/drawing/2014/main" id="{0A926DBD-D847-C04E-84C5-B3077F04CD06}"/>
+                </a:ext>
+              </a:extLst>
+            </p:cNvPr>
+            <p:cNvSpPr txBox="1"/>
+            <p:nvPr/>
+          </p:nvSpPr>
+          <p:spPr>
+            <a:xfrm>
+              <a:off x="10989220" y="1262630"/>
+              <a:ext cx="581891" cy="225665"/>
+            </a:xfrm>
+            <a:prstGeom prst="rect">
+              <a:avLst/>
+            </a:prstGeom>
+            <a:noFill/>
+          </p:spPr>
+          <p:txBody>
+            <a:bodyPr wrap="none" rtlCol="0">
+              <a:noAutofit/>
+            </a:bodyPr>
+            <a:lstStyle/>
+            <a:p>
+              <a:r>
+                <a:rPr kumimoji="1" lang="en-US" altLang="ja-JP" sz="900" dirty="0"/>
+                <a:t>Action</a:t>
+              </a:r>
+              <a:endParaRPr kumimoji="1" lang="ja-JP" altLang="en-US" sz="900"/>
+            </a:p>
+          </p:txBody>
+        </p:sp>
+      </p:grpSp>
+    </p:spTree>
+    <p:extLst>
+      <p:ext uri="{BB962C8B-B14F-4D97-AF65-F5344CB8AC3E}">
+        <p14:creationId xmlns:p14="http://schemas.microsoft.com/office/powerpoint/2010/main" val="1791688801"/>
+      </p:ext>
+    </p:extLst>
+  </p:cSld>
+  <p:clrMapOvr>
+    <a:masterClrMapping/>
+  </p:clrMapOvr>
+</p:sld>
+</file>
+
+<file path=ppt/slides/slide3.xml><?xml version="1.0" encoding="utf-8"?>
+<p:sld xmlns:a="http://schemas.openxmlformats.org/drawingml/2006/main" xmlns:r="http://schemas.openxmlformats.org/officeDocument/2006/relationships" xmlns:p="http://schemas.openxmlformats.org/presentationml/2006/main">
+  <p:cSld>
+    <p:spTree>
+      <p:nvGrpSpPr>
+        <p:cNvPr id="1" name=""/>
+        <p:cNvGrpSpPr/>
+        <p:nvPr/>
+      </p:nvGrpSpPr>
+      <p:grpSpPr>
+        <a:xfrm>
+          <a:off x="0" y="0"/>
+          <a:ext cx="0" cy="0"/>
+          <a:chOff x="0" y="0"/>
+          <a:chExt cx="0" cy="0"/>
+        </a:xfrm>
+      </p:grpSpPr>
+      <p:sp>
+        <p:nvSpPr>
+          <p:cNvPr id="2" name="タイトル 1">
+            <a:extLst>
+              <a:ext uri="{FF2B5EF4-FFF2-40B4-BE49-F238E27FC236}">
                 <a16:creationId xmlns:a16="http://schemas.microsoft.com/office/drawing/2014/main" id="{5674C237-FC36-2245-8F79-A2954EC21E50}"/>
               </a:ext>
             </a:extLst>
@@ -3876,7 +6851,7 @@
           <a:p>
             <a:fld id="{51BE5F08-58E8-9243-A834-2B76637F595D}" type="slidenum">
               <a:rPr kumimoji="1" lang="ja-JP" altLang="en-US" smtClean="0"/>
-              <a:t>1</a:t>
+              <a:t>2</a:t>
             </a:fld>
             <a:endParaRPr kumimoji="1" lang="ja-JP" altLang="en-US"/>
           </a:p>
@@ -4249,9 +7224,9 @@
           </a:p>
           <a:p>
             <a:r>
-              <a:rPr kumimoji="1" lang="en-US" altLang="ja-JP" sz="1200" dirty="0">
-                <a:solidFill>
-                  <a:schemeClr val="accent2"/>
+              <a:rPr kumimoji="1" lang="en-US" altLang="ja-JP" sz="1200" b="1" dirty="0">
+                <a:solidFill>
+                  <a:schemeClr val="tx1"/>
                 </a:solidFill>
               </a:rPr>
               <a:t>Executable: Yes</a:t>
@@ -4461,9 +7436,9 @@
           </a:p>
           <a:p>
             <a:r>
-              <a:rPr kumimoji="1" lang="en-US" altLang="ja-JP" sz="1200" dirty="0">
-                <a:solidFill>
-                  <a:schemeClr val="accent2"/>
+              <a:rPr kumimoji="1" lang="en-US" altLang="ja-JP" sz="1200" b="1" dirty="0">
+                <a:solidFill>
+                  <a:schemeClr val="tx1"/>
                 </a:solidFill>
               </a:rPr>
               <a:t>Data (Bytes): 357501</a:t>
@@ -4741,9 +7716,9 @@
           </a:p>
           <a:p>
             <a:r>
-              <a:rPr kumimoji="1" lang="en-US" altLang="ja-JP" sz="1200" dirty="0">
-                <a:solidFill>
-                  <a:schemeClr val="accent2"/>
+              <a:rPr kumimoji="1" lang="en-US" altLang="ja-JP" sz="1200" b="1" dirty="0">
+                <a:solidFill>
+                  <a:schemeClr val="tx1"/>
                 </a:solidFill>
               </a:rPr>
               <a:t>Allocated Data Size: 16 byte(S)</a:t>
@@ -5199,7 +8174,7 @@
           <p:nvPr>
             <p:extLst>
               <p:ext uri="{D42A27DB-BD31-4B8C-83A1-F6EECF244321}">
-                <p14:modId xmlns:p14="http://schemas.microsoft.com/office/powerpoint/2010/main" val="1601524269"/>
+                <p14:modId xmlns:p14="http://schemas.microsoft.com/office/powerpoint/2010/main" val="1179300162"/>
               </p:ext>
             </p:extLst>
           </p:nvPr>
@@ -5256,7 +8231,7 @@
                       <a:r>
                         <a:rPr kumimoji="1" lang="en-US" altLang="ja-JP" sz="1200" b="0" dirty="0">
                           <a:solidFill>
-                            <a:schemeClr val="tx1"/>
+                            <a:schemeClr val="bg1"/>
                           </a:solidFill>
                         </a:rPr>
                         <a:t>Step with Signature(</a:t>
@@ -5264,7 +8239,7 @@
                       <a:r>
                         <a:rPr kumimoji="1" lang="en-US" altLang="ja-JP" sz="1200" b="0" dirty="0" err="1">
                           <a:solidFill>
-                            <a:schemeClr val="tx1"/>
+                            <a:schemeClr val="bg1"/>
                           </a:solidFill>
                         </a:rPr>
                         <a:t>Devnet</a:t>
@@ -5272,14 +8247,14 @@
                       <a:r>
                         <a:rPr kumimoji="1" lang="en-US" altLang="ja-JP" sz="1200" b="0" dirty="0">
                           <a:solidFill>
-                            <a:schemeClr val="tx1"/>
+                            <a:schemeClr val="bg1"/>
                           </a:solidFill>
                         </a:rPr>
                         <a:t>)</a:t>
                       </a:r>
                       <a:endParaRPr kumimoji="1" lang="ja-JP" altLang="en-US" sz="1200" b="0">
                         <a:solidFill>
-                          <a:schemeClr val="tx1"/>
+                          <a:schemeClr val="bg1"/>
                         </a:solidFill>
                       </a:endParaRPr>
                     </a:p>
@@ -5329,7 +8304,9 @@
                       <a:headEnd type="none" w="med" len="med"/>
                       <a:tailEnd type="none" w="med" len="med"/>
                     </a:lnB>
-                    <a:noFill/>
+                    <a:solidFill>
+                      <a:schemeClr val="tx1"/>
+                    </a:solidFill>
                   </a:tcPr>
                 </a:tc>
                 <a:tc>
@@ -5498,12 +8475,16 @@
                     <a:lstStyle/>
                     <a:p>
                       <a:r>
-                        <a:rPr kumimoji="1" lang="en-US" altLang="ja-JP" sz="1200" dirty="0"/>
+                        <a:rPr kumimoji="1" lang="en-US" altLang="ja-JP" sz="1200" dirty="0">
+                          <a:solidFill>
+                            <a:schemeClr val="bg1"/>
+                          </a:solidFill>
+                        </a:rPr>
                         <a:t>Example Programs</a:t>
                       </a:r>
                       <a:endParaRPr kumimoji="1" lang="ja-JP" altLang="en-US" sz="1200" b="0">
                         <a:solidFill>
-                          <a:schemeClr val="tx1"/>
+                          <a:schemeClr val="bg1"/>
                         </a:solidFill>
                       </a:endParaRPr>
                     </a:p>
@@ -5553,7 +8534,9 @@
                       <a:headEnd type="none" w="med" len="med"/>
                       <a:tailEnd type="none" w="med" len="med"/>
                     </a:lnB>
-                    <a:noFill/>
+                    <a:solidFill>
+                      <a:schemeClr val="tx1"/>
+                    </a:solidFill>
                   </a:tcPr>
                 </a:tc>
                 <a:tc>
@@ -5661,12 +8644,16 @@
                     <a:lstStyle/>
                     <a:p>
                       <a:r>
-                        <a:rPr kumimoji="1" lang="en-US" altLang="ja-JP" sz="1200" dirty="0"/>
+                        <a:rPr kumimoji="1" lang="en-US" altLang="ja-JP" sz="1200" dirty="0">
+                          <a:solidFill>
+                            <a:schemeClr val="bg1"/>
+                          </a:solidFill>
+                        </a:rPr>
                         <a:t>Public Key (Address)</a:t>
                       </a:r>
                       <a:endParaRPr kumimoji="1" lang="ja-JP" altLang="en-US" sz="1200" b="0">
                         <a:solidFill>
-                          <a:schemeClr val="tx1"/>
+                          <a:schemeClr val="bg1"/>
                         </a:solidFill>
                       </a:endParaRPr>
                     </a:p>
@@ -5716,7 +8703,9 @@
                       <a:headEnd type="none" w="med" len="med"/>
                       <a:tailEnd type="none" w="med" len="med"/>
                     </a:lnB>
-                    <a:noFill/>
+                    <a:solidFill>
+                      <a:schemeClr val="tx1"/>
+                    </a:solidFill>
                   </a:tcPr>
                 </a:tc>
                 <a:tc>
@@ -5975,16 +8964,14 @@
         </p:nvSpPr>
         <p:spPr>
           <a:xfrm>
-            <a:off x="3204798" y="672607"/>
-            <a:ext cx="3816000" cy="216000"/>
+            <a:off x="3204798" y="722773"/>
+            <a:ext cx="3816000" cy="180000"/>
           </a:xfrm>
           <a:prstGeom prst="rect">
             <a:avLst/>
           </a:prstGeom>
           <a:solidFill>
-            <a:schemeClr val="bg1">
-              <a:lumMod val="75000"/>
-            </a:schemeClr>
+            <a:schemeClr val="tx1"/>
           </a:solidFill>
           <a:ln>
             <a:noFill/>
@@ -6014,14 +9001,14 @@
             <a:r>
               <a:rPr kumimoji="1" lang="en-US" altLang="ja-JP" sz="1400" dirty="0">
                 <a:solidFill>
-                  <a:schemeClr val="tx1"/>
+                  <a:schemeClr val="bg1"/>
                 </a:solidFill>
               </a:rPr>
               <a:t>STEP 1, 2 (Deploy, Re-Deploy Program)</a:t>
             </a:r>
             <a:endParaRPr kumimoji="1" lang="ja-JP" altLang="en-US" sz="1400">
               <a:solidFill>
-                <a:schemeClr val="tx1"/>
+                <a:schemeClr val="bg1"/>
               </a:solidFill>
             </a:endParaRPr>
           </a:p>
@@ -6101,15 +9088,13 @@
         <p:spPr>
           <a:xfrm>
             <a:off x="3204798" y="4397501"/>
-            <a:ext cx="3816000" cy="216000"/>
+            <a:ext cx="3816000" cy="180000"/>
           </a:xfrm>
           <a:prstGeom prst="rect">
             <a:avLst/>
           </a:prstGeom>
           <a:solidFill>
-            <a:schemeClr val="bg1">
-              <a:lumMod val="75000"/>
-            </a:schemeClr>
+            <a:schemeClr val="tx1"/>
           </a:solidFill>
           <a:ln>
             <a:noFill/>
@@ -6139,14 +9124,14 @@
             <a:r>
               <a:rPr kumimoji="1" lang="en-US" altLang="ja-JP" sz="1400" dirty="0">
                 <a:solidFill>
-                  <a:schemeClr val="tx1"/>
+                  <a:schemeClr val="bg1"/>
                 </a:solidFill>
               </a:rPr>
               <a:t>STEP 3, 4 (Create Account, then Add/Update Data)</a:t>
             </a:r>
             <a:endParaRPr kumimoji="1" lang="ja-JP" altLang="en-US" sz="1400">
               <a:solidFill>
-                <a:schemeClr val="tx1"/>
+                <a:schemeClr val="bg1"/>
               </a:solidFill>
             </a:endParaRPr>
           </a:p>
@@ -6165,7 +9150,7 @@
 </p:sld>
 </file>
 
-<file path=ppt/slides/slide3.xml><?xml version="1.0" encoding="utf-8"?>
+<file path=ppt/slides/slide4.xml><?xml version="1.0" encoding="utf-8"?>
 <p:sld xmlns:a="http://schemas.openxmlformats.org/drawingml/2006/main" xmlns:r="http://schemas.openxmlformats.org/officeDocument/2006/relationships" xmlns:p="http://schemas.openxmlformats.org/presentationml/2006/main">
   <p:cSld>
     <p:spTree>
@@ -6263,7 +9248,7 @@
           <a:p>
             <a:fld id="{51BE5F08-58E8-9243-A834-2B76637F595D}" type="slidenum">
               <a:rPr kumimoji="1" lang="ja-JP" altLang="en-US" smtClean="0"/>
-              <a:t>2</a:t>
+              <a:t>3</a:t>
             </a:fld>
             <a:endParaRPr kumimoji="1" lang="ja-JP" altLang="en-US"/>
           </a:p>
@@ -6284,13 +9269,13 @@
           <p:nvPr>
             <p:extLst>
               <p:ext uri="{D42A27DB-BD31-4B8C-83A1-F6EECF244321}">
-                <p14:modId xmlns:p14="http://schemas.microsoft.com/office/powerpoint/2010/main" val="2684927453"/>
+                <p14:modId xmlns:p14="http://schemas.microsoft.com/office/powerpoint/2010/main" val="3102017220"/>
               </p:ext>
             </p:extLst>
           </p:nvPr>
         </p:nvGraphicFramePr>
         <p:xfrm>
-          <a:off x="359198" y="5501144"/>
+          <a:off x="359198" y="5523722"/>
           <a:ext cx="11211913" cy="929640"/>
         </p:xfrm>
         <a:graphic>
@@ -6341,7 +9326,7 @@
                       <a:r>
                         <a:rPr kumimoji="1" lang="en-US" altLang="ja-JP" sz="1200" b="0" dirty="0">
                           <a:solidFill>
-                            <a:schemeClr val="tx1"/>
+                            <a:schemeClr val="bg1"/>
                           </a:solidFill>
                         </a:rPr>
                         <a:t>Step with Signature(</a:t>
@@ -6349,7 +9334,7 @@
                       <a:r>
                         <a:rPr kumimoji="1" lang="en-US" altLang="ja-JP" sz="1200" b="0" dirty="0" err="1">
                           <a:solidFill>
-                            <a:schemeClr val="tx1"/>
+                            <a:schemeClr val="bg1"/>
                           </a:solidFill>
                         </a:rPr>
                         <a:t>Devnet</a:t>
@@ -6357,14 +9342,14 @@
                       <a:r>
                         <a:rPr kumimoji="1" lang="en-US" altLang="ja-JP" sz="1200" b="0" dirty="0">
                           <a:solidFill>
-                            <a:schemeClr val="tx1"/>
+                            <a:schemeClr val="bg1"/>
                           </a:solidFill>
                         </a:rPr>
                         <a:t>)</a:t>
                       </a:r>
                       <a:endParaRPr kumimoji="1" lang="ja-JP" altLang="en-US" sz="1200" b="0">
                         <a:solidFill>
-                          <a:schemeClr val="tx1"/>
+                          <a:schemeClr val="bg1"/>
                         </a:solidFill>
                       </a:endParaRPr>
                     </a:p>
@@ -6414,7 +9399,9 @@
                       <a:headEnd type="none" w="med" len="med"/>
                       <a:tailEnd type="none" w="med" len="med"/>
                     </a:lnB>
-                    <a:noFill/>
+                    <a:solidFill>
+                      <a:schemeClr val="tx1"/>
+                    </a:solidFill>
                   </a:tcPr>
                 </a:tc>
                 <a:tc>
@@ -6695,48 +9682,48 @@
           </a:p>
           <a:p>
             <a:r>
-              <a:rPr kumimoji="1" lang="en-US" altLang="ja-JP" sz="1200" dirty="0">
-                <a:solidFill>
-                  <a:schemeClr val="accent2"/>
+              <a:rPr kumimoji="1" lang="en-US" altLang="ja-JP" sz="1200" b="1" dirty="0">
+                <a:solidFill>
+                  <a:schemeClr val="tx1"/>
                 </a:solidFill>
               </a:rPr>
               <a:t>Mint Authority: </a:t>
             </a:r>
             <a:r>
-              <a:rPr kumimoji="1" lang="en-US" altLang="ja-JP" sz="1200" dirty="0" err="1">
-                <a:solidFill>
-                  <a:schemeClr val="accent2"/>
+              <a:rPr kumimoji="1" lang="en-US" altLang="ja-JP" sz="1200" b="1" dirty="0" err="1">
+                <a:solidFill>
+                  <a:schemeClr val="tx1"/>
                 </a:solidFill>
               </a:rPr>
               <a:t>HXtB</a:t>
             </a:r>
             <a:r>
-              <a:rPr kumimoji="1" lang="en-US" altLang="ja-JP" sz="1200" dirty="0">
-                <a:solidFill>
-                  <a:schemeClr val="accent2"/>
+              <a:rPr kumimoji="1" lang="en-US" altLang="ja-JP" sz="1200" b="1" dirty="0">
+                <a:solidFill>
+                  <a:schemeClr val="tx1"/>
                 </a:solidFill>
               </a:rPr>
               <a:t>...</a:t>
             </a:r>
             <a:r>
-              <a:rPr kumimoji="1" lang="en-US" altLang="ja-JP" sz="1200" dirty="0" err="1">
-                <a:solidFill>
-                  <a:schemeClr val="accent2"/>
+              <a:rPr kumimoji="1" lang="en-US" altLang="ja-JP" sz="1200" b="1" dirty="0" err="1">
+                <a:solidFill>
+                  <a:schemeClr val="tx1"/>
                 </a:solidFill>
               </a:rPr>
               <a:t>setg</a:t>
             </a:r>
-            <a:endParaRPr kumimoji="1" lang="en-US" altLang="ja-JP" sz="1200" dirty="0">
+            <a:endParaRPr kumimoji="1" lang="en-US" altLang="ja-JP" sz="1200" b="1" dirty="0">
               <a:solidFill>
-                <a:schemeClr val="accent2"/>
+                <a:schemeClr val="tx1"/>
               </a:solidFill>
             </a:endParaRPr>
           </a:p>
           <a:p>
             <a:r>
-              <a:rPr kumimoji="1" lang="en-US" altLang="ja-JP" sz="1200" dirty="0">
-                <a:solidFill>
-                  <a:schemeClr val="accent2"/>
+              <a:rPr kumimoji="1" lang="en-US" altLang="ja-JP" sz="1200" b="1" dirty="0">
+                <a:solidFill>
+                  <a:schemeClr val="tx1"/>
                 </a:solidFill>
               </a:rPr>
               <a:t>Owner: TokenkegQ...Q5DA</a:t>
@@ -6917,47 +9904,47 @@
           </a:p>
           <a:p>
             <a:r>
-              <a:rPr kumimoji="1" lang="en-US" altLang="ja-JP" sz="1200" dirty="0">
-                <a:solidFill>
-                  <a:schemeClr val="accent2"/>
+              <a:rPr kumimoji="1" lang="en-US" altLang="ja-JP" sz="1200" b="1" dirty="0">
+                <a:solidFill>
+                  <a:schemeClr val="tx1"/>
                 </a:solidFill>
               </a:rPr>
               <a:t>Mint: 6cWx...</a:t>
             </a:r>
             <a:r>
-              <a:rPr kumimoji="1" lang="en-US" altLang="ja-JP" sz="1200" dirty="0" err="1">
-                <a:solidFill>
-                  <a:schemeClr val="accent2"/>
+              <a:rPr kumimoji="1" lang="en-US" altLang="ja-JP" sz="1200" b="1" dirty="0" err="1">
+                <a:solidFill>
+                  <a:schemeClr val="tx1"/>
                 </a:solidFill>
               </a:rPr>
               <a:t>pteX</a:t>
             </a:r>
-            <a:endParaRPr kumimoji="1" lang="en-US" altLang="ja-JP" sz="1200" dirty="0">
+            <a:endParaRPr kumimoji="1" lang="en-US" altLang="ja-JP" sz="1200" b="1" dirty="0">
               <a:solidFill>
-                <a:schemeClr val="accent2"/>
+                <a:schemeClr val="tx1"/>
               </a:solidFill>
             </a:endParaRPr>
           </a:p>
           <a:p>
             <a:r>
-              <a:rPr kumimoji="1" lang="en-US" altLang="ja-JP" sz="1200" dirty="0">
-                <a:solidFill>
-                  <a:schemeClr val="accent2"/>
+              <a:rPr kumimoji="1" lang="en-US" altLang="ja-JP" sz="1200" b="1" dirty="0">
+                <a:solidFill>
+                  <a:schemeClr val="tx1"/>
                 </a:solidFill>
               </a:rPr>
               <a:t>Owner: 2SN6...</a:t>
             </a:r>
             <a:r>
-              <a:rPr kumimoji="1" lang="en-US" altLang="ja-JP" sz="1200" dirty="0" err="1">
-                <a:solidFill>
-                  <a:schemeClr val="accent2"/>
+              <a:rPr kumimoji="1" lang="en-US" altLang="ja-JP" sz="1200" b="1" dirty="0" err="1">
+                <a:solidFill>
+                  <a:schemeClr val="tx1"/>
                 </a:solidFill>
               </a:rPr>
               <a:t>HRwn</a:t>
             </a:r>
-            <a:endParaRPr kumimoji="1" lang="en-US" altLang="ja-JP" sz="1200" dirty="0">
+            <a:endParaRPr kumimoji="1" lang="en-US" altLang="ja-JP" sz="1200" b="1" dirty="0">
               <a:solidFill>
-                <a:schemeClr val="accent2"/>
+                <a:schemeClr val="tx1"/>
               </a:solidFill>
             </a:endParaRPr>
           </a:p>
@@ -7189,40 +10176,40 @@
           </a:p>
           <a:p>
             <a:r>
-              <a:rPr kumimoji="1" lang="en-US" altLang="ja-JP" sz="1200" dirty="0">
-                <a:solidFill>
-                  <a:schemeClr val="accent2"/>
+              <a:rPr kumimoji="1" lang="en-US" altLang="ja-JP" sz="1200" b="1" dirty="0">
+                <a:solidFill>
+                  <a:schemeClr val="tx1"/>
                 </a:solidFill>
               </a:rPr>
               <a:t>Owner: </a:t>
             </a:r>
             <a:r>
-              <a:rPr kumimoji="1" lang="en-US" altLang="ja-JP" sz="1200" dirty="0" err="1">
-                <a:solidFill>
-                  <a:schemeClr val="accent2"/>
+              <a:rPr kumimoji="1" lang="en-US" altLang="ja-JP" sz="1200" b="1" dirty="0" err="1">
+                <a:solidFill>
+                  <a:schemeClr val="tx1"/>
                 </a:solidFill>
               </a:rPr>
               <a:t>HXtB</a:t>
             </a:r>
             <a:r>
-              <a:rPr kumimoji="1" lang="en-US" altLang="ja-JP" sz="1200" dirty="0">
-                <a:solidFill>
-                  <a:schemeClr val="accent2"/>
+              <a:rPr kumimoji="1" lang="en-US" altLang="ja-JP" sz="1200" b="1" dirty="0">
+                <a:solidFill>
+                  <a:schemeClr val="tx1"/>
                 </a:solidFill>
               </a:rPr>
               <a:t>...</a:t>
             </a:r>
             <a:r>
-              <a:rPr kumimoji="1" lang="en-US" altLang="ja-JP" sz="1200" dirty="0" err="1">
-                <a:solidFill>
-                  <a:schemeClr val="accent2"/>
+              <a:rPr kumimoji="1" lang="en-US" altLang="ja-JP" sz="1200" b="1" dirty="0" err="1">
+                <a:solidFill>
+                  <a:schemeClr val="tx1"/>
                 </a:solidFill>
               </a:rPr>
               <a:t>setg</a:t>
             </a:r>
-            <a:endParaRPr kumimoji="1" lang="en-US" altLang="ja-JP" sz="1200" dirty="0">
+            <a:endParaRPr kumimoji="1" lang="en-US" altLang="ja-JP" sz="1200" b="1" dirty="0">
               <a:solidFill>
-                <a:schemeClr val="accent2"/>
+                <a:schemeClr val="tx1"/>
               </a:solidFill>
             </a:endParaRPr>
           </a:p>
@@ -7414,47 +10401,47 @@
           </a:p>
           <a:p>
             <a:r>
-              <a:rPr kumimoji="1" lang="en-US" altLang="ja-JP" sz="1200" dirty="0">
-                <a:solidFill>
-                  <a:schemeClr val="accent2"/>
+              <a:rPr kumimoji="1" lang="en-US" altLang="ja-JP" sz="1200" b="1" dirty="0">
+                <a:solidFill>
+                  <a:schemeClr val="tx1"/>
                 </a:solidFill>
               </a:rPr>
               <a:t>Mint: 6cWx...</a:t>
             </a:r>
             <a:r>
-              <a:rPr kumimoji="1" lang="en-US" altLang="ja-JP" sz="1200" dirty="0" err="1">
-                <a:solidFill>
-                  <a:schemeClr val="accent2"/>
+              <a:rPr kumimoji="1" lang="en-US" altLang="ja-JP" sz="1200" b="1" dirty="0" err="1">
+                <a:solidFill>
+                  <a:schemeClr val="tx1"/>
                 </a:solidFill>
               </a:rPr>
               <a:t>pteX</a:t>
             </a:r>
-            <a:endParaRPr kumimoji="1" lang="en-US" altLang="ja-JP" sz="1200" dirty="0">
+            <a:endParaRPr kumimoji="1" lang="en-US" altLang="ja-JP" sz="1200" b="1" dirty="0">
               <a:solidFill>
-                <a:schemeClr val="accent2"/>
+                <a:schemeClr val="tx1"/>
               </a:solidFill>
             </a:endParaRPr>
           </a:p>
           <a:p>
             <a:r>
-              <a:rPr kumimoji="1" lang="en-US" altLang="ja-JP" sz="1200" dirty="0">
-                <a:solidFill>
-                  <a:schemeClr val="accent2"/>
+              <a:rPr kumimoji="1" lang="en-US" altLang="ja-JP" sz="1200" b="1" dirty="0">
+                <a:solidFill>
+                  <a:schemeClr val="tx1"/>
                 </a:solidFill>
               </a:rPr>
               <a:t>Owner: 2SN6...</a:t>
             </a:r>
             <a:r>
-              <a:rPr kumimoji="1" lang="en-US" altLang="ja-JP" sz="1200" dirty="0" err="1">
-                <a:solidFill>
-                  <a:schemeClr val="accent2"/>
+              <a:rPr kumimoji="1" lang="en-US" altLang="ja-JP" sz="1200" b="1" dirty="0" err="1">
+                <a:solidFill>
+                  <a:schemeClr val="tx1"/>
                 </a:solidFill>
               </a:rPr>
               <a:t>HRwn</a:t>
             </a:r>
-            <a:endParaRPr kumimoji="1" lang="en-US" altLang="ja-JP" sz="1200" dirty="0">
+            <a:endParaRPr kumimoji="1" lang="en-US" altLang="ja-JP" sz="1200" b="1" dirty="0">
               <a:solidFill>
-                <a:schemeClr val="accent2"/>
+                <a:schemeClr val="tx1"/>
               </a:solidFill>
             </a:endParaRPr>
           </a:p>
@@ -7860,8 +10847,8 @@
         </p:nvCxnSpPr>
         <p:spPr>
           <a:xfrm>
-            <a:off x="3504785" y="2689667"/>
-            <a:ext cx="845856" cy="355652"/>
+            <a:off x="3431822" y="2754489"/>
+            <a:ext cx="918819" cy="290830"/>
           </a:xfrm>
           <a:prstGeom prst="line">
             <a:avLst/>
@@ -8172,16 +11159,14 @@
         </p:nvSpPr>
         <p:spPr>
           <a:xfrm>
-            <a:off x="253906" y="1582932"/>
-            <a:ext cx="1803199" cy="167158"/>
+            <a:off x="253906" y="1572047"/>
+            <a:ext cx="1803199" cy="180000"/>
           </a:xfrm>
           <a:prstGeom prst="rect">
             <a:avLst/>
           </a:prstGeom>
           <a:solidFill>
-            <a:schemeClr val="bg1">
-              <a:lumMod val="75000"/>
-            </a:schemeClr>
+            <a:schemeClr val="tx1"/>
           </a:solidFill>
           <a:ln>
             <a:noFill/>
@@ -8211,14 +11196,14 @@
             <a:r>
               <a:rPr kumimoji="1" lang="en-US" altLang="ja-JP" sz="1400" dirty="0">
                 <a:solidFill>
-                  <a:schemeClr val="tx1"/>
+                  <a:schemeClr val="bg1"/>
                 </a:solidFill>
               </a:rPr>
               <a:t>STEP 1 (Create Token)</a:t>
             </a:r>
             <a:endParaRPr kumimoji="1" lang="ja-JP" altLang="en-US" sz="1400">
               <a:solidFill>
-                <a:schemeClr val="tx1"/>
+                <a:schemeClr val="bg1"/>
               </a:solidFill>
             </a:endParaRPr>
           </a:p>
@@ -8245,9 +11230,7 @@
             <a:avLst/>
           </a:prstGeom>
           <a:solidFill>
-            <a:schemeClr val="bg1">
-              <a:lumMod val="75000"/>
-            </a:schemeClr>
+            <a:schemeClr val="tx1"/>
           </a:solidFill>
           <a:ln>
             <a:noFill/>
@@ -8277,7 +11260,7 @@
             <a:r>
               <a:rPr kumimoji="1" lang="en-US" altLang="ja-JP" sz="1400" dirty="0">
                 <a:solidFill>
-                  <a:schemeClr val="tx1"/>
+                  <a:schemeClr val="bg1"/>
                 </a:solidFill>
               </a:rPr>
               <a:t>STEP 2 (Create Token Account)</a:t>
@@ -8287,14 +11270,14 @@
             <a:r>
               <a:rPr kumimoji="1" lang="en-US" altLang="ja-JP" sz="1400" dirty="0">
                 <a:solidFill>
-                  <a:schemeClr val="tx1"/>
+                  <a:schemeClr val="bg1"/>
                 </a:solidFill>
               </a:rPr>
               <a:t>STEP 3 (Mint 100 Tokens)</a:t>
             </a:r>
             <a:endParaRPr kumimoji="1" lang="ja-JP" altLang="en-US" sz="1400">
               <a:solidFill>
-                <a:schemeClr val="tx1"/>
+                <a:schemeClr val="bg1"/>
               </a:solidFill>
             </a:endParaRPr>
           </a:p>
@@ -8315,15 +11298,13 @@
         <p:spPr>
           <a:xfrm>
             <a:off x="253906" y="5280370"/>
-            <a:ext cx="1803199" cy="167158"/>
+            <a:ext cx="1803199" cy="180000"/>
           </a:xfrm>
           <a:prstGeom prst="rect">
             <a:avLst/>
           </a:prstGeom>
           <a:solidFill>
-            <a:schemeClr val="bg1">
-              <a:lumMod val="75000"/>
-            </a:schemeClr>
+            <a:schemeClr val="tx1"/>
           </a:solidFill>
           <a:ln>
             <a:noFill/>
@@ -8353,14 +11334,14 @@
             <a:r>
               <a:rPr kumimoji="1" lang="en-US" altLang="ja-JP" sz="1400" dirty="0">
                 <a:solidFill>
-                  <a:schemeClr val="tx1"/>
+                  <a:schemeClr val="bg1"/>
                 </a:solidFill>
               </a:rPr>
               <a:t>STEP 4 (Send Token)</a:t>
             </a:r>
             <a:endParaRPr kumimoji="1" lang="ja-JP" altLang="en-US" sz="1400">
               <a:solidFill>
-                <a:schemeClr val="tx1"/>
+                <a:schemeClr val="bg1"/>
               </a:solidFill>
             </a:endParaRPr>
           </a:p>

</xml_diff>

<commit_message>
docs: add How Uniswap Works
</commit_message>
<xml_diff>
--- a/docs/Solana_Blockchain_Outline_Figure.pptx
+++ b/docs/Solana_Blockchain_Outline_Figure.pptx
@@ -5,15 +5,16 @@
     <p:sldMasterId id="2147483672" r:id="rId1"/>
   </p:sldMasterIdLst>
   <p:notesMasterIdLst>
-    <p:notesMasterId r:id="rId8"/>
+    <p:notesMasterId r:id="rId9"/>
   </p:notesMasterIdLst>
   <p:sldIdLst>
     <p:sldId id="256" r:id="rId2"/>
     <p:sldId id="262" r:id="rId3"/>
     <p:sldId id="263" r:id="rId4"/>
-    <p:sldId id="260" r:id="rId5"/>
-    <p:sldId id="258" r:id="rId6"/>
-    <p:sldId id="259" r:id="rId7"/>
+    <p:sldId id="264" r:id="rId5"/>
+    <p:sldId id="260" r:id="rId6"/>
+    <p:sldId id="258" r:id="rId7"/>
+    <p:sldId id="259" r:id="rId8"/>
   </p:sldIdLst>
   <p:sldSz cx="12192000" cy="6858000"/>
   <p:notesSz cx="6858000" cy="9144000"/>
@@ -650,7 +651,7 @@
           <a:p>
             <a:fld id="{F1E89903-B24E-AB4B-9164-3704844A834F}" type="slidenum">
               <a:rPr kumimoji="1" lang="ja-JP" altLang="en-US" smtClean="0"/>
-              <a:t>3</a:t>
+              <a:t>4</a:t>
             </a:fld>
             <a:endParaRPr kumimoji="1" lang="ja-JP" altLang="en-US"/>
           </a:p>
@@ -9385,7 +9386,7 @@
           <p:cNvPr id="2" name="タイトル 1">
             <a:extLst>
               <a:ext uri="{FF2B5EF4-FFF2-40B4-BE49-F238E27FC236}">
-                <a16:creationId xmlns:a16="http://schemas.microsoft.com/office/drawing/2014/main" id="{247BFE88-7019-4F43-8B30-C0AC025035D4}"/>
+                <a16:creationId xmlns:a16="http://schemas.microsoft.com/office/drawing/2014/main" id="{A975DB2E-3BC4-CE4A-8A1B-DD078F1FCBDD}"/>
               </a:ext>
             </a:extLst>
           </p:cNvPr>
@@ -9403,15 +9404,19 @@
           <a:p>
             <a:r>
               <a:rPr kumimoji="1" lang="en-US" altLang="ja-JP" dirty="0"/>
-              <a:t>Production System Architecture</a:t>
-            </a:r>
-            <a:r>
-              <a:rPr kumimoji="1" lang="ja-JP" altLang="en-US"/>
-              <a:t> </a:t>
-            </a:r>
-            <a:r>
-              <a:rPr kumimoji="1" lang="en-US" altLang="ja-JP" dirty="0"/>
-              <a:t>(Draft)</a:t>
+              <a:t>Quote:</a:t>
+            </a:r>
+            <a:r>
+              <a:rPr lang="en-US" altLang="ja-JP" dirty="0"/>
+              <a:t> How </a:t>
+            </a:r>
+            <a:r>
+              <a:rPr lang="en-US" altLang="ja-JP" dirty="0" err="1"/>
+              <a:t>Uniswap</a:t>
+            </a:r>
+            <a:r>
+              <a:rPr lang="en-US" altLang="ja-JP" dirty="0"/>
+              <a:t> V2 works</a:t>
             </a:r>
             <a:endParaRPr kumimoji="1" lang="ja-JP" altLang="en-US"/>
           </a:p>
@@ -9419,10 +9424,39 @@
       </p:sp>
       <p:sp>
         <p:nvSpPr>
+          <p:cNvPr id="4" name="フッター プレースホルダー 3">
+            <a:extLst>
+              <a:ext uri="{FF2B5EF4-FFF2-40B4-BE49-F238E27FC236}">
+                <a16:creationId xmlns:a16="http://schemas.microsoft.com/office/drawing/2014/main" id="{4CF94AA4-AB4E-324F-8027-9D29D920579C}"/>
+              </a:ext>
+            </a:extLst>
+          </p:cNvPr>
+          <p:cNvSpPr>
+            <a:spLocks noGrp="1"/>
+          </p:cNvSpPr>
+          <p:nvPr>
+            <p:ph type="ftr" sz="quarter" idx="11"/>
+          </p:nvPr>
+        </p:nvSpPr>
+        <p:spPr/>
+        <p:txBody>
+          <a:bodyPr/>
+          <a:lstStyle/>
+          <a:p>
+            <a:r>
+              <a:rPr kumimoji="1" lang="en-US" altLang="ja-JP"/>
+              <a:t>256hax</a:t>
+            </a:r>
+            <a:endParaRPr kumimoji="1" lang="ja-JP" altLang="en-US"/>
+          </a:p>
+        </p:txBody>
+      </p:sp>
+      <p:sp>
+        <p:nvSpPr>
           <p:cNvPr id="5" name="スライド番号プレースホルダー 4">
             <a:extLst>
               <a:ext uri="{FF2B5EF4-FFF2-40B4-BE49-F238E27FC236}">
-                <a16:creationId xmlns:a16="http://schemas.microsoft.com/office/drawing/2014/main" id="{C519304D-DB9E-0848-9482-0874A773055B}"/>
+                <a16:creationId xmlns:a16="http://schemas.microsoft.com/office/drawing/2014/main" id="{63705DBA-FF44-8F4E-990A-F906E11289AE}"/>
               </a:ext>
             </a:extLst>
           </p:cNvPr>
@@ -9441,6 +9475,450 @@
             <a:fld id="{51BE5F08-58E8-9243-A834-2B76637F595D}" type="slidenum">
               <a:rPr kumimoji="1" lang="ja-JP" altLang="en-US" smtClean="0"/>
               <a:t>3</a:t>
+            </a:fld>
+            <a:endParaRPr kumimoji="1" lang="ja-JP" altLang="en-US"/>
+          </a:p>
+        </p:txBody>
+      </p:sp>
+      <p:sp>
+        <p:nvSpPr>
+          <p:cNvPr id="6" name="テキスト ボックス 5">
+            <a:extLst>
+              <a:ext uri="{FF2B5EF4-FFF2-40B4-BE49-F238E27FC236}">
+                <a16:creationId xmlns:a16="http://schemas.microsoft.com/office/drawing/2014/main" id="{2A285182-278E-EC43-B3F1-5216926592DF}"/>
+              </a:ext>
+            </a:extLst>
+          </p:cNvPr>
+          <p:cNvSpPr txBox="1"/>
+          <p:nvPr/>
+        </p:nvSpPr>
+        <p:spPr>
+          <a:xfrm>
+            <a:off x="5576711" y="714905"/>
+            <a:ext cx="6118578" cy="1633353"/>
+          </a:xfrm>
+          <a:prstGeom prst="rect">
+            <a:avLst/>
+          </a:prstGeom>
+          <a:noFill/>
+        </p:spPr>
+        <p:txBody>
+          <a:bodyPr wrap="square" rtlCol="0">
+            <a:noAutofit/>
+          </a:bodyPr>
+          <a:lstStyle/>
+          <a:p>
+            <a:r>
+              <a:rPr lang="en-US" altLang="ja-JP" sz="1200" dirty="0"/>
+              <a:t>"Anyone can become a liquidity provider (LP) for a pool by depositing an equivalent value of each underlying token in return for pool tokens. These tokens track pro-rata LP shares of the total reserves, and can be redeemed for the underlying assets at any time."</a:t>
+            </a:r>
+          </a:p>
+        </p:txBody>
+      </p:sp>
+      <p:sp>
+        <p:nvSpPr>
+          <p:cNvPr id="9" name="テキスト ボックス 8">
+            <a:extLst>
+              <a:ext uri="{FF2B5EF4-FFF2-40B4-BE49-F238E27FC236}">
+                <a16:creationId xmlns:a16="http://schemas.microsoft.com/office/drawing/2014/main" id="{75C0EDA6-91E1-AE43-99CC-7CDDCCED986F}"/>
+              </a:ext>
+            </a:extLst>
+          </p:cNvPr>
+          <p:cNvSpPr txBox="1"/>
+          <p:nvPr/>
+        </p:nvSpPr>
+        <p:spPr>
+          <a:xfrm>
+            <a:off x="5576711" y="2428954"/>
+            <a:ext cx="6118578" cy="1913489"/>
+          </a:xfrm>
+          <a:prstGeom prst="rect">
+            <a:avLst/>
+          </a:prstGeom>
+          <a:noFill/>
+        </p:spPr>
+        <p:txBody>
+          <a:bodyPr wrap="square" rtlCol="0">
+            <a:noAutofit/>
+          </a:bodyPr>
+          <a:lstStyle/>
+          <a:p>
+            <a:r>
+              <a:rPr lang="en-US" altLang="ja-JP" sz="1200" dirty="0"/>
+              <a:t>"Pairs act as automated market makers, standing ready to accept one token for the other as long as the “constant product” formula is preserved. This formula, most simply expressed as x * y = k, states that trades must not change the product (k) of a pair’s reserve balances (x and y). Because k remains unchanged from the reference frame of a trade, it is often referred to as the invariant. This formula has the desirable property that larger trades (relative to reserves) execute at exponentially worse rates than smaller ones.</a:t>
+            </a:r>
+          </a:p>
+          <a:p>
+            <a:r>
+              <a:rPr lang="en-US" altLang="ja-JP" sz="1200" dirty="0"/>
+              <a:t>In practice, </a:t>
+            </a:r>
+            <a:r>
+              <a:rPr lang="en-US" altLang="ja-JP" sz="1200" dirty="0" err="1"/>
+              <a:t>Uniswap</a:t>
+            </a:r>
+            <a:r>
+              <a:rPr lang="en-US" altLang="ja-JP" sz="1200" dirty="0"/>
+              <a:t> applies a 0.30% fee to trades, which is added to reserves. As a result, each trade actually increases k. This functions as a payout to LPs, which is realized when they burn their pool tokens to withdraw their portion of total reserves. In the future, this fee may be reduced to 0.25%, with the remaining 0.05% withheld as a protocol-wide charge."</a:t>
+            </a:r>
+          </a:p>
+        </p:txBody>
+      </p:sp>
+      <p:pic>
+        <p:nvPicPr>
+          <p:cNvPr id="1026" name="Picture 2">
+            <a:extLst>
+              <a:ext uri="{FF2B5EF4-FFF2-40B4-BE49-F238E27FC236}">
+                <a16:creationId xmlns:a16="http://schemas.microsoft.com/office/drawing/2014/main" id="{28A2A80F-5E05-0F43-8FCD-5F39A7521706}"/>
+              </a:ext>
+            </a:extLst>
+          </p:cNvPr>
+          <p:cNvPicPr>
+            <a:picLocks noChangeAspect="1" noChangeArrowheads="1"/>
+          </p:cNvPicPr>
+          <p:nvPr/>
+        </p:nvPicPr>
+        <p:blipFill>
+          <a:blip r:embed="rId2">
+            <a:extLst>
+              <a:ext uri="{28A0092B-C50C-407E-A947-70E740481C1C}">
+                <a14:useLocalDpi xmlns:a14="http://schemas.microsoft.com/office/drawing/2010/main" val="0"/>
+              </a:ext>
+            </a:extLst>
+          </a:blip>
+          <a:srcRect/>
+          <a:stretch>
+            <a:fillRect/>
+          </a:stretch>
+        </p:blipFill>
+        <p:spPr bwMode="auto">
+          <a:xfrm>
+            <a:off x="451259" y="714905"/>
+            <a:ext cx="5064004" cy="1633353"/>
+          </a:xfrm>
+          <a:prstGeom prst="rect">
+            <a:avLst/>
+          </a:prstGeom>
+          <a:noFill/>
+          <a:ln>
+            <a:solidFill>
+              <a:schemeClr val="bg1">
+                <a:lumMod val="75000"/>
+              </a:schemeClr>
+            </a:solidFill>
+          </a:ln>
+          <a:extLst>
+            <a:ext uri="{909E8E84-426E-40DD-AFC4-6F175D3DCCD1}">
+              <a14:hiddenFill xmlns:a14="http://schemas.microsoft.com/office/drawing/2010/main">
+                <a:solidFill>
+                  <a:srgbClr val="FFFFFF"/>
+                </a:solidFill>
+              </a14:hiddenFill>
+            </a:ext>
+          </a:extLst>
+        </p:spPr>
+      </p:pic>
+      <p:pic>
+        <p:nvPicPr>
+          <p:cNvPr id="1028" name="Picture 4">
+            <a:extLst>
+              <a:ext uri="{FF2B5EF4-FFF2-40B4-BE49-F238E27FC236}">
+                <a16:creationId xmlns:a16="http://schemas.microsoft.com/office/drawing/2014/main" id="{C8D6C070-9601-F74F-A766-D67B71ABB485}"/>
+              </a:ext>
+            </a:extLst>
+          </p:cNvPr>
+          <p:cNvPicPr>
+            <a:picLocks noChangeAspect="1" noChangeArrowheads="1"/>
+          </p:cNvPicPr>
+          <p:nvPr/>
+        </p:nvPicPr>
+        <p:blipFill>
+          <a:blip r:embed="rId3">
+            <a:extLst>
+              <a:ext uri="{28A0092B-C50C-407E-A947-70E740481C1C}">
+                <a14:useLocalDpi xmlns:a14="http://schemas.microsoft.com/office/drawing/2010/main" val="0"/>
+              </a:ext>
+            </a:extLst>
+          </a:blip>
+          <a:srcRect/>
+          <a:stretch>
+            <a:fillRect/>
+          </a:stretch>
+        </p:blipFill>
+        <p:spPr bwMode="auto">
+          <a:xfrm>
+            <a:off x="451259" y="2428954"/>
+            <a:ext cx="5069009" cy="1913489"/>
+          </a:xfrm>
+          <a:prstGeom prst="rect">
+            <a:avLst/>
+          </a:prstGeom>
+          <a:noFill/>
+          <a:ln>
+            <a:solidFill>
+              <a:schemeClr val="bg1">
+                <a:lumMod val="75000"/>
+              </a:schemeClr>
+            </a:solidFill>
+          </a:ln>
+          <a:extLst>
+            <a:ext uri="{909E8E84-426E-40DD-AFC4-6F175D3DCCD1}">
+              <a14:hiddenFill xmlns:a14="http://schemas.microsoft.com/office/drawing/2010/main">
+                <a:solidFill>
+                  <a:srgbClr val="FFFFFF"/>
+                </a:solidFill>
+              </a14:hiddenFill>
+            </a:ext>
+          </a:extLst>
+        </p:spPr>
+      </p:pic>
+      <p:pic>
+        <p:nvPicPr>
+          <p:cNvPr id="1030" name="Picture 6">
+            <a:extLst>
+              <a:ext uri="{FF2B5EF4-FFF2-40B4-BE49-F238E27FC236}">
+                <a16:creationId xmlns:a16="http://schemas.microsoft.com/office/drawing/2014/main" id="{A5A832C1-0D02-FC4E-A428-5FBF09383B9D}"/>
+              </a:ext>
+            </a:extLst>
+          </p:cNvPr>
+          <p:cNvPicPr>
+            <a:picLocks noChangeAspect="1" noChangeArrowheads="1"/>
+          </p:cNvPicPr>
+          <p:nvPr/>
+        </p:nvPicPr>
+        <p:blipFill>
+          <a:blip r:embed="rId4">
+            <a:extLst>
+              <a:ext uri="{28A0092B-C50C-407E-A947-70E740481C1C}">
+                <a14:useLocalDpi xmlns:a14="http://schemas.microsoft.com/office/drawing/2010/main" val="0"/>
+              </a:ext>
+            </a:extLst>
+          </a:blip>
+          <a:srcRect/>
+          <a:stretch>
+            <a:fillRect/>
+          </a:stretch>
+        </p:blipFill>
+        <p:spPr bwMode="auto">
+          <a:xfrm>
+            <a:off x="446253" y="4423139"/>
+            <a:ext cx="5074014" cy="2010639"/>
+          </a:xfrm>
+          <a:prstGeom prst="rect">
+            <a:avLst/>
+          </a:prstGeom>
+          <a:noFill/>
+          <a:ln>
+            <a:solidFill>
+              <a:schemeClr val="bg1">
+                <a:lumMod val="75000"/>
+              </a:schemeClr>
+            </a:solidFill>
+          </a:ln>
+          <a:extLst>
+            <a:ext uri="{909E8E84-426E-40DD-AFC4-6F175D3DCCD1}">
+              <a14:hiddenFill xmlns:a14="http://schemas.microsoft.com/office/drawing/2010/main">
+                <a:solidFill>
+                  <a:srgbClr val="FFFFFF"/>
+                </a:solidFill>
+              </a14:hiddenFill>
+            </a:ext>
+          </a:extLst>
+        </p:spPr>
+      </p:pic>
+      <p:sp>
+        <p:nvSpPr>
+          <p:cNvPr id="12" name="テキスト ボックス 11">
+            <a:extLst>
+              <a:ext uri="{FF2B5EF4-FFF2-40B4-BE49-F238E27FC236}">
+                <a16:creationId xmlns:a16="http://schemas.microsoft.com/office/drawing/2014/main" id="{BC8F5FB8-241E-D44F-8EC5-A239493BCD65}"/>
+              </a:ext>
+            </a:extLst>
+          </p:cNvPr>
+          <p:cNvSpPr txBox="1"/>
+          <p:nvPr/>
+        </p:nvSpPr>
+        <p:spPr>
+          <a:xfrm>
+            <a:off x="5576711" y="4423139"/>
+            <a:ext cx="6118578" cy="2010639"/>
+          </a:xfrm>
+          <a:prstGeom prst="rect">
+            <a:avLst/>
+          </a:prstGeom>
+          <a:noFill/>
+        </p:spPr>
+        <p:txBody>
+          <a:bodyPr wrap="square" rtlCol="0">
+            <a:noAutofit/>
+          </a:bodyPr>
+          <a:lstStyle/>
+          <a:p>
+            <a:r>
+              <a:rPr lang="en-US" altLang="ja-JP" sz="1200" dirty="0"/>
+              <a:t>"Because the relative price of the two pair assets can only be changed through trading, divergences between the </a:t>
+            </a:r>
+            <a:r>
+              <a:rPr lang="en-US" altLang="ja-JP" sz="1200" dirty="0" err="1"/>
+              <a:t>Uniswap</a:t>
+            </a:r>
+            <a:r>
+              <a:rPr lang="en-US" altLang="ja-JP" sz="1200" dirty="0"/>
+              <a:t> price and external prices create arbitrage opportunities. This mechanism ensures that </a:t>
+            </a:r>
+            <a:r>
+              <a:rPr lang="en-US" altLang="ja-JP" sz="1200" dirty="0" err="1"/>
+              <a:t>Uniswap</a:t>
+            </a:r>
+            <a:r>
+              <a:rPr lang="en-US" altLang="ja-JP" sz="1200" dirty="0"/>
+              <a:t> prices always trend toward the market-clearing price."</a:t>
+            </a:r>
+          </a:p>
+        </p:txBody>
+      </p:sp>
+      <p:sp>
+        <p:nvSpPr>
+          <p:cNvPr id="8" name="テキスト ボックス 7">
+            <a:extLst>
+              <a:ext uri="{FF2B5EF4-FFF2-40B4-BE49-F238E27FC236}">
+                <a16:creationId xmlns:a16="http://schemas.microsoft.com/office/drawing/2014/main" id="{D37FAAB5-7062-4B4A-8E0D-1AF9E1FAABE8}"/>
+              </a:ext>
+            </a:extLst>
+          </p:cNvPr>
+          <p:cNvSpPr txBox="1"/>
+          <p:nvPr/>
+        </p:nvSpPr>
+        <p:spPr>
+          <a:xfrm>
+            <a:off x="5576712" y="412947"/>
+            <a:ext cx="6118578" cy="253916"/>
+          </a:xfrm>
+          <a:prstGeom prst="rect">
+            <a:avLst/>
+          </a:prstGeom>
+          <a:noFill/>
+        </p:spPr>
+        <p:txBody>
+          <a:bodyPr wrap="square" rtlCol="0">
+            <a:spAutoFit/>
+          </a:bodyPr>
+          <a:lstStyle/>
+          <a:p>
+            <a:r>
+              <a:rPr lang="en-US" altLang="ja-JP" sz="1050" dirty="0"/>
+              <a:t>Source: https://</a:t>
+            </a:r>
+            <a:r>
+              <a:rPr lang="en-US" altLang="ja-JP" sz="1050" dirty="0" err="1"/>
+              <a:t>docs.uniswap.org</a:t>
+            </a:r>
+            <a:r>
+              <a:rPr lang="en-US" altLang="ja-JP" sz="1050" dirty="0"/>
+              <a:t>/protocol/V2/concepts/protocol-overview/how-</a:t>
+            </a:r>
+            <a:r>
+              <a:rPr lang="en-US" altLang="ja-JP" sz="1050" dirty="0" err="1"/>
+              <a:t>uniswap</a:t>
+            </a:r>
+            <a:r>
+              <a:rPr lang="en-US" altLang="ja-JP" sz="1050" dirty="0"/>
+              <a:t>-works</a:t>
+            </a:r>
+          </a:p>
+        </p:txBody>
+      </p:sp>
+    </p:spTree>
+    <p:extLst>
+      <p:ext uri="{BB962C8B-B14F-4D97-AF65-F5344CB8AC3E}">
+        <p14:creationId xmlns:p14="http://schemas.microsoft.com/office/powerpoint/2010/main" val="2329877283"/>
+      </p:ext>
+    </p:extLst>
+  </p:cSld>
+  <p:clrMapOvr>
+    <a:masterClrMapping/>
+  </p:clrMapOvr>
+</p:sld>
+</file>
+
+<file path=ppt/slides/slide5.xml><?xml version="1.0" encoding="utf-8"?>
+<p:sld xmlns:a="http://schemas.openxmlformats.org/drawingml/2006/main" xmlns:r="http://schemas.openxmlformats.org/officeDocument/2006/relationships" xmlns:p="http://schemas.openxmlformats.org/presentationml/2006/main">
+  <p:cSld>
+    <p:spTree>
+      <p:nvGrpSpPr>
+        <p:cNvPr id="1" name=""/>
+        <p:cNvGrpSpPr/>
+        <p:nvPr/>
+      </p:nvGrpSpPr>
+      <p:grpSpPr>
+        <a:xfrm>
+          <a:off x="0" y="0"/>
+          <a:ext cx="0" cy="0"/>
+          <a:chOff x="0" y="0"/>
+          <a:chExt cx="0" cy="0"/>
+        </a:xfrm>
+      </p:grpSpPr>
+      <p:sp>
+        <p:nvSpPr>
+          <p:cNvPr id="2" name="タイトル 1">
+            <a:extLst>
+              <a:ext uri="{FF2B5EF4-FFF2-40B4-BE49-F238E27FC236}">
+                <a16:creationId xmlns:a16="http://schemas.microsoft.com/office/drawing/2014/main" id="{247BFE88-7019-4F43-8B30-C0AC025035D4}"/>
+              </a:ext>
+            </a:extLst>
+          </p:cNvPr>
+          <p:cNvSpPr>
+            <a:spLocks noGrp="1"/>
+          </p:cNvSpPr>
+          <p:nvPr>
+            <p:ph type="title"/>
+          </p:nvPr>
+        </p:nvSpPr>
+        <p:spPr/>
+        <p:txBody>
+          <a:bodyPr/>
+          <a:lstStyle/>
+          <a:p>
+            <a:r>
+              <a:rPr kumimoji="1" lang="en-US" altLang="ja-JP" dirty="0"/>
+              <a:t>Production System Architecture</a:t>
+            </a:r>
+            <a:r>
+              <a:rPr kumimoji="1" lang="ja-JP" altLang="en-US"/>
+              <a:t> </a:t>
+            </a:r>
+            <a:r>
+              <a:rPr kumimoji="1" lang="en-US" altLang="ja-JP" dirty="0"/>
+              <a:t>(Draft)</a:t>
+            </a:r>
+            <a:endParaRPr kumimoji="1" lang="ja-JP" altLang="en-US"/>
+          </a:p>
+        </p:txBody>
+      </p:sp>
+      <p:sp>
+        <p:nvSpPr>
+          <p:cNvPr id="5" name="スライド番号プレースホルダー 4">
+            <a:extLst>
+              <a:ext uri="{FF2B5EF4-FFF2-40B4-BE49-F238E27FC236}">
+                <a16:creationId xmlns:a16="http://schemas.microsoft.com/office/drawing/2014/main" id="{C519304D-DB9E-0848-9482-0874A773055B}"/>
+              </a:ext>
+            </a:extLst>
+          </p:cNvPr>
+          <p:cNvSpPr>
+            <a:spLocks noGrp="1"/>
+          </p:cNvSpPr>
+          <p:nvPr>
+            <p:ph type="sldNum" sz="quarter" idx="12"/>
+          </p:nvPr>
+        </p:nvSpPr>
+        <p:spPr/>
+        <p:txBody>
+          <a:bodyPr/>
+          <a:lstStyle/>
+          <a:p>
+            <a:fld id="{51BE5F08-58E8-9243-A834-2B76637F595D}" type="slidenum">
+              <a:rPr kumimoji="1" lang="ja-JP" altLang="en-US" smtClean="0"/>
+              <a:t>4</a:t>
             </a:fld>
             <a:endParaRPr kumimoji="1" lang="ja-JP" altLang="en-US"/>
           </a:p>
@@ -12638,7 +13116,7 @@
 </p:sld>
 </file>
 
-<file path=ppt/slides/slide5.xml><?xml version="1.0" encoding="utf-8"?>
+<file path=ppt/slides/slide6.xml><?xml version="1.0" encoding="utf-8"?>
 <p:sld xmlns:a="http://schemas.openxmlformats.org/drawingml/2006/main" xmlns:r="http://schemas.openxmlformats.org/officeDocument/2006/relationships" xmlns:p="http://schemas.openxmlformats.org/presentationml/2006/main">
   <p:cSld>
     <p:spTree>
@@ -12707,7 +13185,7 @@
           <a:p>
             <a:fld id="{51BE5F08-58E8-9243-A834-2B76637F595D}" type="slidenum">
               <a:rPr kumimoji="1" lang="ja-JP" altLang="en-US" smtClean="0"/>
-              <a:t>4</a:t>
+              <a:t>5</a:t>
             </a:fld>
             <a:endParaRPr kumimoji="1" lang="ja-JP" altLang="en-US"/>
           </a:p>
@@ -15006,7 +15484,7 @@
 </p:sld>
 </file>
 
-<file path=ppt/slides/slide6.xml><?xml version="1.0" encoding="utf-8"?>
+<file path=ppt/slides/slide7.xml><?xml version="1.0" encoding="utf-8"?>
 <p:sld xmlns:a="http://schemas.openxmlformats.org/drawingml/2006/main" xmlns:r="http://schemas.openxmlformats.org/officeDocument/2006/relationships" xmlns:p="http://schemas.openxmlformats.org/presentationml/2006/main">
   <p:cSld>
     <p:spTree>
@@ -15075,7 +15553,7 @@
           <a:p>
             <a:fld id="{51BE5F08-58E8-9243-A834-2B76637F595D}" type="slidenum">
               <a:rPr kumimoji="1" lang="ja-JP" altLang="en-US" smtClean="0"/>
-              <a:t>5</a:t>
+              <a:t>6</a:t>
             </a:fld>
             <a:endParaRPr kumimoji="1" lang="ja-JP" altLang="en-US"/>
           </a:p>

</xml_diff>

<commit_message>
docs: add arweve image
</commit_message>
<xml_diff>
--- a/docs/Solana_Blockchain_Outline_Figure.pptx
+++ b/docs/Solana_Blockchain_Outline_Figure.pptx
@@ -220,7 +220,7 @@
           <a:p>
             <a:fld id="{0E3AE901-84B3-3248-AD12-BEDA7F301CE3}" type="datetimeFigureOut">
               <a:rPr kumimoji="1" lang="ja-JP" altLang="en-US" smtClean="0"/>
-              <a:t>2022/1/20</a:t>
+              <a:t>2022/1/21</a:t>
             </a:fld>
             <a:endParaRPr kumimoji="1" lang="ja-JP" altLang="en-US"/>
           </a:p>
@@ -835,7 +835,7 @@
           <a:p>
             <a:fld id="{E3F90748-6578-AC42-962A-9F4B1F5FBFAD}" type="datetime1">
               <a:rPr kumimoji="1" lang="ja-JP" altLang="en-US" smtClean="0"/>
-              <a:t>2022/1/20</a:t>
+              <a:t>2022/1/21</a:t>
             </a:fld>
             <a:endParaRPr kumimoji="1" lang="ja-JP" altLang="en-US"/>
           </a:p>
@@ -1056,7 +1056,7 @@
           <a:p>
             <a:fld id="{BE6DFB40-8C3F-A944-983D-65243E3E0DC7}" type="datetime1">
               <a:rPr kumimoji="1" lang="ja-JP" altLang="en-US" smtClean="0"/>
-              <a:t>2022/1/20</a:t>
+              <a:t>2022/1/21</a:t>
             </a:fld>
             <a:endParaRPr kumimoji="1" lang="ja-JP" altLang="en-US"/>
           </a:p>
@@ -1272,7 +1272,7 @@
           <a:p>
             <a:fld id="{631B2AF4-14FC-314E-A304-69D6AC20AFC1}" type="datetime1">
               <a:rPr kumimoji="1" lang="ja-JP" altLang="en-US" smtClean="0"/>
-              <a:t>2022/1/20</a:t>
+              <a:t>2022/1/21</a:t>
             </a:fld>
             <a:endParaRPr kumimoji="1" lang="ja-JP" altLang="en-US"/>
           </a:p>
@@ -1478,7 +1478,7 @@
           <a:p>
             <a:fld id="{73EFA7FA-4B80-324E-84D1-8F8384F1BA5D}" type="datetime1">
               <a:rPr kumimoji="1" lang="ja-JP" altLang="en-US" smtClean="0"/>
-              <a:t>2022/1/20</a:t>
+              <a:t>2022/1/21</a:t>
             </a:fld>
             <a:endParaRPr kumimoji="1" lang="ja-JP" altLang="en-US"/>
           </a:p>
@@ -1732,7 +1732,7 @@
           <a:p>
             <a:fld id="{D2E220AC-C2A7-024E-ACAB-4DB6052A376C}" type="datetime1">
               <a:rPr kumimoji="1" lang="ja-JP" altLang="en-US" smtClean="0"/>
-              <a:t>2022/1/20</a:t>
+              <a:t>2022/1/21</a:t>
             </a:fld>
             <a:endParaRPr kumimoji="1" lang="ja-JP" altLang="en-US"/>
           </a:p>
@@ -2032,7 +2032,7 @@
           <a:p>
             <a:fld id="{CC48FC5F-5874-5040-B9D3-0BB86491154B}" type="datetime1">
               <a:rPr kumimoji="1" lang="ja-JP" altLang="en-US" smtClean="0"/>
-              <a:t>2022/1/20</a:t>
+              <a:t>2022/1/21</a:t>
             </a:fld>
             <a:endParaRPr kumimoji="1" lang="ja-JP" altLang="en-US"/>
           </a:p>
@@ -2467,7 +2467,7 @@
           <a:p>
             <a:fld id="{667059AF-CDDF-A545-B437-20B256967FD9}" type="datetime1">
               <a:rPr kumimoji="1" lang="ja-JP" altLang="en-US" smtClean="0"/>
-              <a:t>2022/1/20</a:t>
+              <a:t>2022/1/21</a:t>
             </a:fld>
             <a:endParaRPr kumimoji="1" lang="ja-JP" altLang="en-US"/>
           </a:p>
@@ -2589,7 +2589,7 @@
           <a:p>
             <a:fld id="{15B6534E-A8F6-864C-985B-4DB3D4538E40}" type="datetime1">
               <a:rPr kumimoji="1" lang="ja-JP" altLang="en-US" smtClean="0"/>
-              <a:t>2022/1/20</a:t>
+              <a:t>2022/1/21</a:t>
             </a:fld>
             <a:endParaRPr kumimoji="1" lang="ja-JP" altLang="en-US"/>
           </a:p>
@@ -2688,7 +2688,7 @@
           <a:p>
             <a:fld id="{D63D519C-9325-DD4F-A5F6-0AFD37CE8635}" type="datetime1">
               <a:rPr kumimoji="1" lang="ja-JP" altLang="en-US" smtClean="0"/>
-              <a:t>2022/1/20</a:t>
+              <a:t>2022/1/21</a:t>
             </a:fld>
             <a:endParaRPr kumimoji="1" lang="ja-JP" altLang="en-US"/>
           </a:p>
@@ -3001,7 +3001,7 @@
           <a:p>
             <a:fld id="{5503B069-C866-8C47-A1B1-6AEF053A8792}" type="datetime1">
               <a:rPr kumimoji="1" lang="ja-JP" altLang="en-US" smtClean="0"/>
-              <a:t>2022/1/20</a:t>
+              <a:t>2022/1/21</a:t>
             </a:fld>
             <a:endParaRPr kumimoji="1" lang="ja-JP" altLang="en-US"/>
           </a:p>
@@ -3262,7 +3262,7 @@
           <a:p>
             <a:fld id="{C183513C-F2F4-B940-8F47-6502D3E9B9CA}" type="datetime1">
               <a:rPr kumimoji="1" lang="ja-JP" altLang="en-US" smtClean="0"/>
-              <a:t>2022/1/20</a:t>
+              <a:t>2022/1/21</a:t>
             </a:fld>
             <a:endParaRPr kumimoji="1" lang="ja-JP" altLang="en-US"/>
           </a:p>
@@ -3449,7 +3449,7 @@
           <a:p>
             <a:fld id="{E55A93C3-7990-6040-9FF9-3C243F65B473}" type="datetime1">
               <a:rPr kumimoji="1" lang="ja-JP" altLang="en-US" smtClean="0"/>
-              <a:t>2022/1/20</a:t>
+              <a:t>2022/1/21</a:t>
             </a:fld>
             <a:endParaRPr kumimoji="1" lang="ja-JP" altLang="en-US"/>
           </a:p>
@@ -33693,6 +33693,22 @@
                   <a:schemeClr val="tx1"/>
                 </a:solidFill>
               </a:rPr>
+              <a:t>arweave</a:t>
+            </a:r>
+            <a:r>
+              <a:rPr kumimoji="1" lang="en-US" altLang="ja-JP" sz="1200" dirty="0">
+                <a:solidFill>
+                  <a:schemeClr val="tx1"/>
+                </a:solidFill>
+              </a:rPr>
+              <a:t>, </a:t>
+            </a:r>
+            <a:r>
+              <a:rPr kumimoji="1" lang="en-US" altLang="ja-JP" sz="1200" dirty="0" err="1">
+                <a:solidFill>
+                  <a:schemeClr val="tx1"/>
+                </a:solidFill>
+              </a:rPr>
               <a:t>NFT.Storage</a:t>
             </a:r>
             <a:r>
@@ -36211,67 +36227,20 @@
       </p:pic>
       <p:pic>
         <p:nvPicPr>
-          <p:cNvPr id="1034" name="Picture 10" descr="NFT Storage Logo">
-            <a:extLst>
-              <a:ext uri="{FF2B5EF4-FFF2-40B4-BE49-F238E27FC236}">
-                <a16:creationId xmlns:a16="http://schemas.microsoft.com/office/drawing/2014/main" id="{D517E114-08B9-814B-AF71-9B87F803D7FA}"/>
+          <p:cNvPr id="18" name="図 17">
+            <a:extLst>
+              <a:ext uri="{FF2B5EF4-FFF2-40B4-BE49-F238E27FC236}">
+                <a16:creationId xmlns:a16="http://schemas.microsoft.com/office/drawing/2014/main" id="{3DD7A546-5BEF-A14A-9A0D-43902C7984DD}"/>
               </a:ext>
             </a:extLst>
           </p:cNvPr>
           <p:cNvPicPr>
-            <a:picLocks noChangeAspect="1" noChangeArrowheads="1"/>
+            <a:picLocks noChangeAspect="1"/>
           </p:cNvPicPr>
           <p:nvPr/>
         </p:nvPicPr>
         <p:blipFill>
           <a:blip r:embed="rId9" cstate="screen">
-            <a:extLst>
-              <a:ext uri="{28A0092B-C50C-407E-A947-70E740481C1C}">
-                <a14:useLocalDpi xmlns:a14="http://schemas.microsoft.com/office/drawing/2010/main"/>
-              </a:ext>
-            </a:extLst>
-          </a:blip>
-          <a:srcRect/>
-          <a:stretch>
-            <a:fillRect/>
-          </a:stretch>
-        </p:blipFill>
-        <p:spPr bwMode="auto">
-          <a:xfrm>
-            <a:off x="9751284" y="3518264"/>
-            <a:ext cx="764500" cy="377472"/>
-          </a:xfrm>
-          <a:prstGeom prst="rect">
-            <a:avLst/>
-          </a:prstGeom>
-          <a:noFill/>
-          <a:extLst>
-            <a:ext uri="{909E8E84-426E-40DD-AFC4-6F175D3DCCD1}">
-              <a14:hiddenFill xmlns:a14="http://schemas.microsoft.com/office/drawing/2010/main">
-                <a:solidFill>
-                  <a:srgbClr val="FFFFFF"/>
-                </a:solidFill>
-              </a14:hiddenFill>
-            </a:ext>
-          </a:extLst>
-        </p:spPr>
-      </p:pic>
-      <p:pic>
-        <p:nvPicPr>
-          <p:cNvPr id="18" name="図 17">
-            <a:extLst>
-              <a:ext uri="{FF2B5EF4-FFF2-40B4-BE49-F238E27FC236}">
-                <a16:creationId xmlns:a16="http://schemas.microsoft.com/office/drawing/2014/main" id="{3DD7A546-5BEF-A14A-9A0D-43902C7984DD}"/>
-              </a:ext>
-            </a:extLst>
-          </p:cNvPr>
-          <p:cNvPicPr>
-            <a:picLocks noChangeAspect="1"/>
-          </p:cNvPicPr>
-          <p:nvPr/>
-        </p:nvPicPr>
-        <p:blipFill>
-          <a:blip r:embed="rId10" cstate="screen">
             <a:extLst>
               <a:ext uri="{28A0092B-C50C-407E-A947-70E740481C1C}">
                 <a14:useLocalDpi xmlns:a14="http://schemas.microsoft.com/office/drawing/2010/main"/>
@@ -36286,6 +36255,36 @@
           <a:xfrm>
             <a:off x="9664133" y="1426610"/>
             <a:ext cx="851651" cy="255495"/>
+          </a:xfrm>
+          <a:prstGeom prst="rect">
+            <a:avLst/>
+          </a:prstGeom>
+        </p:spPr>
+      </p:pic>
+      <p:pic>
+        <p:nvPicPr>
+          <p:cNvPr id="23" name="図 22">
+            <a:extLst>
+              <a:ext uri="{FF2B5EF4-FFF2-40B4-BE49-F238E27FC236}">
+                <a16:creationId xmlns:a16="http://schemas.microsoft.com/office/drawing/2014/main" id="{C0D5957B-199F-D340-B1DA-713D46AB572B}"/>
+              </a:ext>
+            </a:extLst>
+          </p:cNvPr>
+          <p:cNvPicPr>
+            <a:picLocks noChangeAspect="1"/>
+          </p:cNvPicPr>
+          <p:nvPr/>
+        </p:nvPicPr>
+        <p:blipFill>
+          <a:blip r:embed="rId10"/>
+          <a:stretch>
+            <a:fillRect/>
+          </a:stretch>
+        </p:blipFill>
+        <p:spPr>
+          <a:xfrm>
+            <a:off x="10086338" y="3512052"/>
+            <a:ext cx="360339" cy="378356"/>
           </a:xfrm>
           <a:prstGeom prst="rect">
             <a:avLst/>

</xml_diff>